<commit_message>
Add GSN and first pattern
</commit_message>
<xml_diff>
--- a/docs/figures/figures.pptx
+++ b/docs/figures/figures.pptx
@@ -6,6 +6,8 @@
   </p:sldMasterIdLst>
   <p:sldIdLst>
     <p:sldId id="256" r:id="rId2"/>
+    <p:sldId id="257" r:id="rId3"/>
+    <p:sldId id="258" r:id="rId4"/>
   </p:sldIdLst>
   <p:sldSz cx="12192000" cy="6858000"/>
   <p:notesSz cx="6858000" cy="9144000"/>
@@ -270,7 +272,7 @@
           <a:p>
             <a:fld id="{89E19A41-2D67-4984-881E-035821EC17D6}" type="datetimeFigureOut">
               <a:rPr lang="sv-SE" smtClean="0"/>
-              <a:t>2021-09-07</a:t>
+              <a:t>2021-09-09</a:t>
             </a:fld>
             <a:endParaRPr lang="sv-SE"/>
           </a:p>
@@ -468,7 +470,7 @@
           <a:p>
             <a:fld id="{89E19A41-2D67-4984-881E-035821EC17D6}" type="datetimeFigureOut">
               <a:rPr lang="sv-SE" smtClean="0"/>
-              <a:t>2021-09-07</a:t>
+              <a:t>2021-09-09</a:t>
             </a:fld>
             <a:endParaRPr lang="sv-SE"/>
           </a:p>
@@ -676,7 +678,7 @@
           <a:p>
             <a:fld id="{89E19A41-2D67-4984-881E-035821EC17D6}" type="datetimeFigureOut">
               <a:rPr lang="sv-SE" smtClean="0"/>
-              <a:t>2021-09-07</a:t>
+              <a:t>2021-09-09</a:t>
             </a:fld>
             <a:endParaRPr lang="sv-SE"/>
           </a:p>
@@ -874,7 +876,7 @@
           <a:p>
             <a:fld id="{89E19A41-2D67-4984-881E-035821EC17D6}" type="datetimeFigureOut">
               <a:rPr lang="sv-SE" smtClean="0"/>
-              <a:t>2021-09-07</a:t>
+              <a:t>2021-09-09</a:t>
             </a:fld>
             <a:endParaRPr lang="sv-SE"/>
           </a:p>
@@ -1149,7 +1151,7 @@
           <a:p>
             <a:fld id="{89E19A41-2D67-4984-881E-035821EC17D6}" type="datetimeFigureOut">
               <a:rPr lang="sv-SE" smtClean="0"/>
-              <a:t>2021-09-07</a:t>
+              <a:t>2021-09-09</a:t>
             </a:fld>
             <a:endParaRPr lang="sv-SE"/>
           </a:p>
@@ -1414,7 +1416,7 @@
           <a:p>
             <a:fld id="{89E19A41-2D67-4984-881E-035821EC17D6}" type="datetimeFigureOut">
               <a:rPr lang="sv-SE" smtClean="0"/>
-              <a:t>2021-09-07</a:t>
+              <a:t>2021-09-09</a:t>
             </a:fld>
             <a:endParaRPr lang="sv-SE"/>
           </a:p>
@@ -1826,7 +1828,7 @@
           <a:p>
             <a:fld id="{89E19A41-2D67-4984-881E-035821EC17D6}" type="datetimeFigureOut">
               <a:rPr lang="sv-SE" smtClean="0"/>
-              <a:t>2021-09-07</a:t>
+              <a:t>2021-09-09</a:t>
             </a:fld>
             <a:endParaRPr lang="sv-SE"/>
           </a:p>
@@ -1967,7 +1969,7 @@
           <a:p>
             <a:fld id="{89E19A41-2D67-4984-881E-035821EC17D6}" type="datetimeFigureOut">
               <a:rPr lang="sv-SE" smtClean="0"/>
-              <a:t>2021-09-07</a:t>
+              <a:t>2021-09-09</a:t>
             </a:fld>
             <a:endParaRPr lang="sv-SE"/>
           </a:p>
@@ -2080,7 +2082,7 @@
           <a:p>
             <a:fld id="{89E19A41-2D67-4984-881E-035821EC17D6}" type="datetimeFigureOut">
               <a:rPr lang="sv-SE" smtClean="0"/>
-              <a:t>2021-09-07</a:t>
+              <a:t>2021-09-09</a:t>
             </a:fld>
             <a:endParaRPr lang="sv-SE"/>
           </a:p>
@@ -2391,7 +2393,7 @@
           <a:p>
             <a:fld id="{89E19A41-2D67-4984-881E-035821EC17D6}" type="datetimeFigureOut">
               <a:rPr lang="sv-SE" smtClean="0"/>
-              <a:t>2021-09-07</a:t>
+              <a:t>2021-09-09</a:t>
             </a:fld>
             <a:endParaRPr lang="sv-SE"/>
           </a:p>
@@ -2679,7 +2681,7 @@
           <a:p>
             <a:fld id="{89E19A41-2D67-4984-881E-035821EC17D6}" type="datetimeFigureOut">
               <a:rPr lang="sv-SE" smtClean="0"/>
-              <a:t>2021-09-07</a:t>
+              <a:t>2021-09-09</a:t>
             </a:fld>
             <a:endParaRPr lang="sv-SE"/>
           </a:p>
@@ -2920,7 +2922,7 @@
           <a:p>
             <a:fld id="{89E19A41-2D67-4984-881E-035821EC17D6}" type="datetimeFigureOut">
               <a:rPr lang="sv-SE" smtClean="0"/>
-              <a:t>2021-09-07</a:t>
+              <a:t>2021-09-09</a:t>
             </a:fld>
             <a:endParaRPr lang="sv-SE"/>
           </a:p>
@@ -4820,6 +4822,3816 @@
 </p:sld>
 </file>
 
+<file path=ppt/slides/slide2.xml><?xml version="1.0" encoding="utf-8"?>
+<p:sld xmlns:a="http://schemas.openxmlformats.org/drawingml/2006/main" xmlns:r="http://schemas.openxmlformats.org/officeDocument/2006/relationships" xmlns:p="http://schemas.openxmlformats.org/presentationml/2006/main">
+  <p:cSld>
+    <p:spTree>
+      <p:nvGrpSpPr>
+        <p:cNvPr id="1" name=""/>
+        <p:cNvGrpSpPr/>
+        <p:nvPr/>
+      </p:nvGrpSpPr>
+      <p:grpSpPr>
+        <a:xfrm>
+          <a:off x="0" y="0"/>
+          <a:ext cx="0" cy="0"/>
+          <a:chOff x="0" y="0"/>
+          <a:chExt cx="0" cy="0"/>
+        </a:xfrm>
+      </p:grpSpPr>
+      <p:sp>
+        <p:nvSpPr>
+          <p:cNvPr id="35" name="Frihandsfigur: Form 34">
+            <a:extLst>
+              <a:ext uri="{FF2B5EF4-FFF2-40B4-BE49-F238E27FC236}">
+                <a16:creationId xmlns:a16="http://schemas.microsoft.com/office/drawing/2014/main" id="{A22A6649-1A1E-44D7-8633-4AA1879AFB83}"/>
+              </a:ext>
+            </a:extLst>
+          </p:cNvPr>
+          <p:cNvSpPr/>
+          <p:nvPr/>
+        </p:nvSpPr>
+        <p:spPr>
+          <a:xfrm>
+            <a:off x="2773422" y="1436165"/>
+            <a:ext cx="1179226" cy="642026"/>
+          </a:xfrm>
+          <a:custGeom>
+            <a:avLst/>
+            <a:gdLst>
+              <a:gd name="connsiteX0" fmla="*/ 173477 w 1110575"/>
+              <a:gd name="connsiteY0" fmla="*/ 0 h 642026"/>
+              <a:gd name="connsiteX1" fmla="*/ 184826 w 1110575"/>
+              <a:gd name="connsiteY1" fmla="*/ 2117 h 642026"/>
+              <a:gd name="connsiteX2" fmla="*/ 184826 w 1110575"/>
+              <a:gd name="connsiteY2" fmla="*/ 0 h 642026"/>
+              <a:gd name="connsiteX3" fmla="*/ 924128 w 1110575"/>
+              <a:gd name="connsiteY3" fmla="*/ 0 h 642026"/>
+              <a:gd name="connsiteX4" fmla="*/ 924128 w 1110575"/>
+              <a:gd name="connsiteY4" fmla="*/ 2420 h 642026"/>
+              <a:gd name="connsiteX5" fmla="*/ 937098 w 1110575"/>
+              <a:gd name="connsiteY5" fmla="*/ 0 h 642026"/>
+              <a:gd name="connsiteX6" fmla="*/ 1110575 w 1110575"/>
+              <a:gd name="connsiteY6" fmla="*/ 321013 h 642026"/>
+              <a:gd name="connsiteX7" fmla="*/ 937098 w 1110575"/>
+              <a:gd name="connsiteY7" fmla="*/ 642026 h 642026"/>
+              <a:gd name="connsiteX8" fmla="*/ 924128 w 1110575"/>
+              <a:gd name="connsiteY8" fmla="*/ 639607 h 642026"/>
+              <a:gd name="connsiteX9" fmla="*/ 924128 w 1110575"/>
+              <a:gd name="connsiteY9" fmla="*/ 642026 h 642026"/>
+              <a:gd name="connsiteX10" fmla="*/ 184826 w 1110575"/>
+              <a:gd name="connsiteY10" fmla="*/ 642026 h 642026"/>
+              <a:gd name="connsiteX11" fmla="*/ 184826 w 1110575"/>
+              <a:gd name="connsiteY11" fmla="*/ 639909 h 642026"/>
+              <a:gd name="connsiteX12" fmla="*/ 173477 w 1110575"/>
+              <a:gd name="connsiteY12" fmla="*/ 642026 h 642026"/>
+              <a:gd name="connsiteX13" fmla="*/ 0 w 1110575"/>
+              <a:gd name="connsiteY13" fmla="*/ 321013 h 642026"/>
+              <a:gd name="connsiteX14" fmla="*/ 173477 w 1110575"/>
+              <a:gd name="connsiteY14" fmla="*/ 0 h 642026"/>
+            </a:gdLst>
+            <a:ahLst/>
+            <a:cxnLst>
+              <a:cxn ang="0">
+                <a:pos x="connsiteX0" y="connsiteY0"/>
+              </a:cxn>
+              <a:cxn ang="0">
+                <a:pos x="connsiteX1" y="connsiteY1"/>
+              </a:cxn>
+              <a:cxn ang="0">
+                <a:pos x="connsiteX2" y="connsiteY2"/>
+              </a:cxn>
+              <a:cxn ang="0">
+                <a:pos x="connsiteX3" y="connsiteY3"/>
+              </a:cxn>
+              <a:cxn ang="0">
+                <a:pos x="connsiteX4" y="connsiteY4"/>
+              </a:cxn>
+              <a:cxn ang="0">
+                <a:pos x="connsiteX5" y="connsiteY5"/>
+              </a:cxn>
+              <a:cxn ang="0">
+                <a:pos x="connsiteX6" y="connsiteY6"/>
+              </a:cxn>
+              <a:cxn ang="0">
+                <a:pos x="connsiteX7" y="connsiteY7"/>
+              </a:cxn>
+              <a:cxn ang="0">
+                <a:pos x="connsiteX8" y="connsiteY8"/>
+              </a:cxn>
+              <a:cxn ang="0">
+                <a:pos x="connsiteX9" y="connsiteY9"/>
+              </a:cxn>
+              <a:cxn ang="0">
+                <a:pos x="connsiteX10" y="connsiteY10"/>
+              </a:cxn>
+              <a:cxn ang="0">
+                <a:pos x="connsiteX11" y="connsiteY11"/>
+              </a:cxn>
+              <a:cxn ang="0">
+                <a:pos x="connsiteX12" y="connsiteY12"/>
+              </a:cxn>
+              <a:cxn ang="0">
+                <a:pos x="connsiteX13" y="connsiteY13"/>
+              </a:cxn>
+              <a:cxn ang="0">
+                <a:pos x="connsiteX14" y="connsiteY14"/>
+              </a:cxn>
+            </a:cxnLst>
+            <a:rect l="l" t="t" r="r" b="b"/>
+            <a:pathLst>
+              <a:path w="1110575" h="642026">
+                <a:moveTo>
+                  <a:pt x="173477" y="0"/>
+                </a:moveTo>
+                <a:lnTo>
+                  <a:pt x="184826" y="2117"/>
+                </a:lnTo>
+                <a:lnTo>
+                  <a:pt x="184826" y="0"/>
+                </a:lnTo>
+                <a:lnTo>
+                  <a:pt x="924128" y="0"/>
+                </a:lnTo>
+                <a:lnTo>
+                  <a:pt x="924128" y="2420"/>
+                </a:lnTo>
+                <a:lnTo>
+                  <a:pt x="937098" y="0"/>
+                </a:lnTo>
+                <a:cubicBezTo>
+                  <a:pt x="1032907" y="0"/>
+                  <a:pt x="1110575" y="143722"/>
+                  <a:pt x="1110575" y="321013"/>
+                </a:cubicBezTo>
+                <a:cubicBezTo>
+                  <a:pt x="1110575" y="498304"/>
+                  <a:pt x="1032907" y="642026"/>
+                  <a:pt x="937098" y="642026"/>
+                </a:cubicBezTo>
+                <a:lnTo>
+                  <a:pt x="924128" y="639607"/>
+                </a:lnTo>
+                <a:lnTo>
+                  <a:pt x="924128" y="642026"/>
+                </a:lnTo>
+                <a:lnTo>
+                  <a:pt x="184826" y="642026"/>
+                </a:lnTo>
+                <a:lnTo>
+                  <a:pt x="184826" y="639909"/>
+                </a:lnTo>
+                <a:lnTo>
+                  <a:pt x="173477" y="642026"/>
+                </a:lnTo>
+                <a:cubicBezTo>
+                  <a:pt x="77668" y="642026"/>
+                  <a:pt x="0" y="498304"/>
+                  <a:pt x="0" y="321013"/>
+                </a:cubicBezTo>
+                <a:cubicBezTo>
+                  <a:pt x="0" y="143722"/>
+                  <a:pt x="77668" y="0"/>
+                  <a:pt x="173477" y="0"/>
+                </a:cubicBezTo>
+                <a:close/>
+              </a:path>
+            </a:pathLst>
+          </a:custGeom>
+          <a:solidFill>
+            <a:schemeClr val="bg2"/>
+          </a:solidFill>
+          <a:ln w="6350">
+            <a:solidFill>
+              <a:schemeClr val="tx1"/>
+            </a:solidFill>
+          </a:ln>
+        </p:spPr>
+        <p:style>
+          <a:lnRef idx="2">
+            <a:schemeClr val="accent1">
+              <a:shade val="50000"/>
+            </a:schemeClr>
+          </a:lnRef>
+          <a:fillRef idx="1">
+            <a:schemeClr val="accent1"/>
+          </a:fillRef>
+          <a:effectRef idx="0">
+            <a:schemeClr val="accent1"/>
+          </a:effectRef>
+          <a:fontRef idx="minor">
+            <a:schemeClr val="lt1"/>
+          </a:fontRef>
+        </p:style>
+        <p:txBody>
+          <a:bodyPr wrap="square" rtlCol="0" anchor="ctr">
+            <a:noAutofit/>
+          </a:bodyPr>
+          <a:lstStyle/>
+          <a:p>
+            <a:pPr algn="ctr"/>
+            <a:endParaRPr lang="sv-SE">
+              <a:solidFill>
+                <a:schemeClr val="tx1"/>
+              </a:solidFill>
+              <a:latin typeface="Arial" panose="020B0604020202020204" pitchFamily="34" charset="0"/>
+              <a:cs typeface="Arial" panose="020B0604020202020204" pitchFamily="34" charset="0"/>
+            </a:endParaRPr>
+          </a:p>
+        </p:txBody>
+      </p:sp>
+      <p:sp>
+        <p:nvSpPr>
+          <p:cNvPr id="23" name="Rektangel 22">
+            <a:extLst>
+              <a:ext uri="{FF2B5EF4-FFF2-40B4-BE49-F238E27FC236}">
+                <a16:creationId xmlns:a16="http://schemas.microsoft.com/office/drawing/2014/main" id="{A78E574D-254C-4D38-A572-E6AB3B270233}"/>
+              </a:ext>
+            </a:extLst>
+          </p:cNvPr>
+          <p:cNvSpPr/>
+          <p:nvPr/>
+        </p:nvSpPr>
+        <p:spPr>
+          <a:xfrm>
+            <a:off x="599847" y="1324725"/>
+            <a:ext cx="1477670" cy="753466"/>
+          </a:xfrm>
+          <a:prstGeom prst="rect">
+            <a:avLst/>
+          </a:prstGeom>
+          <a:solidFill>
+            <a:schemeClr val="bg2"/>
+          </a:solidFill>
+          <a:ln w="6350">
+            <a:solidFill>
+              <a:schemeClr val="tx1"/>
+            </a:solidFill>
+          </a:ln>
+        </p:spPr>
+        <p:style>
+          <a:lnRef idx="2">
+            <a:schemeClr val="accent1">
+              <a:shade val="50000"/>
+            </a:schemeClr>
+          </a:lnRef>
+          <a:fillRef idx="1">
+            <a:schemeClr val="accent1"/>
+          </a:fillRef>
+          <a:effectRef idx="0">
+            <a:schemeClr val="accent1"/>
+          </a:effectRef>
+          <a:fontRef idx="minor">
+            <a:schemeClr val="lt1"/>
+          </a:fontRef>
+        </p:style>
+        <p:txBody>
+          <a:bodyPr wrap="square" rtlCol="0" anchor="ctr">
+            <a:noAutofit/>
+          </a:bodyPr>
+          <a:lstStyle/>
+          <a:p>
+            <a:pPr algn="ctr"/>
+            <a:endParaRPr lang="sv-SE">
+              <a:solidFill>
+                <a:schemeClr val="tx1"/>
+              </a:solidFill>
+              <a:latin typeface="Arial" panose="020B0604020202020204" pitchFamily="34" charset="0"/>
+              <a:cs typeface="Arial" panose="020B0604020202020204" pitchFamily="34" charset="0"/>
+            </a:endParaRPr>
+          </a:p>
+        </p:txBody>
+      </p:sp>
+      <p:sp>
+        <p:nvSpPr>
+          <p:cNvPr id="25" name="textruta 24">
+            <a:extLst>
+              <a:ext uri="{FF2B5EF4-FFF2-40B4-BE49-F238E27FC236}">
+                <a16:creationId xmlns:a16="http://schemas.microsoft.com/office/drawing/2014/main" id="{A40F5C39-1E22-4DEB-9935-B09359B9726A}"/>
+              </a:ext>
+            </a:extLst>
+          </p:cNvPr>
+          <p:cNvSpPr txBox="1"/>
+          <p:nvPr/>
+        </p:nvSpPr>
+        <p:spPr>
+          <a:xfrm>
+            <a:off x="2897780" y="384904"/>
+            <a:ext cx="1054868" cy="369332"/>
+          </a:xfrm>
+          <a:prstGeom prst="rect">
+            <a:avLst/>
+          </a:prstGeom>
+          <a:noFill/>
+        </p:spPr>
+        <p:txBody>
+          <a:bodyPr wrap="square" rtlCol="0">
+            <a:spAutoFit/>
+          </a:bodyPr>
+          <a:lstStyle/>
+          <a:p>
+            <a:pPr algn="ctr"/>
+            <a:r>
+              <a:rPr lang="sv-SE" dirty="0" err="1">
+                <a:latin typeface="Arial" panose="020B0604020202020204" pitchFamily="34" charset="0"/>
+                <a:cs typeface="Arial" panose="020B0604020202020204" pitchFamily="34" charset="0"/>
+              </a:rPr>
+              <a:t>Context</a:t>
+            </a:r>
+            <a:endParaRPr lang="sv-SE" dirty="0">
+              <a:latin typeface="Arial" panose="020B0604020202020204" pitchFamily="34" charset="0"/>
+              <a:cs typeface="Arial" panose="020B0604020202020204" pitchFamily="34" charset="0"/>
+            </a:endParaRPr>
+          </a:p>
+        </p:txBody>
+      </p:sp>
+      <p:sp>
+        <p:nvSpPr>
+          <p:cNvPr id="39" name="textruta 38">
+            <a:extLst>
+              <a:ext uri="{FF2B5EF4-FFF2-40B4-BE49-F238E27FC236}">
+                <a16:creationId xmlns:a16="http://schemas.microsoft.com/office/drawing/2014/main" id="{0EB5CE18-62C2-4CFA-8E32-CB3706B2FE1A}"/>
+              </a:ext>
+            </a:extLst>
+          </p:cNvPr>
+          <p:cNvSpPr txBox="1"/>
+          <p:nvPr/>
+        </p:nvSpPr>
+        <p:spPr>
+          <a:xfrm>
+            <a:off x="752726" y="329184"/>
+            <a:ext cx="1054868" cy="369332"/>
+          </a:xfrm>
+          <a:prstGeom prst="rect">
+            <a:avLst/>
+          </a:prstGeom>
+          <a:noFill/>
+        </p:spPr>
+        <p:txBody>
+          <a:bodyPr wrap="square" rtlCol="0">
+            <a:spAutoFit/>
+          </a:bodyPr>
+          <a:lstStyle/>
+          <a:p>
+            <a:pPr algn="ctr"/>
+            <a:r>
+              <a:rPr lang="sv-SE" dirty="0" err="1">
+                <a:latin typeface="Arial" panose="020B0604020202020204" pitchFamily="34" charset="0"/>
+                <a:cs typeface="Arial" panose="020B0604020202020204" pitchFamily="34" charset="0"/>
+              </a:rPr>
+              <a:t>Goal</a:t>
+            </a:r>
+            <a:endParaRPr lang="sv-SE" dirty="0">
+              <a:latin typeface="Arial" panose="020B0604020202020204" pitchFamily="34" charset="0"/>
+              <a:cs typeface="Arial" panose="020B0604020202020204" pitchFamily="34" charset="0"/>
+            </a:endParaRPr>
+          </a:p>
+        </p:txBody>
+      </p:sp>
+      <p:sp>
+        <p:nvSpPr>
+          <p:cNvPr id="40" name="textruta 39">
+            <a:extLst>
+              <a:ext uri="{FF2B5EF4-FFF2-40B4-BE49-F238E27FC236}">
+                <a16:creationId xmlns:a16="http://schemas.microsoft.com/office/drawing/2014/main" id="{77894DE1-716F-4D1E-9BF3-1114DC982193}"/>
+              </a:ext>
+            </a:extLst>
+          </p:cNvPr>
+          <p:cNvSpPr txBox="1"/>
+          <p:nvPr/>
+        </p:nvSpPr>
+        <p:spPr>
+          <a:xfrm>
+            <a:off x="5041132" y="329184"/>
+            <a:ext cx="1054868" cy="369332"/>
+          </a:xfrm>
+          <a:prstGeom prst="rect">
+            <a:avLst/>
+          </a:prstGeom>
+          <a:noFill/>
+        </p:spPr>
+        <p:txBody>
+          <a:bodyPr wrap="square" rtlCol="0">
+            <a:spAutoFit/>
+          </a:bodyPr>
+          <a:lstStyle/>
+          <a:p>
+            <a:pPr algn="ctr"/>
+            <a:r>
+              <a:rPr lang="sv-SE" dirty="0">
+                <a:latin typeface="Arial" panose="020B0604020202020204" pitchFamily="34" charset="0"/>
+                <a:cs typeface="Arial" panose="020B0604020202020204" pitchFamily="34" charset="0"/>
+              </a:rPr>
+              <a:t>Solution</a:t>
+            </a:r>
+          </a:p>
+        </p:txBody>
+      </p:sp>
+      <p:sp>
+        <p:nvSpPr>
+          <p:cNvPr id="41" name="textruta 40">
+            <a:extLst>
+              <a:ext uri="{FF2B5EF4-FFF2-40B4-BE49-F238E27FC236}">
+                <a16:creationId xmlns:a16="http://schemas.microsoft.com/office/drawing/2014/main" id="{E0CEA25B-340A-414F-ABB1-075641B781E9}"/>
+              </a:ext>
+            </a:extLst>
+          </p:cNvPr>
+          <p:cNvSpPr txBox="1"/>
+          <p:nvPr/>
+        </p:nvSpPr>
+        <p:spPr>
+          <a:xfrm>
+            <a:off x="6528333" y="329184"/>
+            <a:ext cx="1054868" cy="369332"/>
+          </a:xfrm>
+          <a:prstGeom prst="rect">
+            <a:avLst/>
+          </a:prstGeom>
+          <a:noFill/>
+        </p:spPr>
+        <p:txBody>
+          <a:bodyPr wrap="square" rtlCol="0">
+            <a:spAutoFit/>
+          </a:bodyPr>
+          <a:lstStyle/>
+          <a:p>
+            <a:pPr algn="ctr"/>
+            <a:r>
+              <a:rPr lang="sv-SE" dirty="0" err="1">
+                <a:latin typeface="Arial" panose="020B0604020202020204" pitchFamily="34" charset="0"/>
+                <a:cs typeface="Arial" panose="020B0604020202020204" pitchFamily="34" charset="0"/>
+              </a:rPr>
+              <a:t>Strategy</a:t>
+            </a:r>
+            <a:endParaRPr lang="sv-SE" dirty="0">
+              <a:latin typeface="Arial" panose="020B0604020202020204" pitchFamily="34" charset="0"/>
+              <a:cs typeface="Arial" panose="020B0604020202020204" pitchFamily="34" charset="0"/>
+            </a:endParaRPr>
+          </a:p>
+        </p:txBody>
+      </p:sp>
+      <p:sp>
+        <p:nvSpPr>
+          <p:cNvPr id="27" name="Ellips 26">
+            <a:extLst>
+              <a:ext uri="{FF2B5EF4-FFF2-40B4-BE49-F238E27FC236}">
+                <a16:creationId xmlns:a16="http://schemas.microsoft.com/office/drawing/2014/main" id="{23F4DD7D-3EE2-4F26-86D2-BF08A0784DF3}"/>
+              </a:ext>
+            </a:extLst>
+          </p:cNvPr>
+          <p:cNvSpPr/>
+          <p:nvPr/>
+        </p:nvSpPr>
+        <p:spPr>
+          <a:xfrm>
+            <a:off x="5041132" y="1255482"/>
+            <a:ext cx="980237" cy="877150"/>
+          </a:xfrm>
+          <a:prstGeom prst="ellipse">
+            <a:avLst/>
+          </a:prstGeom>
+          <a:solidFill>
+            <a:schemeClr val="bg2"/>
+          </a:solidFill>
+          <a:ln w="6350">
+            <a:solidFill>
+              <a:schemeClr val="tx1"/>
+            </a:solidFill>
+          </a:ln>
+        </p:spPr>
+        <p:style>
+          <a:lnRef idx="2">
+            <a:schemeClr val="accent1">
+              <a:shade val="50000"/>
+            </a:schemeClr>
+          </a:lnRef>
+          <a:fillRef idx="1">
+            <a:schemeClr val="accent1"/>
+          </a:fillRef>
+          <a:effectRef idx="0">
+            <a:schemeClr val="accent1"/>
+          </a:effectRef>
+          <a:fontRef idx="minor">
+            <a:schemeClr val="lt1"/>
+          </a:fontRef>
+        </p:style>
+        <p:txBody>
+          <a:bodyPr wrap="square" rtlCol="0" anchor="ctr">
+            <a:noAutofit/>
+          </a:bodyPr>
+          <a:lstStyle/>
+          <a:p>
+            <a:pPr algn="ctr"/>
+            <a:endParaRPr lang="sv-SE">
+              <a:solidFill>
+                <a:schemeClr val="tx1"/>
+              </a:solidFill>
+              <a:latin typeface="Arial" panose="020B0604020202020204" pitchFamily="34" charset="0"/>
+              <a:cs typeface="Arial" panose="020B0604020202020204" pitchFamily="34" charset="0"/>
+            </a:endParaRPr>
+          </a:p>
+        </p:txBody>
+      </p:sp>
+      <p:sp>
+        <p:nvSpPr>
+          <p:cNvPr id="31" name="Parallellogram 30">
+            <a:extLst>
+              <a:ext uri="{FF2B5EF4-FFF2-40B4-BE49-F238E27FC236}">
+                <a16:creationId xmlns:a16="http://schemas.microsoft.com/office/drawing/2014/main" id="{2383F2C3-93EE-4F76-9F14-71689081DC72}"/>
+              </a:ext>
+            </a:extLst>
+          </p:cNvPr>
+          <p:cNvSpPr/>
+          <p:nvPr/>
+        </p:nvSpPr>
+        <p:spPr>
+          <a:xfrm>
+            <a:off x="6153556" y="1436165"/>
+            <a:ext cx="1623975" cy="642026"/>
+          </a:xfrm>
+          <a:prstGeom prst="parallelogram">
+            <a:avLst/>
+          </a:prstGeom>
+          <a:solidFill>
+            <a:schemeClr val="bg2"/>
+          </a:solidFill>
+          <a:ln w="6350">
+            <a:solidFill>
+              <a:schemeClr val="tx1"/>
+            </a:solidFill>
+          </a:ln>
+        </p:spPr>
+        <p:style>
+          <a:lnRef idx="2">
+            <a:schemeClr val="accent1">
+              <a:shade val="50000"/>
+            </a:schemeClr>
+          </a:lnRef>
+          <a:fillRef idx="1">
+            <a:schemeClr val="accent1"/>
+          </a:fillRef>
+          <a:effectRef idx="0">
+            <a:schemeClr val="accent1"/>
+          </a:effectRef>
+          <a:fontRef idx="minor">
+            <a:schemeClr val="lt1"/>
+          </a:fontRef>
+        </p:style>
+        <p:txBody>
+          <a:bodyPr wrap="square" rtlCol="0" anchor="ctr">
+            <a:noAutofit/>
+          </a:bodyPr>
+          <a:lstStyle/>
+          <a:p>
+            <a:pPr algn="ctr"/>
+            <a:endParaRPr lang="sv-SE">
+              <a:solidFill>
+                <a:schemeClr val="tx1"/>
+              </a:solidFill>
+              <a:latin typeface="Arial" panose="020B0604020202020204" pitchFamily="34" charset="0"/>
+              <a:cs typeface="Arial" panose="020B0604020202020204" pitchFamily="34" charset="0"/>
+            </a:endParaRPr>
+          </a:p>
+        </p:txBody>
+      </p:sp>
+      <p:cxnSp>
+        <p:nvCxnSpPr>
+          <p:cNvPr id="37" name="Rak pilkoppling 36">
+            <a:extLst>
+              <a:ext uri="{FF2B5EF4-FFF2-40B4-BE49-F238E27FC236}">
+                <a16:creationId xmlns:a16="http://schemas.microsoft.com/office/drawing/2014/main" id="{02860F0E-E54B-41B5-A2E2-E399A7AEF7AA}"/>
+              </a:ext>
+            </a:extLst>
+          </p:cNvPr>
+          <p:cNvCxnSpPr/>
+          <p:nvPr/>
+        </p:nvCxnSpPr>
+        <p:spPr>
+          <a:xfrm>
+            <a:off x="1287476" y="4169664"/>
+            <a:ext cx="0" cy="1119225"/>
+          </a:xfrm>
+          <a:prstGeom prst="straightConnector1">
+            <a:avLst/>
+          </a:prstGeom>
+          <a:ln>
+            <a:solidFill>
+              <a:schemeClr val="tx1"/>
+            </a:solidFill>
+            <a:tailEnd type="triangle"/>
+          </a:ln>
+        </p:spPr>
+        <p:style>
+          <a:lnRef idx="1">
+            <a:schemeClr val="accent1"/>
+          </a:lnRef>
+          <a:fillRef idx="0">
+            <a:schemeClr val="accent1"/>
+          </a:fillRef>
+          <a:effectRef idx="0">
+            <a:schemeClr val="accent1"/>
+          </a:effectRef>
+          <a:fontRef idx="minor">
+            <a:schemeClr val="tx1"/>
+          </a:fontRef>
+        </p:style>
+      </p:cxnSp>
+      <p:sp>
+        <p:nvSpPr>
+          <p:cNvPr id="45" name="textruta 44">
+            <a:extLst>
+              <a:ext uri="{FF2B5EF4-FFF2-40B4-BE49-F238E27FC236}">
+                <a16:creationId xmlns:a16="http://schemas.microsoft.com/office/drawing/2014/main" id="{2F934D9E-7776-46B5-B2B3-4F90056159A2}"/>
+              </a:ext>
+            </a:extLst>
+          </p:cNvPr>
+          <p:cNvSpPr txBox="1"/>
+          <p:nvPr/>
+        </p:nvSpPr>
+        <p:spPr>
+          <a:xfrm>
+            <a:off x="490119" y="3502762"/>
+            <a:ext cx="1697126" cy="369332"/>
+          </a:xfrm>
+          <a:prstGeom prst="rect">
+            <a:avLst/>
+          </a:prstGeom>
+          <a:noFill/>
+        </p:spPr>
+        <p:txBody>
+          <a:bodyPr wrap="square" rtlCol="0">
+            <a:spAutoFit/>
+          </a:bodyPr>
+          <a:lstStyle/>
+          <a:p>
+            <a:pPr algn="ctr"/>
+            <a:r>
+              <a:rPr lang="sv-SE" dirty="0" err="1">
+                <a:latin typeface="Arial" panose="020B0604020202020204" pitchFamily="34" charset="0"/>
+                <a:cs typeface="Arial" panose="020B0604020202020204" pitchFamily="34" charset="0"/>
+              </a:rPr>
+              <a:t>SupportedBy</a:t>
+            </a:r>
+            <a:endParaRPr lang="sv-SE" dirty="0">
+              <a:latin typeface="Arial" panose="020B0604020202020204" pitchFamily="34" charset="0"/>
+              <a:cs typeface="Arial" panose="020B0604020202020204" pitchFamily="34" charset="0"/>
+            </a:endParaRPr>
+          </a:p>
+        </p:txBody>
+      </p:sp>
+      <p:sp>
+        <p:nvSpPr>
+          <p:cNvPr id="47" name="textruta 46">
+            <a:extLst>
+              <a:ext uri="{FF2B5EF4-FFF2-40B4-BE49-F238E27FC236}">
+                <a16:creationId xmlns:a16="http://schemas.microsoft.com/office/drawing/2014/main" id="{40C437CE-E9B7-49CA-B3B9-EFD64652F849}"/>
+              </a:ext>
+            </a:extLst>
+          </p:cNvPr>
+          <p:cNvSpPr txBox="1"/>
+          <p:nvPr/>
+        </p:nvSpPr>
+        <p:spPr>
+          <a:xfrm>
+            <a:off x="2514472" y="3502762"/>
+            <a:ext cx="1697126" cy="369332"/>
+          </a:xfrm>
+          <a:prstGeom prst="rect">
+            <a:avLst/>
+          </a:prstGeom>
+          <a:noFill/>
+        </p:spPr>
+        <p:txBody>
+          <a:bodyPr wrap="square" rtlCol="0">
+            <a:spAutoFit/>
+          </a:bodyPr>
+          <a:lstStyle/>
+          <a:p>
+            <a:pPr algn="ctr"/>
+            <a:r>
+              <a:rPr lang="sv-SE" dirty="0" err="1">
+                <a:latin typeface="Arial" panose="020B0604020202020204" pitchFamily="34" charset="0"/>
+                <a:cs typeface="Arial" panose="020B0604020202020204" pitchFamily="34" charset="0"/>
+              </a:rPr>
+              <a:t>InContextOf</a:t>
+            </a:r>
+            <a:endParaRPr lang="sv-SE" dirty="0">
+              <a:latin typeface="Arial" panose="020B0604020202020204" pitchFamily="34" charset="0"/>
+              <a:cs typeface="Arial" panose="020B0604020202020204" pitchFamily="34" charset="0"/>
+            </a:endParaRPr>
+          </a:p>
+        </p:txBody>
+      </p:sp>
+      <p:sp>
+        <p:nvSpPr>
+          <p:cNvPr id="43" name="Likbent triangel 42">
+            <a:extLst>
+              <a:ext uri="{FF2B5EF4-FFF2-40B4-BE49-F238E27FC236}">
+                <a16:creationId xmlns:a16="http://schemas.microsoft.com/office/drawing/2014/main" id="{AAC5A822-B991-410C-B101-D5955757B139}"/>
+              </a:ext>
+            </a:extLst>
+          </p:cNvPr>
+          <p:cNvSpPr/>
+          <p:nvPr/>
+        </p:nvSpPr>
+        <p:spPr>
+          <a:xfrm rot="10800000">
+            <a:off x="3240634" y="5164531"/>
+            <a:ext cx="175562" cy="132134"/>
+          </a:xfrm>
+          <a:prstGeom prst="triangle">
+            <a:avLst/>
+          </a:prstGeom>
+          <a:ln>
+            <a:solidFill>
+              <a:schemeClr val="tx1"/>
+            </a:solidFill>
+          </a:ln>
+        </p:spPr>
+        <p:style>
+          <a:lnRef idx="1">
+            <a:schemeClr val="accent1"/>
+          </a:lnRef>
+          <a:fillRef idx="0">
+            <a:schemeClr val="accent1"/>
+          </a:fillRef>
+          <a:effectRef idx="0">
+            <a:schemeClr val="accent1"/>
+          </a:effectRef>
+          <a:fontRef idx="minor">
+            <a:schemeClr val="tx1"/>
+          </a:fontRef>
+        </p:style>
+        <p:txBody>
+          <a:bodyPr rtlCol="0" anchor="ctr"/>
+          <a:lstStyle/>
+          <a:p>
+            <a:pPr algn="ctr"/>
+            <a:endParaRPr lang="sv-SE"/>
+          </a:p>
+        </p:txBody>
+      </p:sp>
+      <p:cxnSp>
+        <p:nvCxnSpPr>
+          <p:cNvPr id="48" name="Rak koppling 47">
+            <a:extLst>
+              <a:ext uri="{FF2B5EF4-FFF2-40B4-BE49-F238E27FC236}">
+                <a16:creationId xmlns:a16="http://schemas.microsoft.com/office/drawing/2014/main" id="{099818F3-C6A4-4783-A8BF-E0258743F48B}"/>
+              </a:ext>
+            </a:extLst>
+          </p:cNvPr>
+          <p:cNvCxnSpPr>
+            <a:stCxn id="43" idx="3"/>
+          </p:cNvCxnSpPr>
+          <p:nvPr/>
+        </p:nvCxnSpPr>
+        <p:spPr>
+          <a:xfrm flipV="1">
+            <a:off x="3328415" y="4169664"/>
+            <a:ext cx="1" cy="994867"/>
+          </a:xfrm>
+          <a:prstGeom prst="line">
+            <a:avLst/>
+          </a:prstGeom>
+          <a:ln>
+            <a:solidFill>
+              <a:schemeClr val="tx1"/>
+            </a:solidFill>
+          </a:ln>
+        </p:spPr>
+        <p:style>
+          <a:lnRef idx="1">
+            <a:schemeClr val="accent1"/>
+          </a:lnRef>
+          <a:fillRef idx="0">
+            <a:schemeClr val="accent1"/>
+          </a:fillRef>
+          <a:effectRef idx="0">
+            <a:schemeClr val="accent1"/>
+          </a:effectRef>
+          <a:fontRef idx="minor">
+            <a:schemeClr val="tx1"/>
+          </a:fontRef>
+        </p:style>
+      </p:cxnSp>
+      <p:sp>
+        <p:nvSpPr>
+          <p:cNvPr id="53" name="textruta 52">
+            <a:extLst>
+              <a:ext uri="{FF2B5EF4-FFF2-40B4-BE49-F238E27FC236}">
+                <a16:creationId xmlns:a16="http://schemas.microsoft.com/office/drawing/2014/main" id="{5B13BC3E-2101-4F3B-9D45-44C95CFC0270}"/>
+              </a:ext>
+            </a:extLst>
+          </p:cNvPr>
+          <p:cNvSpPr txBox="1"/>
+          <p:nvPr/>
+        </p:nvSpPr>
+        <p:spPr>
+          <a:xfrm>
+            <a:off x="8015534" y="329184"/>
+            <a:ext cx="1704958" cy="369332"/>
+          </a:xfrm>
+          <a:prstGeom prst="rect">
+            <a:avLst/>
+          </a:prstGeom>
+          <a:noFill/>
+        </p:spPr>
+        <p:txBody>
+          <a:bodyPr wrap="square" rtlCol="0">
+            <a:spAutoFit/>
+          </a:bodyPr>
+          <a:lstStyle/>
+          <a:p>
+            <a:pPr algn="ctr"/>
+            <a:r>
+              <a:rPr lang="sv-SE" dirty="0" err="1">
+                <a:latin typeface="Arial" panose="020B0604020202020204" pitchFamily="34" charset="0"/>
+                <a:cs typeface="Arial" panose="020B0604020202020204" pitchFamily="34" charset="0"/>
+              </a:rPr>
+              <a:t>Assumption</a:t>
+            </a:r>
+            <a:endParaRPr lang="sv-SE" dirty="0">
+              <a:latin typeface="Arial" panose="020B0604020202020204" pitchFamily="34" charset="0"/>
+              <a:cs typeface="Arial" panose="020B0604020202020204" pitchFamily="34" charset="0"/>
+            </a:endParaRPr>
+          </a:p>
+        </p:txBody>
+      </p:sp>
+      <p:sp>
+        <p:nvSpPr>
+          <p:cNvPr id="54" name="textruta 53">
+            <a:extLst>
+              <a:ext uri="{FF2B5EF4-FFF2-40B4-BE49-F238E27FC236}">
+                <a16:creationId xmlns:a16="http://schemas.microsoft.com/office/drawing/2014/main" id="{0FE35A04-3533-4601-9E08-1166DBD0341D}"/>
+              </a:ext>
+            </a:extLst>
+          </p:cNvPr>
+          <p:cNvSpPr txBox="1"/>
+          <p:nvPr/>
+        </p:nvSpPr>
+        <p:spPr>
+          <a:xfrm>
+            <a:off x="9279236" y="1893525"/>
+            <a:ext cx="367586" cy="307777"/>
+          </a:xfrm>
+          <a:prstGeom prst="rect">
+            <a:avLst/>
+          </a:prstGeom>
+          <a:noFill/>
+        </p:spPr>
+        <p:txBody>
+          <a:bodyPr wrap="square">
+            <a:spAutoFit/>
+          </a:bodyPr>
+          <a:lstStyle/>
+          <a:p>
+            <a:r>
+              <a:rPr lang="sv-SE" sz="1400" dirty="0">
+                <a:latin typeface="Arial" panose="020B0604020202020204" pitchFamily="34" charset="0"/>
+                <a:cs typeface="Arial" panose="020B0604020202020204" pitchFamily="34" charset="0"/>
+              </a:rPr>
+              <a:t>A</a:t>
+            </a:r>
+            <a:endParaRPr lang="sv-SE" sz="1400" dirty="0"/>
+          </a:p>
+        </p:txBody>
+      </p:sp>
+      <p:sp>
+        <p:nvSpPr>
+          <p:cNvPr id="56" name="textruta 55">
+            <a:extLst>
+              <a:ext uri="{FF2B5EF4-FFF2-40B4-BE49-F238E27FC236}">
+                <a16:creationId xmlns:a16="http://schemas.microsoft.com/office/drawing/2014/main" id="{65EFF899-209E-46B9-9975-B915932D78A6}"/>
+              </a:ext>
+            </a:extLst>
+          </p:cNvPr>
+          <p:cNvSpPr txBox="1"/>
+          <p:nvPr/>
+        </p:nvSpPr>
+        <p:spPr>
+          <a:xfrm>
+            <a:off x="9870345" y="329184"/>
+            <a:ext cx="1704958" cy="369332"/>
+          </a:xfrm>
+          <a:prstGeom prst="rect">
+            <a:avLst/>
+          </a:prstGeom>
+          <a:noFill/>
+        </p:spPr>
+        <p:txBody>
+          <a:bodyPr wrap="square" rtlCol="0">
+            <a:spAutoFit/>
+          </a:bodyPr>
+          <a:lstStyle/>
+          <a:p>
+            <a:pPr algn="ctr"/>
+            <a:r>
+              <a:rPr lang="sv-SE" dirty="0" err="1">
+                <a:latin typeface="Arial" panose="020B0604020202020204" pitchFamily="34" charset="0"/>
+                <a:cs typeface="Arial" panose="020B0604020202020204" pitchFamily="34" charset="0"/>
+              </a:rPr>
+              <a:t>Justification</a:t>
+            </a:r>
+            <a:endParaRPr lang="sv-SE" dirty="0">
+              <a:latin typeface="Arial" panose="020B0604020202020204" pitchFamily="34" charset="0"/>
+              <a:cs typeface="Arial" panose="020B0604020202020204" pitchFamily="34" charset="0"/>
+            </a:endParaRPr>
+          </a:p>
+        </p:txBody>
+      </p:sp>
+      <p:sp>
+        <p:nvSpPr>
+          <p:cNvPr id="57" name="textruta 56">
+            <a:extLst>
+              <a:ext uri="{FF2B5EF4-FFF2-40B4-BE49-F238E27FC236}">
+                <a16:creationId xmlns:a16="http://schemas.microsoft.com/office/drawing/2014/main" id="{6468A00D-4598-45A7-864E-9ACE9F9594C9}"/>
+              </a:ext>
+            </a:extLst>
+          </p:cNvPr>
+          <p:cNvSpPr txBox="1"/>
+          <p:nvPr/>
+        </p:nvSpPr>
+        <p:spPr>
+          <a:xfrm>
+            <a:off x="11134047" y="1893525"/>
+            <a:ext cx="367586" cy="307777"/>
+          </a:xfrm>
+          <a:prstGeom prst="rect">
+            <a:avLst/>
+          </a:prstGeom>
+          <a:noFill/>
+        </p:spPr>
+        <p:txBody>
+          <a:bodyPr wrap="square">
+            <a:spAutoFit/>
+          </a:bodyPr>
+          <a:lstStyle/>
+          <a:p>
+            <a:r>
+              <a:rPr lang="sv-SE" sz="1400" dirty="0">
+                <a:latin typeface="Arial" panose="020B0604020202020204" pitchFamily="34" charset="0"/>
+                <a:cs typeface="Arial" panose="020B0604020202020204" pitchFamily="34" charset="0"/>
+              </a:rPr>
+              <a:t>J</a:t>
+            </a:r>
+            <a:endParaRPr lang="sv-SE" sz="1400" dirty="0"/>
+          </a:p>
+        </p:txBody>
+      </p:sp>
+      <p:sp>
+        <p:nvSpPr>
+          <p:cNvPr id="58" name="Ellips 57">
+            <a:extLst>
+              <a:ext uri="{FF2B5EF4-FFF2-40B4-BE49-F238E27FC236}">
+                <a16:creationId xmlns:a16="http://schemas.microsoft.com/office/drawing/2014/main" id="{F9B7C928-A46E-4B3B-AC98-481CEFF94865}"/>
+              </a:ext>
+            </a:extLst>
+          </p:cNvPr>
+          <p:cNvSpPr/>
+          <p:nvPr/>
+        </p:nvSpPr>
+        <p:spPr>
+          <a:xfrm>
+            <a:off x="8120432" y="1016375"/>
+            <a:ext cx="1760478" cy="877150"/>
+          </a:xfrm>
+          <a:prstGeom prst="ellipse">
+            <a:avLst/>
+          </a:prstGeom>
+          <a:solidFill>
+            <a:schemeClr val="bg2"/>
+          </a:solidFill>
+          <a:ln w="6350">
+            <a:solidFill>
+              <a:schemeClr val="tx1"/>
+            </a:solidFill>
+          </a:ln>
+        </p:spPr>
+        <p:style>
+          <a:lnRef idx="2">
+            <a:schemeClr val="accent1">
+              <a:shade val="50000"/>
+            </a:schemeClr>
+          </a:lnRef>
+          <a:fillRef idx="1">
+            <a:schemeClr val="accent1"/>
+          </a:fillRef>
+          <a:effectRef idx="0">
+            <a:schemeClr val="accent1"/>
+          </a:effectRef>
+          <a:fontRef idx="minor">
+            <a:schemeClr val="lt1"/>
+          </a:fontRef>
+        </p:style>
+        <p:txBody>
+          <a:bodyPr wrap="square" rtlCol="0" anchor="ctr">
+            <a:noAutofit/>
+          </a:bodyPr>
+          <a:lstStyle/>
+          <a:p>
+            <a:pPr algn="ctr"/>
+            <a:endParaRPr lang="sv-SE">
+              <a:solidFill>
+                <a:schemeClr val="tx1"/>
+              </a:solidFill>
+              <a:latin typeface="Arial" panose="020B0604020202020204" pitchFamily="34" charset="0"/>
+              <a:cs typeface="Arial" panose="020B0604020202020204" pitchFamily="34" charset="0"/>
+            </a:endParaRPr>
+          </a:p>
+        </p:txBody>
+      </p:sp>
+      <p:sp>
+        <p:nvSpPr>
+          <p:cNvPr id="59" name="Ellips 58">
+            <a:extLst>
+              <a:ext uri="{FF2B5EF4-FFF2-40B4-BE49-F238E27FC236}">
+                <a16:creationId xmlns:a16="http://schemas.microsoft.com/office/drawing/2014/main" id="{9331F2C3-7F74-4EEC-A7C3-4D7A24D061D2}"/>
+              </a:ext>
+            </a:extLst>
+          </p:cNvPr>
+          <p:cNvSpPr/>
+          <p:nvPr/>
+        </p:nvSpPr>
+        <p:spPr>
+          <a:xfrm>
+            <a:off x="10075240" y="1016375"/>
+            <a:ext cx="1760478" cy="877150"/>
+          </a:xfrm>
+          <a:prstGeom prst="ellipse">
+            <a:avLst/>
+          </a:prstGeom>
+          <a:solidFill>
+            <a:schemeClr val="bg2"/>
+          </a:solidFill>
+          <a:ln w="6350">
+            <a:solidFill>
+              <a:schemeClr val="tx1"/>
+            </a:solidFill>
+          </a:ln>
+        </p:spPr>
+        <p:style>
+          <a:lnRef idx="2">
+            <a:schemeClr val="accent1">
+              <a:shade val="50000"/>
+            </a:schemeClr>
+          </a:lnRef>
+          <a:fillRef idx="1">
+            <a:schemeClr val="accent1"/>
+          </a:fillRef>
+          <a:effectRef idx="0">
+            <a:schemeClr val="accent1"/>
+          </a:effectRef>
+          <a:fontRef idx="minor">
+            <a:schemeClr val="lt1"/>
+          </a:fontRef>
+        </p:style>
+        <p:txBody>
+          <a:bodyPr wrap="square" rtlCol="0" anchor="ctr">
+            <a:noAutofit/>
+          </a:bodyPr>
+          <a:lstStyle/>
+          <a:p>
+            <a:pPr algn="ctr"/>
+            <a:endParaRPr lang="sv-SE">
+              <a:solidFill>
+                <a:schemeClr val="tx1"/>
+              </a:solidFill>
+              <a:latin typeface="Arial" panose="020B0604020202020204" pitchFamily="34" charset="0"/>
+              <a:cs typeface="Arial" panose="020B0604020202020204" pitchFamily="34" charset="0"/>
+            </a:endParaRPr>
+          </a:p>
+        </p:txBody>
+      </p:sp>
+    </p:spTree>
+    <p:extLst>
+      <p:ext uri="{BB962C8B-B14F-4D97-AF65-F5344CB8AC3E}">
+        <p14:creationId xmlns:p14="http://schemas.microsoft.com/office/powerpoint/2010/main" val="2969718579"/>
+      </p:ext>
+    </p:extLst>
+  </p:cSld>
+  <p:clrMapOvr>
+    <a:masterClrMapping/>
+  </p:clrMapOvr>
+</p:sld>
+</file>
+
+<file path=ppt/slides/slide3.xml><?xml version="1.0" encoding="utf-8"?>
+<p:sld xmlns:a="http://schemas.openxmlformats.org/drawingml/2006/main" xmlns:r="http://schemas.openxmlformats.org/officeDocument/2006/relationships" xmlns:p="http://schemas.openxmlformats.org/presentationml/2006/main">
+  <p:cSld>
+    <p:spTree>
+      <p:nvGrpSpPr>
+        <p:cNvPr id="1" name=""/>
+        <p:cNvGrpSpPr/>
+        <p:nvPr/>
+      </p:nvGrpSpPr>
+      <p:grpSpPr>
+        <a:xfrm>
+          <a:off x="0" y="0"/>
+          <a:ext cx="0" cy="0"/>
+          <a:chOff x="0" y="0"/>
+          <a:chExt cx="0" cy="0"/>
+        </a:xfrm>
+      </p:grpSpPr>
+      <p:sp>
+        <p:nvSpPr>
+          <p:cNvPr id="35" name="Frihandsfigur: Form 34">
+            <a:extLst>
+              <a:ext uri="{FF2B5EF4-FFF2-40B4-BE49-F238E27FC236}">
+                <a16:creationId xmlns:a16="http://schemas.microsoft.com/office/drawing/2014/main" id="{A22A6649-1A1E-44D7-8633-4AA1879AFB83}"/>
+              </a:ext>
+            </a:extLst>
+          </p:cNvPr>
+          <p:cNvSpPr/>
+          <p:nvPr/>
+        </p:nvSpPr>
+        <p:spPr>
+          <a:xfrm>
+            <a:off x="3073345" y="1194763"/>
+            <a:ext cx="1179226" cy="714503"/>
+          </a:xfrm>
+          <a:custGeom>
+            <a:avLst/>
+            <a:gdLst>
+              <a:gd name="connsiteX0" fmla="*/ 173477 w 1110575"/>
+              <a:gd name="connsiteY0" fmla="*/ 0 h 642026"/>
+              <a:gd name="connsiteX1" fmla="*/ 184826 w 1110575"/>
+              <a:gd name="connsiteY1" fmla="*/ 2117 h 642026"/>
+              <a:gd name="connsiteX2" fmla="*/ 184826 w 1110575"/>
+              <a:gd name="connsiteY2" fmla="*/ 0 h 642026"/>
+              <a:gd name="connsiteX3" fmla="*/ 924128 w 1110575"/>
+              <a:gd name="connsiteY3" fmla="*/ 0 h 642026"/>
+              <a:gd name="connsiteX4" fmla="*/ 924128 w 1110575"/>
+              <a:gd name="connsiteY4" fmla="*/ 2420 h 642026"/>
+              <a:gd name="connsiteX5" fmla="*/ 937098 w 1110575"/>
+              <a:gd name="connsiteY5" fmla="*/ 0 h 642026"/>
+              <a:gd name="connsiteX6" fmla="*/ 1110575 w 1110575"/>
+              <a:gd name="connsiteY6" fmla="*/ 321013 h 642026"/>
+              <a:gd name="connsiteX7" fmla="*/ 937098 w 1110575"/>
+              <a:gd name="connsiteY7" fmla="*/ 642026 h 642026"/>
+              <a:gd name="connsiteX8" fmla="*/ 924128 w 1110575"/>
+              <a:gd name="connsiteY8" fmla="*/ 639607 h 642026"/>
+              <a:gd name="connsiteX9" fmla="*/ 924128 w 1110575"/>
+              <a:gd name="connsiteY9" fmla="*/ 642026 h 642026"/>
+              <a:gd name="connsiteX10" fmla="*/ 184826 w 1110575"/>
+              <a:gd name="connsiteY10" fmla="*/ 642026 h 642026"/>
+              <a:gd name="connsiteX11" fmla="*/ 184826 w 1110575"/>
+              <a:gd name="connsiteY11" fmla="*/ 639909 h 642026"/>
+              <a:gd name="connsiteX12" fmla="*/ 173477 w 1110575"/>
+              <a:gd name="connsiteY12" fmla="*/ 642026 h 642026"/>
+              <a:gd name="connsiteX13" fmla="*/ 0 w 1110575"/>
+              <a:gd name="connsiteY13" fmla="*/ 321013 h 642026"/>
+              <a:gd name="connsiteX14" fmla="*/ 173477 w 1110575"/>
+              <a:gd name="connsiteY14" fmla="*/ 0 h 642026"/>
+            </a:gdLst>
+            <a:ahLst/>
+            <a:cxnLst>
+              <a:cxn ang="0">
+                <a:pos x="connsiteX0" y="connsiteY0"/>
+              </a:cxn>
+              <a:cxn ang="0">
+                <a:pos x="connsiteX1" y="connsiteY1"/>
+              </a:cxn>
+              <a:cxn ang="0">
+                <a:pos x="connsiteX2" y="connsiteY2"/>
+              </a:cxn>
+              <a:cxn ang="0">
+                <a:pos x="connsiteX3" y="connsiteY3"/>
+              </a:cxn>
+              <a:cxn ang="0">
+                <a:pos x="connsiteX4" y="connsiteY4"/>
+              </a:cxn>
+              <a:cxn ang="0">
+                <a:pos x="connsiteX5" y="connsiteY5"/>
+              </a:cxn>
+              <a:cxn ang="0">
+                <a:pos x="connsiteX6" y="connsiteY6"/>
+              </a:cxn>
+              <a:cxn ang="0">
+                <a:pos x="connsiteX7" y="connsiteY7"/>
+              </a:cxn>
+              <a:cxn ang="0">
+                <a:pos x="connsiteX8" y="connsiteY8"/>
+              </a:cxn>
+              <a:cxn ang="0">
+                <a:pos x="connsiteX9" y="connsiteY9"/>
+              </a:cxn>
+              <a:cxn ang="0">
+                <a:pos x="connsiteX10" y="connsiteY10"/>
+              </a:cxn>
+              <a:cxn ang="0">
+                <a:pos x="connsiteX11" y="connsiteY11"/>
+              </a:cxn>
+              <a:cxn ang="0">
+                <a:pos x="connsiteX12" y="connsiteY12"/>
+              </a:cxn>
+              <a:cxn ang="0">
+                <a:pos x="connsiteX13" y="connsiteY13"/>
+              </a:cxn>
+              <a:cxn ang="0">
+                <a:pos x="connsiteX14" y="connsiteY14"/>
+              </a:cxn>
+            </a:cxnLst>
+            <a:rect l="l" t="t" r="r" b="b"/>
+            <a:pathLst>
+              <a:path w="1110575" h="642026">
+                <a:moveTo>
+                  <a:pt x="173477" y="0"/>
+                </a:moveTo>
+                <a:lnTo>
+                  <a:pt x="184826" y="2117"/>
+                </a:lnTo>
+                <a:lnTo>
+                  <a:pt x="184826" y="0"/>
+                </a:lnTo>
+                <a:lnTo>
+                  <a:pt x="924128" y="0"/>
+                </a:lnTo>
+                <a:lnTo>
+                  <a:pt x="924128" y="2420"/>
+                </a:lnTo>
+                <a:lnTo>
+                  <a:pt x="937098" y="0"/>
+                </a:lnTo>
+                <a:cubicBezTo>
+                  <a:pt x="1032907" y="0"/>
+                  <a:pt x="1110575" y="143722"/>
+                  <a:pt x="1110575" y="321013"/>
+                </a:cubicBezTo>
+                <a:cubicBezTo>
+                  <a:pt x="1110575" y="498304"/>
+                  <a:pt x="1032907" y="642026"/>
+                  <a:pt x="937098" y="642026"/>
+                </a:cubicBezTo>
+                <a:lnTo>
+                  <a:pt x="924128" y="639607"/>
+                </a:lnTo>
+                <a:lnTo>
+                  <a:pt x="924128" y="642026"/>
+                </a:lnTo>
+                <a:lnTo>
+                  <a:pt x="184826" y="642026"/>
+                </a:lnTo>
+                <a:lnTo>
+                  <a:pt x="184826" y="639909"/>
+                </a:lnTo>
+                <a:lnTo>
+                  <a:pt x="173477" y="642026"/>
+                </a:lnTo>
+                <a:cubicBezTo>
+                  <a:pt x="77668" y="642026"/>
+                  <a:pt x="0" y="498304"/>
+                  <a:pt x="0" y="321013"/>
+                </a:cubicBezTo>
+                <a:cubicBezTo>
+                  <a:pt x="0" y="143722"/>
+                  <a:pt x="77668" y="0"/>
+                  <a:pt x="173477" y="0"/>
+                </a:cubicBezTo>
+                <a:close/>
+              </a:path>
+            </a:pathLst>
+          </a:custGeom>
+          <a:solidFill>
+            <a:schemeClr val="bg2"/>
+          </a:solidFill>
+          <a:ln w="6350">
+            <a:solidFill>
+              <a:schemeClr val="tx1"/>
+            </a:solidFill>
+          </a:ln>
+        </p:spPr>
+        <p:style>
+          <a:lnRef idx="2">
+            <a:schemeClr val="accent1">
+              <a:shade val="50000"/>
+            </a:schemeClr>
+          </a:lnRef>
+          <a:fillRef idx="1">
+            <a:schemeClr val="accent1"/>
+          </a:fillRef>
+          <a:effectRef idx="0">
+            <a:schemeClr val="accent1"/>
+          </a:effectRef>
+          <a:fontRef idx="minor">
+            <a:schemeClr val="lt1"/>
+          </a:fontRef>
+        </p:style>
+        <p:txBody>
+          <a:bodyPr wrap="square" rtlCol="0" anchor="ctr">
+            <a:noAutofit/>
+          </a:bodyPr>
+          <a:lstStyle/>
+          <a:p>
+            <a:pPr algn="ctr"/>
+            <a:r>
+              <a:rPr lang="sv-SE" sz="1000" b="1" dirty="0">
+                <a:solidFill>
+                  <a:schemeClr val="tx1"/>
+                </a:solidFill>
+                <a:latin typeface="Arial" panose="020B0604020202020204" pitchFamily="34" charset="0"/>
+                <a:cs typeface="Arial" panose="020B0604020202020204" pitchFamily="34" charset="0"/>
+              </a:rPr>
+              <a:t>C1.1</a:t>
+            </a:r>
+          </a:p>
+          <a:p>
+            <a:pPr algn="ctr"/>
+            <a:r>
+              <a:rPr lang="sv-SE" sz="1000" dirty="0" err="1">
+                <a:solidFill>
+                  <a:schemeClr val="tx1"/>
+                </a:solidFill>
+                <a:latin typeface="Arial" panose="020B0604020202020204" pitchFamily="34" charset="0"/>
+                <a:cs typeface="Arial" panose="020B0604020202020204" pitchFamily="34" charset="0"/>
+              </a:rPr>
+              <a:t>Description</a:t>
+            </a:r>
+            <a:r>
+              <a:rPr lang="sv-SE" sz="1000" dirty="0">
+                <a:solidFill>
+                  <a:schemeClr val="tx1"/>
+                </a:solidFill>
+                <a:latin typeface="Arial" panose="020B0604020202020204" pitchFamily="34" charset="0"/>
+                <a:cs typeface="Arial" panose="020B0604020202020204" pitchFamily="34" charset="0"/>
+              </a:rPr>
+              <a:t> of the ODD.</a:t>
+            </a:r>
+          </a:p>
+        </p:txBody>
+      </p:sp>
+      <p:sp>
+        <p:nvSpPr>
+          <p:cNvPr id="23" name="Rektangel 22">
+            <a:extLst>
+              <a:ext uri="{FF2B5EF4-FFF2-40B4-BE49-F238E27FC236}">
+                <a16:creationId xmlns:a16="http://schemas.microsoft.com/office/drawing/2014/main" id="{A78E574D-254C-4D38-A572-E6AB3B270233}"/>
+              </a:ext>
+            </a:extLst>
+          </p:cNvPr>
+          <p:cNvSpPr/>
+          <p:nvPr/>
+        </p:nvSpPr>
+        <p:spPr>
+          <a:xfrm>
+            <a:off x="5232422" y="2168957"/>
+            <a:ext cx="1624741" cy="975654"/>
+          </a:xfrm>
+          <a:prstGeom prst="rect">
+            <a:avLst/>
+          </a:prstGeom>
+          <a:solidFill>
+            <a:schemeClr val="bg2"/>
+          </a:solidFill>
+          <a:ln w="6350">
+            <a:solidFill>
+              <a:schemeClr val="tx1"/>
+            </a:solidFill>
+          </a:ln>
+        </p:spPr>
+        <p:style>
+          <a:lnRef idx="2">
+            <a:schemeClr val="accent1">
+              <a:shade val="50000"/>
+            </a:schemeClr>
+          </a:lnRef>
+          <a:fillRef idx="1">
+            <a:schemeClr val="accent1"/>
+          </a:fillRef>
+          <a:effectRef idx="0">
+            <a:schemeClr val="accent1"/>
+          </a:effectRef>
+          <a:fontRef idx="minor">
+            <a:schemeClr val="lt1"/>
+          </a:fontRef>
+        </p:style>
+        <p:txBody>
+          <a:bodyPr wrap="square" rtlCol="0" anchor="ctr">
+            <a:noAutofit/>
+          </a:bodyPr>
+          <a:lstStyle/>
+          <a:p>
+            <a:pPr algn="ctr"/>
+            <a:r>
+              <a:rPr lang="sv-SE" sz="1000" b="1" dirty="0">
+                <a:solidFill>
+                  <a:schemeClr val="tx1"/>
+                </a:solidFill>
+                <a:latin typeface="Arial" panose="020B0604020202020204" pitchFamily="34" charset="0"/>
+                <a:cs typeface="Arial" panose="020B0604020202020204" pitchFamily="34" charset="0"/>
+              </a:rPr>
+              <a:t>G1.1</a:t>
+            </a:r>
+          </a:p>
+          <a:p>
+            <a:pPr algn="ctr"/>
+            <a:r>
+              <a:rPr lang="sv-SE" sz="1000" dirty="0">
+                <a:solidFill>
+                  <a:schemeClr val="tx1"/>
+                </a:solidFill>
+                <a:latin typeface="Arial" panose="020B0604020202020204" pitchFamily="34" charset="0"/>
+                <a:cs typeface="Arial" panose="020B0604020202020204" pitchFamily="34" charset="0"/>
+              </a:rPr>
+              <a:t>The </a:t>
+            </a:r>
+            <a:r>
+              <a:rPr lang="sv-SE" sz="1000" dirty="0" err="1">
+                <a:solidFill>
+                  <a:schemeClr val="tx1"/>
+                </a:solidFill>
+                <a:latin typeface="Arial" panose="020B0604020202020204" pitchFamily="34" charset="0"/>
+                <a:cs typeface="Arial" panose="020B0604020202020204" pitchFamily="34" charset="0"/>
+              </a:rPr>
+              <a:t>object</a:t>
+            </a:r>
+            <a:r>
+              <a:rPr lang="sv-SE" sz="1000" dirty="0">
+                <a:solidFill>
+                  <a:schemeClr val="tx1"/>
+                </a:solidFill>
+                <a:latin typeface="Arial" panose="020B0604020202020204" pitchFamily="34" charset="0"/>
+                <a:cs typeface="Arial" panose="020B0604020202020204" pitchFamily="34" charset="0"/>
+              </a:rPr>
+              <a:t> </a:t>
+            </a:r>
+            <a:r>
+              <a:rPr lang="sv-SE" sz="1000" dirty="0" err="1">
+                <a:solidFill>
+                  <a:schemeClr val="tx1"/>
+                </a:solidFill>
+                <a:latin typeface="Arial" panose="020B0604020202020204" pitchFamily="34" charset="0"/>
+                <a:cs typeface="Arial" panose="020B0604020202020204" pitchFamily="34" charset="0"/>
+              </a:rPr>
+              <a:t>detection</a:t>
+            </a:r>
+            <a:r>
+              <a:rPr lang="sv-SE" sz="1000" dirty="0">
+                <a:solidFill>
+                  <a:schemeClr val="tx1"/>
+                </a:solidFill>
+                <a:latin typeface="Arial" panose="020B0604020202020204" pitchFamily="34" charset="0"/>
+                <a:cs typeface="Arial" panose="020B0604020202020204" pitchFamily="34" charset="0"/>
+              </a:rPr>
+              <a:t> </a:t>
+            </a:r>
+            <a:r>
+              <a:rPr lang="sv-SE" sz="1000" dirty="0" err="1">
+                <a:solidFill>
+                  <a:schemeClr val="tx1"/>
+                </a:solidFill>
+                <a:latin typeface="Arial" panose="020B0604020202020204" pitchFamily="34" charset="0"/>
+                <a:cs typeface="Arial" panose="020B0604020202020204" pitchFamily="34" charset="0"/>
+              </a:rPr>
+              <a:t>component</a:t>
+            </a:r>
+            <a:r>
+              <a:rPr lang="sv-SE" sz="1000" dirty="0">
+                <a:solidFill>
+                  <a:schemeClr val="tx1"/>
+                </a:solidFill>
+                <a:latin typeface="Arial" panose="020B0604020202020204" pitchFamily="34" charset="0"/>
+                <a:cs typeface="Arial" panose="020B0604020202020204" pitchFamily="34" charset="0"/>
+              </a:rPr>
+              <a:t> </a:t>
+            </a:r>
+            <a:r>
+              <a:rPr lang="sv-SE" sz="1000" dirty="0" err="1">
+                <a:solidFill>
+                  <a:schemeClr val="tx1"/>
+                </a:solidFill>
+                <a:latin typeface="Arial" panose="020B0604020202020204" pitchFamily="34" charset="0"/>
+                <a:cs typeface="Arial" panose="020B0604020202020204" pitchFamily="34" charset="0"/>
+              </a:rPr>
+              <a:t>satisifes</a:t>
+            </a:r>
+            <a:r>
+              <a:rPr lang="sv-SE" sz="1000" dirty="0">
+                <a:solidFill>
+                  <a:schemeClr val="tx1"/>
+                </a:solidFill>
+                <a:latin typeface="Arial" panose="020B0604020202020204" pitchFamily="34" charset="0"/>
+                <a:cs typeface="Arial" panose="020B0604020202020204" pitchFamily="34" charset="0"/>
+              </a:rPr>
+              <a:t> </a:t>
+            </a:r>
+            <a:r>
+              <a:rPr lang="sv-SE" sz="1000" dirty="0" err="1">
+                <a:solidFill>
+                  <a:schemeClr val="tx1"/>
+                </a:solidFill>
+                <a:latin typeface="Arial" panose="020B0604020202020204" pitchFamily="34" charset="0"/>
+                <a:cs typeface="Arial" panose="020B0604020202020204" pitchFamily="34" charset="0"/>
+              </a:rPr>
+              <a:t>its</a:t>
+            </a:r>
+            <a:r>
+              <a:rPr lang="sv-SE" sz="1000" dirty="0">
+                <a:solidFill>
+                  <a:schemeClr val="tx1"/>
+                </a:solidFill>
+                <a:latin typeface="Arial" panose="020B0604020202020204" pitchFamily="34" charset="0"/>
+                <a:cs typeface="Arial" panose="020B0604020202020204" pitchFamily="34" charset="0"/>
+              </a:rPr>
+              <a:t> </a:t>
+            </a:r>
+            <a:r>
+              <a:rPr lang="sv-SE" sz="1000" dirty="0" err="1">
+                <a:solidFill>
+                  <a:schemeClr val="tx1"/>
+                </a:solidFill>
+                <a:latin typeface="Arial" panose="020B0604020202020204" pitchFamily="34" charset="0"/>
+                <a:cs typeface="Arial" panose="020B0604020202020204" pitchFamily="34" charset="0"/>
+              </a:rPr>
+              <a:t>allocated</a:t>
+            </a:r>
+            <a:r>
+              <a:rPr lang="sv-SE" sz="1000" dirty="0">
+                <a:solidFill>
+                  <a:schemeClr val="tx1"/>
+                </a:solidFill>
+                <a:latin typeface="Arial" panose="020B0604020202020204" pitchFamily="34" charset="0"/>
+                <a:cs typeface="Arial" panose="020B0604020202020204" pitchFamily="34" charset="0"/>
+              </a:rPr>
+              <a:t> system </a:t>
+            </a:r>
+            <a:r>
+              <a:rPr lang="sv-SE" sz="1000" dirty="0" err="1">
+                <a:solidFill>
+                  <a:schemeClr val="tx1"/>
+                </a:solidFill>
+                <a:latin typeface="Arial" panose="020B0604020202020204" pitchFamily="34" charset="0"/>
+                <a:cs typeface="Arial" panose="020B0604020202020204" pitchFamily="34" charset="0"/>
+              </a:rPr>
+              <a:t>safety</a:t>
+            </a:r>
+            <a:r>
+              <a:rPr lang="sv-SE" sz="1000" dirty="0">
+                <a:solidFill>
+                  <a:schemeClr val="tx1"/>
+                </a:solidFill>
+                <a:latin typeface="Arial" panose="020B0604020202020204" pitchFamily="34" charset="0"/>
+                <a:cs typeface="Arial" panose="020B0604020202020204" pitchFamily="34" charset="0"/>
+              </a:rPr>
+              <a:t> </a:t>
+            </a:r>
+            <a:r>
+              <a:rPr lang="sv-SE" sz="1000" dirty="0" err="1">
+                <a:solidFill>
+                  <a:schemeClr val="tx1"/>
+                </a:solidFill>
+                <a:latin typeface="Arial" panose="020B0604020202020204" pitchFamily="34" charset="0"/>
+                <a:cs typeface="Arial" panose="020B0604020202020204" pitchFamily="34" charset="0"/>
+              </a:rPr>
+              <a:t>requirements</a:t>
+            </a:r>
+            <a:r>
+              <a:rPr lang="sv-SE" sz="1000" dirty="0">
+                <a:solidFill>
+                  <a:schemeClr val="tx1"/>
+                </a:solidFill>
+                <a:latin typeface="Arial" panose="020B0604020202020204" pitchFamily="34" charset="0"/>
+                <a:cs typeface="Arial" panose="020B0604020202020204" pitchFamily="34" charset="0"/>
+              </a:rPr>
+              <a:t> in the ODD.</a:t>
+            </a:r>
+          </a:p>
+        </p:txBody>
+      </p:sp>
+      <p:sp>
+        <p:nvSpPr>
+          <p:cNvPr id="11" name="textruta 10">
+            <a:extLst>
+              <a:ext uri="{FF2B5EF4-FFF2-40B4-BE49-F238E27FC236}">
+                <a16:creationId xmlns:a16="http://schemas.microsoft.com/office/drawing/2014/main" id="{E6829AF8-45F6-4CA3-A98F-232890DA31FD}"/>
+              </a:ext>
+            </a:extLst>
+          </p:cNvPr>
+          <p:cNvSpPr txBox="1"/>
+          <p:nvPr/>
+        </p:nvSpPr>
+        <p:spPr>
+          <a:xfrm>
+            <a:off x="3124551" y="1194763"/>
+            <a:ext cx="470001" cy="276999"/>
+          </a:xfrm>
+          <a:prstGeom prst="rect">
+            <a:avLst/>
+          </a:prstGeom>
+          <a:noFill/>
+        </p:spPr>
+        <p:txBody>
+          <a:bodyPr wrap="square">
+            <a:spAutoFit/>
+          </a:bodyPr>
+          <a:lstStyle/>
+          <a:p>
+            <a:r>
+              <a:rPr lang="sv-SE" sz="1200" dirty="0">
+                <a:latin typeface="Arial" panose="020B0604020202020204" pitchFamily="34" charset="0"/>
+                <a:cs typeface="Arial" panose="020B0604020202020204" pitchFamily="34" charset="0"/>
+              </a:rPr>
+              <a:t>[B]</a:t>
+            </a:r>
+            <a:endParaRPr lang="sv-SE" sz="1200" dirty="0"/>
+          </a:p>
+        </p:txBody>
+      </p:sp>
+      <p:grpSp>
+        <p:nvGrpSpPr>
+          <p:cNvPr id="3" name="Grupp 2">
+            <a:extLst>
+              <a:ext uri="{FF2B5EF4-FFF2-40B4-BE49-F238E27FC236}">
+                <a16:creationId xmlns:a16="http://schemas.microsoft.com/office/drawing/2014/main" id="{13ACEA5C-6A2B-4622-B0C7-0DFB9A4AE848}"/>
+              </a:ext>
+            </a:extLst>
+          </p:cNvPr>
+          <p:cNvGrpSpPr/>
+          <p:nvPr/>
+        </p:nvGrpSpPr>
+        <p:grpSpPr>
+          <a:xfrm rot="6785621">
+            <a:off x="4621125" y="1477670"/>
+            <a:ext cx="175562" cy="1127001"/>
+            <a:chOff x="3240634" y="4169664"/>
+            <a:chExt cx="175562" cy="1127001"/>
+          </a:xfrm>
+        </p:grpSpPr>
+        <p:sp>
+          <p:nvSpPr>
+            <p:cNvPr id="12" name="Likbent triangel 11">
+              <a:extLst>
+                <a:ext uri="{FF2B5EF4-FFF2-40B4-BE49-F238E27FC236}">
+                  <a16:creationId xmlns:a16="http://schemas.microsoft.com/office/drawing/2014/main" id="{AADAEBB8-5BEE-4EB0-B0F5-090B25869184}"/>
+                </a:ext>
+              </a:extLst>
+            </p:cNvPr>
+            <p:cNvSpPr/>
+            <p:nvPr/>
+          </p:nvSpPr>
+          <p:spPr>
+            <a:xfrm rot="10800000">
+              <a:off x="3240634" y="5164531"/>
+              <a:ext cx="175562" cy="132134"/>
+            </a:xfrm>
+            <a:prstGeom prst="triangle">
+              <a:avLst/>
+            </a:prstGeom>
+            <a:ln>
+              <a:solidFill>
+                <a:schemeClr val="tx1"/>
+              </a:solidFill>
+            </a:ln>
+          </p:spPr>
+          <p:style>
+            <a:lnRef idx="1">
+              <a:schemeClr val="accent1"/>
+            </a:lnRef>
+            <a:fillRef idx="0">
+              <a:schemeClr val="accent1"/>
+            </a:fillRef>
+            <a:effectRef idx="0">
+              <a:schemeClr val="accent1"/>
+            </a:effectRef>
+            <a:fontRef idx="minor">
+              <a:schemeClr val="tx1"/>
+            </a:fontRef>
+          </p:style>
+          <p:txBody>
+            <a:bodyPr rtlCol="0" anchor="ctr"/>
+            <a:lstStyle/>
+            <a:p>
+              <a:pPr algn="ctr"/>
+              <a:endParaRPr lang="sv-SE"/>
+            </a:p>
+          </p:txBody>
+        </p:sp>
+        <p:cxnSp>
+          <p:nvCxnSpPr>
+            <p:cNvPr id="13" name="Rak koppling 12">
+              <a:extLst>
+                <a:ext uri="{FF2B5EF4-FFF2-40B4-BE49-F238E27FC236}">
+                  <a16:creationId xmlns:a16="http://schemas.microsoft.com/office/drawing/2014/main" id="{F96AB960-70ED-41E0-8F9F-EABFBD63B5E4}"/>
+                </a:ext>
+              </a:extLst>
+            </p:cNvPr>
+            <p:cNvCxnSpPr>
+              <a:stCxn id="12" idx="3"/>
+            </p:cNvCxnSpPr>
+            <p:nvPr/>
+          </p:nvCxnSpPr>
+          <p:spPr>
+            <a:xfrm flipV="1">
+              <a:off x="3328415" y="4169664"/>
+              <a:ext cx="1" cy="994867"/>
+            </a:xfrm>
+            <a:prstGeom prst="line">
+              <a:avLst/>
+            </a:prstGeom>
+            <a:ln>
+              <a:solidFill>
+                <a:schemeClr val="tx1"/>
+              </a:solidFill>
+            </a:ln>
+          </p:spPr>
+          <p:style>
+            <a:lnRef idx="1">
+              <a:schemeClr val="accent1"/>
+            </a:lnRef>
+            <a:fillRef idx="0">
+              <a:schemeClr val="accent1"/>
+            </a:fillRef>
+            <a:effectRef idx="0">
+              <a:schemeClr val="accent1"/>
+            </a:effectRef>
+            <a:fontRef idx="minor">
+              <a:schemeClr val="tx1"/>
+            </a:fontRef>
+          </p:style>
+        </p:cxnSp>
+      </p:grpSp>
+      <p:sp>
+        <p:nvSpPr>
+          <p:cNvPr id="16" name="Frihandsfigur: Form 15">
+            <a:extLst>
+              <a:ext uri="{FF2B5EF4-FFF2-40B4-BE49-F238E27FC236}">
+                <a16:creationId xmlns:a16="http://schemas.microsoft.com/office/drawing/2014/main" id="{ED71A45D-05E7-420B-81D3-61774C3C81EE}"/>
+              </a:ext>
+            </a:extLst>
+          </p:cNvPr>
+          <p:cNvSpPr/>
+          <p:nvPr/>
+        </p:nvSpPr>
+        <p:spPr>
+          <a:xfrm>
+            <a:off x="2925560" y="2140726"/>
+            <a:ext cx="1179226" cy="714503"/>
+          </a:xfrm>
+          <a:custGeom>
+            <a:avLst/>
+            <a:gdLst>
+              <a:gd name="connsiteX0" fmla="*/ 173477 w 1110575"/>
+              <a:gd name="connsiteY0" fmla="*/ 0 h 642026"/>
+              <a:gd name="connsiteX1" fmla="*/ 184826 w 1110575"/>
+              <a:gd name="connsiteY1" fmla="*/ 2117 h 642026"/>
+              <a:gd name="connsiteX2" fmla="*/ 184826 w 1110575"/>
+              <a:gd name="connsiteY2" fmla="*/ 0 h 642026"/>
+              <a:gd name="connsiteX3" fmla="*/ 924128 w 1110575"/>
+              <a:gd name="connsiteY3" fmla="*/ 0 h 642026"/>
+              <a:gd name="connsiteX4" fmla="*/ 924128 w 1110575"/>
+              <a:gd name="connsiteY4" fmla="*/ 2420 h 642026"/>
+              <a:gd name="connsiteX5" fmla="*/ 937098 w 1110575"/>
+              <a:gd name="connsiteY5" fmla="*/ 0 h 642026"/>
+              <a:gd name="connsiteX6" fmla="*/ 1110575 w 1110575"/>
+              <a:gd name="connsiteY6" fmla="*/ 321013 h 642026"/>
+              <a:gd name="connsiteX7" fmla="*/ 937098 w 1110575"/>
+              <a:gd name="connsiteY7" fmla="*/ 642026 h 642026"/>
+              <a:gd name="connsiteX8" fmla="*/ 924128 w 1110575"/>
+              <a:gd name="connsiteY8" fmla="*/ 639607 h 642026"/>
+              <a:gd name="connsiteX9" fmla="*/ 924128 w 1110575"/>
+              <a:gd name="connsiteY9" fmla="*/ 642026 h 642026"/>
+              <a:gd name="connsiteX10" fmla="*/ 184826 w 1110575"/>
+              <a:gd name="connsiteY10" fmla="*/ 642026 h 642026"/>
+              <a:gd name="connsiteX11" fmla="*/ 184826 w 1110575"/>
+              <a:gd name="connsiteY11" fmla="*/ 639909 h 642026"/>
+              <a:gd name="connsiteX12" fmla="*/ 173477 w 1110575"/>
+              <a:gd name="connsiteY12" fmla="*/ 642026 h 642026"/>
+              <a:gd name="connsiteX13" fmla="*/ 0 w 1110575"/>
+              <a:gd name="connsiteY13" fmla="*/ 321013 h 642026"/>
+              <a:gd name="connsiteX14" fmla="*/ 173477 w 1110575"/>
+              <a:gd name="connsiteY14" fmla="*/ 0 h 642026"/>
+            </a:gdLst>
+            <a:ahLst/>
+            <a:cxnLst>
+              <a:cxn ang="0">
+                <a:pos x="connsiteX0" y="connsiteY0"/>
+              </a:cxn>
+              <a:cxn ang="0">
+                <a:pos x="connsiteX1" y="connsiteY1"/>
+              </a:cxn>
+              <a:cxn ang="0">
+                <a:pos x="connsiteX2" y="connsiteY2"/>
+              </a:cxn>
+              <a:cxn ang="0">
+                <a:pos x="connsiteX3" y="connsiteY3"/>
+              </a:cxn>
+              <a:cxn ang="0">
+                <a:pos x="connsiteX4" y="connsiteY4"/>
+              </a:cxn>
+              <a:cxn ang="0">
+                <a:pos x="connsiteX5" y="connsiteY5"/>
+              </a:cxn>
+              <a:cxn ang="0">
+                <a:pos x="connsiteX6" y="connsiteY6"/>
+              </a:cxn>
+              <a:cxn ang="0">
+                <a:pos x="connsiteX7" y="connsiteY7"/>
+              </a:cxn>
+              <a:cxn ang="0">
+                <a:pos x="connsiteX8" y="connsiteY8"/>
+              </a:cxn>
+              <a:cxn ang="0">
+                <a:pos x="connsiteX9" y="connsiteY9"/>
+              </a:cxn>
+              <a:cxn ang="0">
+                <a:pos x="connsiteX10" y="connsiteY10"/>
+              </a:cxn>
+              <a:cxn ang="0">
+                <a:pos x="connsiteX11" y="connsiteY11"/>
+              </a:cxn>
+              <a:cxn ang="0">
+                <a:pos x="connsiteX12" y="connsiteY12"/>
+              </a:cxn>
+              <a:cxn ang="0">
+                <a:pos x="connsiteX13" y="connsiteY13"/>
+              </a:cxn>
+              <a:cxn ang="0">
+                <a:pos x="connsiteX14" y="connsiteY14"/>
+              </a:cxn>
+            </a:cxnLst>
+            <a:rect l="l" t="t" r="r" b="b"/>
+            <a:pathLst>
+              <a:path w="1110575" h="642026">
+                <a:moveTo>
+                  <a:pt x="173477" y="0"/>
+                </a:moveTo>
+                <a:lnTo>
+                  <a:pt x="184826" y="2117"/>
+                </a:lnTo>
+                <a:lnTo>
+                  <a:pt x="184826" y="0"/>
+                </a:lnTo>
+                <a:lnTo>
+                  <a:pt x="924128" y="0"/>
+                </a:lnTo>
+                <a:lnTo>
+                  <a:pt x="924128" y="2420"/>
+                </a:lnTo>
+                <a:lnTo>
+                  <a:pt x="937098" y="0"/>
+                </a:lnTo>
+                <a:cubicBezTo>
+                  <a:pt x="1032907" y="0"/>
+                  <a:pt x="1110575" y="143722"/>
+                  <a:pt x="1110575" y="321013"/>
+                </a:cubicBezTo>
+                <a:cubicBezTo>
+                  <a:pt x="1110575" y="498304"/>
+                  <a:pt x="1032907" y="642026"/>
+                  <a:pt x="937098" y="642026"/>
+                </a:cubicBezTo>
+                <a:lnTo>
+                  <a:pt x="924128" y="639607"/>
+                </a:lnTo>
+                <a:lnTo>
+                  <a:pt x="924128" y="642026"/>
+                </a:lnTo>
+                <a:lnTo>
+                  <a:pt x="184826" y="642026"/>
+                </a:lnTo>
+                <a:lnTo>
+                  <a:pt x="184826" y="639909"/>
+                </a:lnTo>
+                <a:lnTo>
+                  <a:pt x="173477" y="642026"/>
+                </a:lnTo>
+                <a:cubicBezTo>
+                  <a:pt x="77668" y="642026"/>
+                  <a:pt x="0" y="498304"/>
+                  <a:pt x="0" y="321013"/>
+                </a:cubicBezTo>
+                <a:cubicBezTo>
+                  <a:pt x="0" y="143722"/>
+                  <a:pt x="77668" y="0"/>
+                  <a:pt x="173477" y="0"/>
+                </a:cubicBezTo>
+                <a:close/>
+              </a:path>
+            </a:pathLst>
+          </a:custGeom>
+          <a:solidFill>
+            <a:schemeClr val="bg2"/>
+          </a:solidFill>
+          <a:ln w="6350">
+            <a:solidFill>
+              <a:schemeClr val="tx1"/>
+            </a:solidFill>
+          </a:ln>
+        </p:spPr>
+        <p:style>
+          <a:lnRef idx="2">
+            <a:schemeClr val="accent1">
+              <a:shade val="50000"/>
+            </a:schemeClr>
+          </a:lnRef>
+          <a:fillRef idx="1">
+            <a:schemeClr val="accent1"/>
+          </a:fillRef>
+          <a:effectRef idx="0">
+            <a:schemeClr val="accent1"/>
+          </a:effectRef>
+          <a:fontRef idx="minor">
+            <a:schemeClr val="lt1"/>
+          </a:fontRef>
+        </p:style>
+        <p:txBody>
+          <a:bodyPr wrap="square" rtlCol="0" anchor="ctr">
+            <a:noAutofit/>
+          </a:bodyPr>
+          <a:lstStyle/>
+          <a:p>
+            <a:pPr algn="ctr"/>
+            <a:r>
+              <a:rPr lang="sv-SE" sz="1000" b="1" dirty="0">
+                <a:solidFill>
+                  <a:schemeClr val="tx1"/>
+                </a:solidFill>
+                <a:latin typeface="Arial" panose="020B0604020202020204" pitchFamily="34" charset="0"/>
+                <a:cs typeface="Arial" panose="020B0604020202020204" pitchFamily="34" charset="0"/>
+              </a:rPr>
+              <a:t>C1.2</a:t>
+            </a:r>
+          </a:p>
+          <a:p>
+            <a:pPr algn="ctr"/>
+            <a:r>
+              <a:rPr lang="sv-SE" sz="1000" dirty="0">
+                <a:solidFill>
+                  <a:schemeClr val="tx1"/>
+                </a:solidFill>
+                <a:latin typeface="Arial" panose="020B0604020202020204" pitchFamily="34" charset="0"/>
+                <a:cs typeface="Arial" panose="020B0604020202020204" pitchFamily="34" charset="0"/>
+              </a:rPr>
+              <a:t>System </a:t>
+            </a:r>
+            <a:r>
+              <a:rPr lang="sv-SE" sz="1000" dirty="0" err="1">
+                <a:solidFill>
+                  <a:schemeClr val="tx1"/>
+                </a:solidFill>
+                <a:latin typeface="Arial" panose="020B0604020202020204" pitchFamily="34" charset="0"/>
+                <a:cs typeface="Arial" panose="020B0604020202020204" pitchFamily="34" charset="0"/>
+              </a:rPr>
+              <a:t>description</a:t>
+            </a:r>
+            <a:endParaRPr lang="sv-SE" sz="1000" dirty="0">
+              <a:solidFill>
+                <a:schemeClr val="tx1"/>
+              </a:solidFill>
+              <a:latin typeface="Arial" panose="020B0604020202020204" pitchFamily="34" charset="0"/>
+              <a:cs typeface="Arial" panose="020B0604020202020204" pitchFamily="34" charset="0"/>
+            </a:endParaRPr>
+          </a:p>
+        </p:txBody>
+      </p:sp>
+      <p:sp>
+        <p:nvSpPr>
+          <p:cNvPr id="17" name="textruta 16">
+            <a:extLst>
+              <a:ext uri="{FF2B5EF4-FFF2-40B4-BE49-F238E27FC236}">
+                <a16:creationId xmlns:a16="http://schemas.microsoft.com/office/drawing/2014/main" id="{93BD6B08-DC8B-4A24-89A8-852E92F3331F}"/>
+              </a:ext>
+            </a:extLst>
+          </p:cNvPr>
+          <p:cNvSpPr txBox="1"/>
+          <p:nvPr/>
+        </p:nvSpPr>
+        <p:spPr>
+          <a:xfrm>
+            <a:off x="2925561" y="2140726"/>
+            <a:ext cx="470001" cy="276999"/>
+          </a:xfrm>
+          <a:prstGeom prst="rect">
+            <a:avLst/>
+          </a:prstGeom>
+          <a:noFill/>
+        </p:spPr>
+        <p:txBody>
+          <a:bodyPr wrap="square">
+            <a:spAutoFit/>
+          </a:bodyPr>
+          <a:lstStyle/>
+          <a:p>
+            <a:r>
+              <a:rPr lang="sv-SE" sz="1200" dirty="0">
+                <a:latin typeface="Arial" panose="020B0604020202020204" pitchFamily="34" charset="0"/>
+                <a:cs typeface="Arial" panose="020B0604020202020204" pitchFamily="34" charset="0"/>
+              </a:rPr>
+              <a:t>[C]</a:t>
+            </a:r>
+            <a:endParaRPr lang="sv-SE" sz="1200" dirty="0"/>
+          </a:p>
+        </p:txBody>
+      </p:sp>
+      <p:grpSp>
+        <p:nvGrpSpPr>
+          <p:cNvPr id="18" name="Grupp 17">
+            <a:extLst>
+              <a:ext uri="{FF2B5EF4-FFF2-40B4-BE49-F238E27FC236}">
+                <a16:creationId xmlns:a16="http://schemas.microsoft.com/office/drawing/2014/main" id="{82AC3EF9-D249-4FB3-A774-186E8AAEF5BF}"/>
+              </a:ext>
+            </a:extLst>
+          </p:cNvPr>
+          <p:cNvGrpSpPr/>
+          <p:nvPr/>
+        </p:nvGrpSpPr>
+        <p:grpSpPr>
+          <a:xfrm rot="5400000">
+            <a:off x="4575969" y="1942006"/>
+            <a:ext cx="175562" cy="1127001"/>
+            <a:chOff x="3240634" y="4169664"/>
+            <a:chExt cx="175562" cy="1127001"/>
+          </a:xfrm>
+        </p:grpSpPr>
+        <p:sp>
+          <p:nvSpPr>
+            <p:cNvPr id="19" name="Likbent triangel 18">
+              <a:extLst>
+                <a:ext uri="{FF2B5EF4-FFF2-40B4-BE49-F238E27FC236}">
+                  <a16:creationId xmlns:a16="http://schemas.microsoft.com/office/drawing/2014/main" id="{E2DDD351-D55C-4898-8981-B1E1A674FBCE}"/>
+                </a:ext>
+              </a:extLst>
+            </p:cNvPr>
+            <p:cNvSpPr/>
+            <p:nvPr/>
+          </p:nvSpPr>
+          <p:spPr>
+            <a:xfrm rot="10800000">
+              <a:off x="3240634" y="5164531"/>
+              <a:ext cx="175562" cy="132134"/>
+            </a:xfrm>
+            <a:prstGeom prst="triangle">
+              <a:avLst/>
+            </a:prstGeom>
+            <a:ln>
+              <a:solidFill>
+                <a:schemeClr val="tx1"/>
+              </a:solidFill>
+            </a:ln>
+          </p:spPr>
+          <p:style>
+            <a:lnRef idx="1">
+              <a:schemeClr val="accent1"/>
+            </a:lnRef>
+            <a:fillRef idx="0">
+              <a:schemeClr val="accent1"/>
+            </a:fillRef>
+            <a:effectRef idx="0">
+              <a:schemeClr val="accent1"/>
+            </a:effectRef>
+            <a:fontRef idx="minor">
+              <a:schemeClr val="tx1"/>
+            </a:fontRef>
+          </p:style>
+          <p:txBody>
+            <a:bodyPr rtlCol="0" anchor="ctr"/>
+            <a:lstStyle/>
+            <a:p>
+              <a:pPr algn="ctr"/>
+              <a:endParaRPr lang="sv-SE"/>
+            </a:p>
+          </p:txBody>
+        </p:sp>
+        <p:cxnSp>
+          <p:nvCxnSpPr>
+            <p:cNvPr id="20" name="Rak koppling 19">
+              <a:extLst>
+                <a:ext uri="{FF2B5EF4-FFF2-40B4-BE49-F238E27FC236}">
+                  <a16:creationId xmlns:a16="http://schemas.microsoft.com/office/drawing/2014/main" id="{FC8CB442-2D66-4BD6-B5D8-915DD310893D}"/>
+                </a:ext>
+              </a:extLst>
+            </p:cNvPr>
+            <p:cNvCxnSpPr>
+              <a:stCxn id="19" idx="3"/>
+            </p:cNvCxnSpPr>
+            <p:nvPr/>
+          </p:nvCxnSpPr>
+          <p:spPr>
+            <a:xfrm flipV="1">
+              <a:off x="3328415" y="4169664"/>
+              <a:ext cx="1" cy="994867"/>
+            </a:xfrm>
+            <a:prstGeom prst="line">
+              <a:avLst/>
+            </a:prstGeom>
+            <a:ln>
+              <a:solidFill>
+                <a:schemeClr val="tx1"/>
+              </a:solidFill>
+            </a:ln>
+          </p:spPr>
+          <p:style>
+            <a:lnRef idx="1">
+              <a:schemeClr val="accent1"/>
+            </a:lnRef>
+            <a:fillRef idx="0">
+              <a:schemeClr val="accent1"/>
+            </a:fillRef>
+            <a:effectRef idx="0">
+              <a:schemeClr val="accent1"/>
+            </a:effectRef>
+            <a:fontRef idx="minor">
+              <a:schemeClr val="tx1"/>
+            </a:fontRef>
+          </p:style>
+        </p:cxnSp>
+      </p:grpSp>
+      <p:grpSp>
+        <p:nvGrpSpPr>
+          <p:cNvPr id="21" name="Grupp 20">
+            <a:extLst>
+              <a:ext uri="{FF2B5EF4-FFF2-40B4-BE49-F238E27FC236}">
+                <a16:creationId xmlns:a16="http://schemas.microsoft.com/office/drawing/2014/main" id="{A1C9ADBC-843C-454F-AB2D-C59AFD9B12EE}"/>
+              </a:ext>
+            </a:extLst>
+          </p:cNvPr>
+          <p:cNvGrpSpPr/>
+          <p:nvPr/>
+        </p:nvGrpSpPr>
+        <p:grpSpPr>
+          <a:xfrm rot="4360248">
+            <a:off x="4605966" y="2616104"/>
+            <a:ext cx="175562" cy="1127001"/>
+            <a:chOff x="3240634" y="4169664"/>
+            <a:chExt cx="175562" cy="1127001"/>
+          </a:xfrm>
+        </p:grpSpPr>
+        <p:sp>
+          <p:nvSpPr>
+            <p:cNvPr id="22" name="Likbent triangel 21">
+              <a:extLst>
+                <a:ext uri="{FF2B5EF4-FFF2-40B4-BE49-F238E27FC236}">
+                  <a16:creationId xmlns:a16="http://schemas.microsoft.com/office/drawing/2014/main" id="{8426BA48-5DA3-4240-84A4-B95BF9A8A0D7}"/>
+                </a:ext>
+              </a:extLst>
+            </p:cNvPr>
+            <p:cNvSpPr/>
+            <p:nvPr/>
+          </p:nvSpPr>
+          <p:spPr>
+            <a:xfrm rot="10800000">
+              <a:off x="3240634" y="5164531"/>
+              <a:ext cx="175562" cy="132134"/>
+            </a:xfrm>
+            <a:prstGeom prst="triangle">
+              <a:avLst/>
+            </a:prstGeom>
+            <a:ln>
+              <a:solidFill>
+                <a:schemeClr val="tx1"/>
+              </a:solidFill>
+            </a:ln>
+          </p:spPr>
+          <p:style>
+            <a:lnRef idx="1">
+              <a:schemeClr val="accent1"/>
+            </a:lnRef>
+            <a:fillRef idx="0">
+              <a:schemeClr val="accent1"/>
+            </a:fillRef>
+            <a:effectRef idx="0">
+              <a:schemeClr val="accent1"/>
+            </a:effectRef>
+            <a:fontRef idx="minor">
+              <a:schemeClr val="tx1"/>
+            </a:fontRef>
+          </p:style>
+          <p:txBody>
+            <a:bodyPr rtlCol="0" anchor="ctr"/>
+            <a:lstStyle/>
+            <a:p>
+              <a:pPr algn="ctr"/>
+              <a:endParaRPr lang="sv-SE"/>
+            </a:p>
+          </p:txBody>
+        </p:sp>
+        <p:cxnSp>
+          <p:nvCxnSpPr>
+            <p:cNvPr id="24" name="Rak koppling 23">
+              <a:extLst>
+                <a:ext uri="{FF2B5EF4-FFF2-40B4-BE49-F238E27FC236}">
+                  <a16:creationId xmlns:a16="http://schemas.microsoft.com/office/drawing/2014/main" id="{60CF5DC2-5FF3-4E94-8781-BB810B4C3A5D}"/>
+                </a:ext>
+              </a:extLst>
+            </p:cNvPr>
+            <p:cNvCxnSpPr>
+              <a:stCxn id="22" idx="3"/>
+            </p:cNvCxnSpPr>
+            <p:nvPr/>
+          </p:nvCxnSpPr>
+          <p:spPr>
+            <a:xfrm flipV="1">
+              <a:off x="3328415" y="4169664"/>
+              <a:ext cx="1" cy="994867"/>
+            </a:xfrm>
+            <a:prstGeom prst="line">
+              <a:avLst/>
+            </a:prstGeom>
+            <a:ln>
+              <a:solidFill>
+                <a:schemeClr val="tx1"/>
+              </a:solidFill>
+            </a:ln>
+          </p:spPr>
+          <p:style>
+            <a:lnRef idx="1">
+              <a:schemeClr val="accent1"/>
+            </a:lnRef>
+            <a:fillRef idx="0">
+              <a:schemeClr val="accent1"/>
+            </a:fillRef>
+            <a:effectRef idx="0">
+              <a:schemeClr val="accent1"/>
+            </a:effectRef>
+            <a:fontRef idx="minor">
+              <a:schemeClr val="tx1"/>
+            </a:fontRef>
+          </p:style>
+        </p:cxnSp>
+      </p:grpSp>
+      <p:sp>
+        <p:nvSpPr>
+          <p:cNvPr id="26" name="Frihandsfigur: Form 25">
+            <a:extLst>
+              <a:ext uri="{FF2B5EF4-FFF2-40B4-BE49-F238E27FC236}">
+                <a16:creationId xmlns:a16="http://schemas.microsoft.com/office/drawing/2014/main" id="{DEAD7E78-5169-4478-8B0D-6616EC215CC4}"/>
+              </a:ext>
+            </a:extLst>
+          </p:cNvPr>
+          <p:cNvSpPr/>
+          <p:nvPr/>
+        </p:nvSpPr>
+        <p:spPr>
+          <a:xfrm>
+            <a:off x="3001050" y="3132229"/>
+            <a:ext cx="1179226" cy="714503"/>
+          </a:xfrm>
+          <a:custGeom>
+            <a:avLst/>
+            <a:gdLst>
+              <a:gd name="connsiteX0" fmla="*/ 173477 w 1110575"/>
+              <a:gd name="connsiteY0" fmla="*/ 0 h 642026"/>
+              <a:gd name="connsiteX1" fmla="*/ 184826 w 1110575"/>
+              <a:gd name="connsiteY1" fmla="*/ 2117 h 642026"/>
+              <a:gd name="connsiteX2" fmla="*/ 184826 w 1110575"/>
+              <a:gd name="connsiteY2" fmla="*/ 0 h 642026"/>
+              <a:gd name="connsiteX3" fmla="*/ 924128 w 1110575"/>
+              <a:gd name="connsiteY3" fmla="*/ 0 h 642026"/>
+              <a:gd name="connsiteX4" fmla="*/ 924128 w 1110575"/>
+              <a:gd name="connsiteY4" fmla="*/ 2420 h 642026"/>
+              <a:gd name="connsiteX5" fmla="*/ 937098 w 1110575"/>
+              <a:gd name="connsiteY5" fmla="*/ 0 h 642026"/>
+              <a:gd name="connsiteX6" fmla="*/ 1110575 w 1110575"/>
+              <a:gd name="connsiteY6" fmla="*/ 321013 h 642026"/>
+              <a:gd name="connsiteX7" fmla="*/ 937098 w 1110575"/>
+              <a:gd name="connsiteY7" fmla="*/ 642026 h 642026"/>
+              <a:gd name="connsiteX8" fmla="*/ 924128 w 1110575"/>
+              <a:gd name="connsiteY8" fmla="*/ 639607 h 642026"/>
+              <a:gd name="connsiteX9" fmla="*/ 924128 w 1110575"/>
+              <a:gd name="connsiteY9" fmla="*/ 642026 h 642026"/>
+              <a:gd name="connsiteX10" fmla="*/ 184826 w 1110575"/>
+              <a:gd name="connsiteY10" fmla="*/ 642026 h 642026"/>
+              <a:gd name="connsiteX11" fmla="*/ 184826 w 1110575"/>
+              <a:gd name="connsiteY11" fmla="*/ 639909 h 642026"/>
+              <a:gd name="connsiteX12" fmla="*/ 173477 w 1110575"/>
+              <a:gd name="connsiteY12" fmla="*/ 642026 h 642026"/>
+              <a:gd name="connsiteX13" fmla="*/ 0 w 1110575"/>
+              <a:gd name="connsiteY13" fmla="*/ 321013 h 642026"/>
+              <a:gd name="connsiteX14" fmla="*/ 173477 w 1110575"/>
+              <a:gd name="connsiteY14" fmla="*/ 0 h 642026"/>
+            </a:gdLst>
+            <a:ahLst/>
+            <a:cxnLst>
+              <a:cxn ang="0">
+                <a:pos x="connsiteX0" y="connsiteY0"/>
+              </a:cxn>
+              <a:cxn ang="0">
+                <a:pos x="connsiteX1" y="connsiteY1"/>
+              </a:cxn>
+              <a:cxn ang="0">
+                <a:pos x="connsiteX2" y="connsiteY2"/>
+              </a:cxn>
+              <a:cxn ang="0">
+                <a:pos x="connsiteX3" y="connsiteY3"/>
+              </a:cxn>
+              <a:cxn ang="0">
+                <a:pos x="connsiteX4" y="connsiteY4"/>
+              </a:cxn>
+              <a:cxn ang="0">
+                <a:pos x="connsiteX5" y="connsiteY5"/>
+              </a:cxn>
+              <a:cxn ang="0">
+                <a:pos x="connsiteX6" y="connsiteY6"/>
+              </a:cxn>
+              <a:cxn ang="0">
+                <a:pos x="connsiteX7" y="connsiteY7"/>
+              </a:cxn>
+              <a:cxn ang="0">
+                <a:pos x="connsiteX8" y="connsiteY8"/>
+              </a:cxn>
+              <a:cxn ang="0">
+                <a:pos x="connsiteX9" y="connsiteY9"/>
+              </a:cxn>
+              <a:cxn ang="0">
+                <a:pos x="connsiteX10" y="connsiteY10"/>
+              </a:cxn>
+              <a:cxn ang="0">
+                <a:pos x="connsiteX11" y="connsiteY11"/>
+              </a:cxn>
+              <a:cxn ang="0">
+                <a:pos x="connsiteX12" y="connsiteY12"/>
+              </a:cxn>
+              <a:cxn ang="0">
+                <a:pos x="connsiteX13" y="connsiteY13"/>
+              </a:cxn>
+              <a:cxn ang="0">
+                <a:pos x="connsiteX14" y="connsiteY14"/>
+              </a:cxn>
+            </a:cxnLst>
+            <a:rect l="l" t="t" r="r" b="b"/>
+            <a:pathLst>
+              <a:path w="1110575" h="642026">
+                <a:moveTo>
+                  <a:pt x="173477" y="0"/>
+                </a:moveTo>
+                <a:lnTo>
+                  <a:pt x="184826" y="2117"/>
+                </a:lnTo>
+                <a:lnTo>
+                  <a:pt x="184826" y="0"/>
+                </a:lnTo>
+                <a:lnTo>
+                  <a:pt x="924128" y="0"/>
+                </a:lnTo>
+                <a:lnTo>
+                  <a:pt x="924128" y="2420"/>
+                </a:lnTo>
+                <a:lnTo>
+                  <a:pt x="937098" y="0"/>
+                </a:lnTo>
+                <a:cubicBezTo>
+                  <a:pt x="1032907" y="0"/>
+                  <a:pt x="1110575" y="143722"/>
+                  <a:pt x="1110575" y="321013"/>
+                </a:cubicBezTo>
+                <a:cubicBezTo>
+                  <a:pt x="1110575" y="498304"/>
+                  <a:pt x="1032907" y="642026"/>
+                  <a:pt x="937098" y="642026"/>
+                </a:cubicBezTo>
+                <a:lnTo>
+                  <a:pt x="924128" y="639607"/>
+                </a:lnTo>
+                <a:lnTo>
+                  <a:pt x="924128" y="642026"/>
+                </a:lnTo>
+                <a:lnTo>
+                  <a:pt x="184826" y="642026"/>
+                </a:lnTo>
+                <a:lnTo>
+                  <a:pt x="184826" y="639909"/>
+                </a:lnTo>
+                <a:lnTo>
+                  <a:pt x="173477" y="642026"/>
+                </a:lnTo>
+                <a:cubicBezTo>
+                  <a:pt x="77668" y="642026"/>
+                  <a:pt x="0" y="498304"/>
+                  <a:pt x="0" y="321013"/>
+                </a:cubicBezTo>
+                <a:cubicBezTo>
+                  <a:pt x="0" y="143722"/>
+                  <a:pt x="77668" y="0"/>
+                  <a:pt x="173477" y="0"/>
+                </a:cubicBezTo>
+                <a:close/>
+              </a:path>
+            </a:pathLst>
+          </a:custGeom>
+          <a:solidFill>
+            <a:schemeClr val="bg2"/>
+          </a:solidFill>
+          <a:ln w="6350">
+            <a:solidFill>
+              <a:schemeClr val="tx1"/>
+            </a:solidFill>
+          </a:ln>
+        </p:spPr>
+        <p:style>
+          <a:lnRef idx="2">
+            <a:schemeClr val="accent1">
+              <a:shade val="50000"/>
+            </a:schemeClr>
+          </a:lnRef>
+          <a:fillRef idx="1">
+            <a:schemeClr val="accent1"/>
+          </a:fillRef>
+          <a:effectRef idx="0">
+            <a:schemeClr val="accent1"/>
+          </a:effectRef>
+          <a:fontRef idx="minor">
+            <a:schemeClr val="lt1"/>
+          </a:fontRef>
+        </p:style>
+        <p:txBody>
+          <a:bodyPr wrap="square" rtlCol="0" anchor="ctr">
+            <a:noAutofit/>
+          </a:bodyPr>
+          <a:lstStyle/>
+          <a:p>
+            <a:pPr algn="ctr"/>
+            <a:r>
+              <a:rPr lang="sv-SE" sz="1000" b="1" dirty="0">
+                <a:solidFill>
+                  <a:schemeClr val="tx1"/>
+                </a:solidFill>
+                <a:latin typeface="Arial" panose="020B0604020202020204" pitchFamily="34" charset="0"/>
+                <a:cs typeface="Arial" panose="020B0604020202020204" pitchFamily="34" charset="0"/>
+              </a:rPr>
+              <a:t>C1.3</a:t>
+            </a:r>
+          </a:p>
+          <a:p>
+            <a:pPr algn="ctr"/>
+            <a:r>
+              <a:rPr lang="sv-SE" sz="1000" dirty="0">
+                <a:solidFill>
+                  <a:schemeClr val="tx1"/>
+                </a:solidFill>
+                <a:latin typeface="Arial" panose="020B0604020202020204" pitchFamily="34" charset="0"/>
+                <a:cs typeface="Arial" panose="020B0604020202020204" pitchFamily="34" charset="0"/>
+              </a:rPr>
+              <a:t>ML Component </a:t>
+            </a:r>
+            <a:r>
+              <a:rPr lang="sv-SE" sz="1000" dirty="0" err="1">
+                <a:solidFill>
+                  <a:schemeClr val="tx1"/>
+                </a:solidFill>
+                <a:latin typeface="Arial" panose="020B0604020202020204" pitchFamily="34" charset="0"/>
+                <a:cs typeface="Arial" panose="020B0604020202020204" pitchFamily="34" charset="0"/>
+              </a:rPr>
+              <a:t>Description</a:t>
+            </a:r>
+            <a:endParaRPr lang="sv-SE" sz="1000" dirty="0">
+              <a:solidFill>
+                <a:schemeClr val="tx1"/>
+              </a:solidFill>
+              <a:latin typeface="Arial" panose="020B0604020202020204" pitchFamily="34" charset="0"/>
+              <a:cs typeface="Arial" panose="020B0604020202020204" pitchFamily="34" charset="0"/>
+            </a:endParaRPr>
+          </a:p>
+        </p:txBody>
+      </p:sp>
+      <p:sp>
+        <p:nvSpPr>
+          <p:cNvPr id="28" name="textruta 27">
+            <a:extLst>
+              <a:ext uri="{FF2B5EF4-FFF2-40B4-BE49-F238E27FC236}">
+                <a16:creationId xmlns:a16="http://schemas.microsoft.com/office/drawing/2014/main" id="{B3CF7D3E-5B72-402D-BE5D-3C39834BDB1E}"/>
+              </a:ext>
+            </a:extLst>
+          </p:cNvPr>
+          <p:cNvSpPr txBox="1"/>
+          <p:nvPr/>
+        </p:nvSpPr>
+        <p:spPr>
+          <a:xfrm>
+            <a:off x="3001051" y="3132229"/>
+            <a:ext cx="470001" cy="276999"/>
+          </a:xfrm>
+          <a:prstGeom prst="rect">
+            <a:avLst/>
+          </a:prstGeom>
+          <a:noFill/>
+        </p:spPr>
+        <p:txBody>
+          <a:bodyPr wrap="square">
+            <a:spAutoFit/>
+          </a:bodyPr>
+          <a:lstStyle/>
+          <a:p>
+            <a:r>
+              <a:rPr lang="sv-SE" sz="1200" dirty="0">
+                <a:latin typeface="Arial" panose="020B0604020202020204" pitchFamily="34" charset="0"/>
+                <a:cs typeface="Arial" panose="020B0604020202020204" pitchFamily="34" charset="0"/>
+              </a:rPr>
+              <a:t>[D]</a:t>
+            </a:r>
+            <a:endParaRPr lang="sv-SE" sz="1200" dirty="0"/>
+          </a:p>
+        </p:txBody>
+      </p:sp>
+      <p:sp>
+        <p:nvSpPr>
+          <p:cNvPr id="29" name="Frihandsfigur: Form 28">
+            <a:extLst>
+              <a:ext uri="{FF2B5EF4-FFF2-40B4-BE49-F238E27FC236}">
+                <a16:creationId xmlns:a16="http://schemas.microsoft.com/office/drawing/2014/main" id="{41466E6D-02F2-47DA-B4AD-A22EF38C4E20}"/>
+              </a:ext>
+            </a:extLst>
+          </p:cNvPr>
+          <p:cNvSpPr/>
+          <p:nvPr/>
+        </p:nvSpPr>
+        <p:spPr>
+          <a:xfrm>
+            <a:off x="7884319" y="1363537"/>
+            <a:ext cx="1376722" cy="898121"/>
+          </a:xfrm>
+          <a:custGeom>
+            <a:avLst/>
+            <a:gdLst>
+              <a:gd name="connsiteX0" fmla="*/ 173477 w 1110575"/>
+              <a:gd name="connsiteY0" fmla="*/ 0 h 642026"/>
+              <a:gd name="connsiteX1" fmla="*/ 184826 w 1110575"/>
+              <a:gd name="connsiteY1" fmla="*/ 2117 h 642026"/>
+              <a:gd name="connsiteX2" fmla="*/ 184826 w 1110575"/>
+              <a:gd name="connsiteY2" fmla="*/ 0 h 642026"/>
+              <a:gd name="connsiteX3" fmla="*/ 924128 w 1110575"/>
+              <a:gd name="connsiteY3" fmla="*/ 0 h 642026"/>
+              <a:gd name="connsiteX4" fmla="*/ 924128 w 1110575"/>
+              <a:gd name="connsiteY4" fmla="*/ 2420 h 642026"/>
+              <a:gd name="connsiteX5" fmla="*/ 937098 w 1110575"/>
+              <a:gd name="connsiteY5" fmla="*/ 0 h 642026"/>
+              <a:gd name="connsiteX6" fmla="*/ 1110575 w 1110575"/>
+              <a:gd name="connsiteY6" fmla="*/ 321013 h 642026"/>
+              <a:gd name="connsiteX7" fmla="*/ 937098 w 1110575"/>
+              <a:gd name="connsiteY7" fmla="*/ 642026 h 642026"/>
+              <a:gd name="connsiteX8" fmla="*/ 924128 w 1110575"/>
+              <a:gd name="connsiteY8" fmla="*/ 639607 h 642026"/>
+              <a:gd name="connsiteX9" fmla="*/ 924128 w 1110575"/>
+              <a:gd name="connsiteY9" fmla="*/ 642026 h 642026"/>
+              <a:gd name="connsiteX10" fmla="*/ 184826 w 1110575"/>
+              <a:gd name="connsiteY10" fmla="*/ 642026 h 642026"/>
+              <a:gd name="connsiteX11" fmla="*/ 184826 w 1110575"/>
+              <a:gd name="connsiteY11" fmla="*/ 639909 h 642026"/>
+              <a:gd name="connsiteX12" fmla="*/ 173477 w 1110575"/>
+              <a:gd name="connsiteY12" fmla="*/ 642026 h 642026"/>
+              <a:gd name="connsiteX13" fmla="*/ 0 w 1110575"/>
+              <a:gd name="connsiteY13" fmla="*/ 321013 h 642026"/>
+              <a:gd name="connsiteX14" fmla="*/ 173477 w 1110575"/>
+              <a:gd name="connsiteY14" fmla="*/ 0 h 642026"/>
+            </a:gdLst>
+            <a:ahLst/>
+            <a:cxnLst>
+              <a:cxn ang="0">
+                <a:pos x="connsiteX0" y="connsiteY0"/>
+              </a:cxn>
+              <a:cxn ang="0">
+                <a:pos x="connsiteX1" y="connsiteY1"/>
+              </a:cxn>
+              <a:cxn ang="0">
+                <a:pos x="connsiteX2" y="connsiteY2"/>
+              </a:cxn>
+              <a:cxn ang="0">
+                <a:pos x="connsiteX3" y="connsiteY3"/>
+              </a:cxn>
+              <a:cxn ang="0">
+                <a:pos x="connsiteX4" y="connsiteY4"/>
+              </a:cxn>
+              <a:cxn ang="0">
+                <a:pos x="connsiteX5" y="connsiteY5"/>
+              </a:cxn>
+              <a:cxn ang="0">
+                <a:pos x="connsiteX6" y="connsiteY6"/>
+              </a:cxn>
+              <a:cxn ang="0">
+                <a:pos x="connsiteX7" y="connsiteY7"/>
+              </a:cxn>
+              <a:cxn ang="0">
+                <a:pos x="connsiteX8" y="connsiteY8"/>
+              </a:cxn>
+              <a:cxn ang="0">
+                <a:pos x="connsiteX9" y="connsiteY9"/>
+              </a:cxn>
+              <a:cxn ang="0">
+                <a:pos x="connsiteX10" y="connsiteY10"/>
+              </a:cxn>
+              <a:cxn ang="0">
+                <a:pos x="connsiteX11" y="connsiteY11"/>
+              </a:cxn>
+              <a:cxn ang="0">
+                <a:pos x="connsiteX12" y="connsiteY12"/>
+              </a:cxn>
+              <a:cxn ang="0">
+                <a:pos x="connsiteX13" y="connsiteY13"/>
+              </a:cxn>
+              <a:cxn ang="0">
+                <a:pos x="connsiteX14" y="connsiteY14"/>
+              </a:cxn>
+            </a:cxnLst>
+            <a:rect l="l" t="t" r="r" b="b"/>
+            <a:pathLst>
+              <a:path w="1110575" h="642026">
+                <a:moveTo>
+                  <a:pt x="173477" y="0"/>
+                </a:moveTo>
+                <a:lnTo>
+                  <a:pt x="184826" y="2117"/>
+                </a:lnTo>
+                <a:lnTo>
+                  <a:pt x="184826" y="0"/>
+                </a:lnTo>
+                <a:lnTo>
+                  <a:pt x="924128" y="0"/>
+                </a:lnTo>
+                <a:lnTo>
+                  <a:pt x="924128" y="2420"/>
+                </a:lnTo>
+                <a:lnTo>
+                  <a:pt x="937098" y="0"/>
+                </a:lnTo>
+                <a:cubicBezTo>
+                  <a:pt x="1032907" y="0"/>
+                  <a:pt x="1110575" y="143722"/>
+                  <a:pt x="1110575" y="321013"/>
+                </a:cubicBezTo>
+                <a:cubicBezTo>
+                  <a:pt x="1110575" y="498304"/>
+                  <a:pt x="1032907" y="642026"/>
+                  <a:pt x="937098" y="642026"/>
+                </a:cubicBezTo>
+                <a:lnTo>
+                  <a:pt x="924128" y="639607"/>
+                </a:lnTo>
+                <a:lnTo>
+                  <a:pt x="924128" y="642026"/>
+                </a:lnTo>
+                <a:lnTo>
+                  <a:pt x="184826" y="642026"/>
+                </a:lnTo>
+                <a:lnTo>
+                  <a:pt x="184826" y="639909"/>
+                </a:lnTo>
+                <a:lnTo>
+                  <a:pt x="173477" y="642026"/>
+                </a:lnTo>
+                <a:cubicBezTo>
+                  <a:pt x="77668" y="642026"/>
+                  <a:pt x="0" y="498304"/>
+                  <a:pt x="0" y="321013"/>
+                </a:cubicBezTo>
+                <a:cubicBezTo>
+                  <a:pt x="0" y="143722"/>
+                  <a:pt x="77668" y="0"/>
+                  <a:pt x="173477" y="0"/>
+                </a:cubicBezTo>
+                <a:close/>
+              </a:path>
+            </a:pathLst>
+          </a:custGeom>
+          <a:solidFill>
+            <a:schemeClr val="bg2"/>
+          </a:solidFill>
+          <a:ln w="6350">
+            <a:solidFill>
+              <a:schemeClr val="tx1"/>
+            </a:solidFill>
+          </a:ln>
+        </p:spPr>
+        <p:style>
+          <a:lnRef idx="2">
+            <a:schemeClr val="accent1">
+              <a:shade val="50000"/>
+            </a:schemeClr>
+          </a:lnRef>
+          <a:fillRef idx="1">
+            <a:schemeClr val="accent1"/>
+          </a:fillRef>
+          <a:effectRef idx="0">
+            <a:schemeClr val="accent1"/>
+          </a:effectRef>
+          <a:fontRef idx="minor">
+            <a:schemeClr val="lt1"/>
+          </a:fontRef>
+        </p:style>
+        <p:txBody>
+          <a:bodyPr wrap="square" rtlCol="0" anchor="ctr">
+            <a:noAutofit/>
+          </a:bodyPr>
+          <a:lstStyle/>
+          <a:p>
+            <a:pPr algn="ctr"/>
+            <a:r>
+              <a:rPr lang="sv-SE" sz="1000" b="1" dirty="0">
+                <a:solidFill>
+                  <a:schemeClr val="tx1"/>
+                </a:solidFill>
+                <a:latin typeface="Arial" panose="020B0604020202020204" pitchFamily="34" charset="0"/>
+                <a:cs typeface="Arial" panose="020B0604020202020204" pitchFamily="34" charset="0"/>
+              </a:rPr>
+              <a:t>C1.4</a:t>
+            </a:r>
+          </a:p>
+          <a:p>
+            <a:pPr algn="ctr"/>
+            <a:r>
+              <a:rPr lang="sv-SE" sz="1000" dirty="0">
+                <a:solidFill>
+                  <a:schemeClr val="tx1"/>
+                </a:solidFill>
+                <a:latin typeface="Arial" panose="020B0604020202020204" pitchFamily="34" charset="0"/>
+                <a:cs typeface="Arial" panose="020B0604020202020204" pitchFamily="34" charset="0"/>
+              </a:rPr>
+              <a:t>System </a:t>
+            </a:r>
+            <a:r>
+              <a:rPr lang="sv-SE" sz="1000" dirty="0" err="1">
+                <a:solidFill>
+                  <a:schemeClr val="tx1"/>
+                </a:solidFill>
+                <a:latin typeface="Arial" panose="020B0604020202020204" pitchFamily="34" charset="0"/>
+                <a:cs typeface="Arial" panose="020B0604020202020204" pitchFamily="34" charset="0"/>
+              </a:rPr>
+              <a:t>safety</a:t>
+            </a:r>
+            <a:r>
+              <a:rPr lang="sv-SE" sz="1000" dirty="0">
+                <a:solidFill>
+                  <a:schemeClr val="tx1"/>
+                </a:solidFill>
+                <a:latin typeface="Arial" panose="020B0604020202020204" pitchFamily="34" charset="0"/>
+                <a:cs typeface="Arial" panose="020B0604020202020204" pitchFamily="34" charset="0"/>
+              </a:rPr>
+              <a:t> </a:t>
+            </a:r>
+            <a:r>
+              <a:rPr lang="sv-SE" sz="1000" dirty="0" err="1">
+                <a:solidFill>
+                  <a:schemeClr val="tx1"/>
+                </a:solidFill>
+                <a:latin typeface="Arial" panose="020B0604020202020204" pitchFamily="34" charset="0"/>
+                <a:cs typeface="Arial" panose="020B0604020202020204" pitchFamily="34" charset="0"/>
+              </a:rPr>
+              <a:t>requirements</a:t>
+            </a:r>
+            <a:r>
+              <a:rPr lang="sv-SE" sz="1000" dirty="0">
+                <a:solidFill>
+                  <a:schemeClr val="tx1"/>
+                </a:solidFill>
+                <a:latin typeface="Arial" panose="020B0604020202020204" pitchFamily="34" charset="0"/>
+                <a:cs typeface="Arial" panose="020B0604020202020204" pitchFamily="34" charset="0"/>
+              </a:rPr>
+              <a:t> </a:t>
+            </a:r>
+            <a:r>
+              <a:rPr lang="sv-SE" sz="1000" dirty="0" err="1">
+                <a:solidFill>
+                  <a:schemeClr val="tx1"/>
+                </a:solidFill>
+                <a:latin typeface="Arial" panose="020B0604020202020204" pitchFamily="34" charset="0"/>
+                <a:cs typeface="Arial" panose="020B0604020202020204" pitchFamily="34" charset="0"/>
+              </a:rPr>
+              <a:t>allocated</a:t>
+            </a:r>
+            <a:r>
+              <a:rPr lang="sv-SE" sz="1000" dirty="0">
+                <a:solidFill>
+                  <a:schemeClr val="tx1"/>
+                </a:solidFill>
+                <a:latin typeface="Arial" panose="020B0604020202020204" pitchFamily="34" charset="0"/>
+                <a:cs typeface="Arial" panose="020B0604020202020204" pitchFamily="34" charset="0"/>
+              </a:rPr>
+              <a:t> to ML </a:t>
+            </a:r>
+            <a:r>
+              <a:rPr lang="sv-SE" sz="1000" dirty="0" err="1">
+                <a:solidFill>
+                  <a:schemeClr val="tx1"/>
+                </a:solidFill>
+                <a:latin typeface="Arial" panose="020B0604020202020204" pitchFamily="34" charset="0"/>
+                <a:cs typeface="Arial" panose="020B0604020202020204" pitchFamily="34" charset="0"/>
+              </a:rPr>
+              <a:t>component</a:t>
+            </a:r>
+            <a:r>
+              <a:rPr lang="sv-SE" sz="1000" dirty="0">
+                <a:solidFill>
+                  <a:schemeClr val="tx1"/>
+                </a:solidFill>
+                <a:latin typeface="Arial" panose="020B0604020202020204" pitchFamily="34" charset="0"/>
+                <a:cs typeface="Arial" panose="020B0604020202020204" pitchFamily="34" charset="0"/>
+              </a:rPr>
+              <a:t>.</a:t>
+            </a:r>
+          </a:p>
+        </p:txBody>
+      </p:sp>
+      <p:sp>
+        <p:nvSpPr>
+          <p:cNvPr id="30" name="textruta 29">
+            <a:extLst>
+              <a:ext uri="{FF2B5EF4-FFF2-40B4-BE49-F238E27FC236}">
+                <a16:creationId xmlns:a16="http://schemas.microsoft.com/office/drawing/2014/main" id="{9BACA362-543A-4AA7-B487-09C0D56DA1F2}"/>
+              </a:ext>
+            </a:extLst>
+          </p:cNvPr>
+          <p:cNvSpPr txBox="1"/>
+          <p:nvPr/>
+        </p:nvSpPr>
+        <p:spPr>
+          <a:xfrm>
+            <a:off x="7939177" y="1352886"/>
+            <a:ext cx="470001" cy="276999"/>
+          </a:xfrm>
+          <a:prstGeom prst="rect">
+            <a:avLst/>
+          </a:prstGeom>
+          <a:noFill/>
+        </p:spPr>
+        <p:txBody>
+          <a:bodyPr wrap="square">
+            <a:spAutoFit/>
+          </a:bodyPr>
+          <a:lstStyle/>
+          <a:p>
+            <a:r>
+              <a:rPr lang="sv-SE" sz="1200" dirty="0">
+                <a:latin typeface="Arial" panose="020B0604020202020204" pitchFamily="34" charset="0"/>
+                <a:cs typeface="Arial" panose="020B0604020202020204" pitchFamily="34" charset="0"/>
+              </a:rPr>
+              <a:t>[E]</a:t>
+            </a:r>
+            <a:endParaRPr lang="sv-SE" sz="1200" dirty="0"/>
+          </a:p>
+        </p:txBody>
+      </p:sp>
+      <p:grpSp>
+        <p:nvGrpSpPr>
+          <p:cNvPr id="32" name="Grupp 31">
+            <a:extLst>
+              <a:ext uri="{FF2B5EF4-FFF2-40B4-BE49-F238E27FC236}">
+                <a16:creationId xmlns:a16="http://schemas.microsoft.com/office/drawing/2014/main" id="{449A549F-098E-4DCF-AB72-CB67C55F9858}"/>
+              </a:ext>
+            </a:extLst>
+          </p:cNvPr>
+          <p:cNvGrpSpPr/>
+          <p:nvPr/>
+        </p:nvGrpSpPr>
+        <p:grpSpPr>
+          <a:xfrm rot="14819587">
+            <a:off x="7283777" y="1477919"/>
+            <a:ext cx="175562" cy="1127001"/>
+            <a:chOff x="3240634" y="4169664"/>
+            <a:chExt cx="175562" cy="1127001"/>
+          </a:xfrm>
+        </p:grpSpPr>
+        <p:sp>
+          <p:nvSpPr>
+            <p:cNvPr id="33" name="Likbent triangel 32">
+              <a:extLst>
+                <a:ext uri="{FF2B5EF4-FFF2-40B4-BE49-F238E27FC236}">
+                  <a16:creationId xmlns:a16="http://schemas.microsoft.com/office/drawing/2014/main" id="{652D3AE8-DFFB-4548-80EB-4B163AA4B4DD}"/>
+                </a:ext>
+              </a:extLst>
+            </p:cNvPr>
+            <p:cNvSpPr/>
+            <p:nvPr/>
+          </p:nvSpPr>
+          <p:spPr>
+            <a:xfrm rot="10800000">
+              <a:off x="3240634" y="5164531"/>
+              <a:ext cx="175562" cy="132134"/>
+            </a:xfrm>
+            <a:prstGeom prst="triangle">
+              <a:avLst/>
+            </a:prstGeom>
+            <a:ln>
+              <a:solidFill>
+                <a:schemeClr val="tx1"/>
+              </a:solidFill>
+            </a:ln>
+          </p:spPr>
+          <p:style>
+            <a:lnRef idx="1">
+              <a:schemeClr val="accent1"/>
+            </a:lnRef>
+            <a:fillRef idx="0">
+              <a:schemeClr val="accent1"/>
+            </a:fillRef>
+            <a:effectRef idx="0">
+              <a:schemeClr val="accent1"/>
+            </a:effectRef>
+            <a:fontRef idx="minor">
+              <a:schemeClr val="tx1"/>
+            </a:fontRef>
+          </p:style>
+          <p:txBody>
+            <a:bodyPr rtlCol="0" anchor="ctr"/>
+            <a:lstStyle/>
+            <a:p>
+              <a:pPr algn="ctr"/>
+              <a:endParaRPr lang="sv-SE"/>
+            </a:p>
+          </p:txBody>
+        </p:sp>
+        <p:cxnSp>
+          <p:nvCxnSpPr>
+            <p:cNvPr id="34" name="Rak koppling 33">
+              <a:extLst>
+                <a:ext uri="{FF2B5EF4-FFF2-40B4-BE49-F238E27FC236}">
+                  <a16:creationId xmlns:a16="http://schemas.microsoft.com/office/drawing/2014/main" id="{3E0FFEB2-3456-45F5-96FA-9851D1609692}"/>
+                </a:ext>
+              </a:extLst>
+            </p:cNvPr>
+            <p:cNvCxnSpPr>
+              <a:stCxn id="33" idx="3"/>
+            </p:cNvCxnSpPr>
+            <p:nvPr/>
+          </p:nvCxnSpPr>
+          <p:spPr>
+            <a:xfrm flipV="1">
+              <a:off x="3328415" y="4169664"/>
+              <a:ext cx="1" cy="994867"/>
+            </a:xfrm>
+            <a:prstGeom prst="line">
+              <a:avLst/>
+            </a:prstGeom>
+            <a:ln>
+              <a:solidFill>
+                <a:schemeClr val="tx1"/>
+              </a:solidFill>
+            </a:ln>
+          </p:spPr>
+          <p:style>
+            <a:lnRef idx="1">
+              <a:schemeClr val="accent1"/>
+            </a:lnRef>
+            <a:fillRef idx="0">
+              <a:schemeClr val="accent1"/>
+            </a:fillRef>
+            <a:effectRef idx="0">
+              <a:schemeClr val="accent1"/>
+            </a:effectRef>
+            <a:fontRef idx="minor">
+              <a:schemeClr val="tx1"/>
+            </a:fontRef>
+          </p:style>
+        </p:cxnSp>
+      </p:grpSp>
+      <p:grpSp>
+        <p:nvGrpSpPr>
+          <p:cNvPr id="36" name="Grupp 35">
+            <a:extLst>
+              <a:ext uri="{FF2B5EF4-FFF2-40B4-BE49-F238E27FC236}">
+                <a16:creationId xmlns:a16="http://schemas.microsoft.com/office/drawing/2014/main" id="{26181C14-BE29-4B11-99C3-87554FA83C91}"/>
+              </a:ext>
+            </a:extLst>
+          </p:cNvPr>
+          <p:cNvGrpSpPr/>
+          <p:nvPr/>
+        </p:nvGrpSpPr>
+        <p:grpSpPr>
+          <a:xfrm rot="17288571">
+            <a:off x="7303207" y="2337541"/>
+            <a:ext cx="175562" cy="1127001"/>
+            <a:chOff x="3240634" y="4169664"/>
+            <a:chExt cx="175562" cy="1127001"/>
+          </a:xfrm>
+        </p:grpSpPr>
+        <p:sp>
+          <p:nvSpPr>
+            <p:cNvPr id="37" name="Likbent triangel 36">
+              <a:extLst>
+                <a:ext uri="{FF2B5EF4-FFF2-40B4-BE49-F238E27FC236}">
+                  <a16:creationId xmlns:a16="http://schemas.microsoft.com/office/drawing/2014/main" id="{C9492DD0-6736-4B6A-BD11-19602839941F}"/>
+                </a:ext>
+              </a:extLst>
+            </p:cNvPr>
+            <p:cNvSpPr/>
+            <p:nvPr/>
+          </p:nvSpPr>
+          <p:spPr>
+            <a:xfrm rot="10800000">
+              <a:off x="3240634" y="5164531"/>
+              <a:ext cx="175562" cy="132134"/>
+            </a:xfrm>
+            <a:prstGeom prst="triangle">
+              <a:avLst/>
+            </a:prstGeom>
+            <a:ln>
+              <a:solidFill>
+                <a:schemeClr val="tx1"/>
+              </a:solidFill>
+            </a:ln>
+          </p:spPr>
+          <p:style>
+            <a:lnRef idx="1">
+              <a:schemeClr val="accent1"/>
+            </a:lnRef>
+            <a:fillRef idx="0">
+              <a:schemeClr val="accent1"/>
+            </a:fillRef>
+            <a:effectRef idx="0">
+              <a:schemeClr val="accent1"/>
+            </a:effectRef>
+            <a:fontRef idx="minor">
+              <a:schemeClr val="tx1"/>
+            </a:fontRef>
+          </p:style>
+          <p:txBody>
+            <a:bodyPr rtlCol="0" anchor="ctr"/>
+            <a:lstStyle/>
+            <a:p>
+              <a:pPr algn="ctr"/>
+              <a:endParaRPr lang="sv-SE"/>
+            </a:p>
+          </p:txBody>
+        </p:sp>
+        <p:cxnSp>
+          <p:nvCxnSpPr>
+            <p:cNvPr id="38" name="Rak koppling 37">
+              <a:extLst>
+                <a:ext uri="{FF2B5EF4-FFF2-40B4-BE49-F238E27FC236}">
+                  <a16:creationId xmlns:a16="http://schemas.microsoft.com/office/drawing/2014/main" id="{1415F64D-ED7D-4254-83E8-266EB37E6857}"/>
+                </a:ext>
+              </a:extLst>
+            </p:cNvPr>
+            <p:cNvCxnSpPr>
+              <a:stCxn id="37" idx="3"/>
+            </p:cNvCxnSpPr>
+            <p:nvPr/>
+          </p:nvCxnSpPr>
+          <p:spPr>
+            <a:xfrm flipV="1">
+              <a:off x="3328415" y="4169664"/>
+              <a:ext cx="1" cy="994867"/>
+            </a:xfrm>
+            <a:prstGeom prst="line">
+              <a:avLst/>
+            </a:prstGeom>
+            <a:ln>
+              <a:solidFill>
+                <a:schemeClr val="tx1"/>
+              </a:solidFill>
+            </a:ln>
+          </p:spPr>
+          <p:style>
+            <a:lnRef idx="1">
+              <a:schemeClr val="accent1"/>
+            </a:lnRef>
+            <a:fillRef idx="0">
+              <a:schemeClr val="accent1"/>
+            </a:fillRef>
+            <a:effectRef idx="0">
+              <a:schemeClr val="accent1"/>
+            </a:effectRef>
+            <a:fontRef idx="minor">
+              <a:schemeClr val="tx1"/>
+            </a:fontRef>
+          </p:style>
+        </p:cxnSp>
+      </p:grpSp>
+      <p:sp>
+        <p:nvSpPr>
+          <p:cNvPr id="43" name="textruta 42">
+            <a:extLst>
+              <a:ext uri="{FF2B5EF4-FFF2-40B4-BE49-F238E27FC236}">
+                <a16:creationId xmlns:a16="http://schemas.microsoft.com/office/drawing/2014/main" id="{91AABA00-9DCD-4004-B9EE-9E4374DAB050}"/>
+              </a:ext>
+            </a:extLst>
+          </p:cNvPr>
+          <p:cNvSpPr txBox="1"/>
+          <p:nvPr/>
+        </p:nvSpPr>
+        <p:spPr>
+          <a:xfrm>
+            <a:off x="9718888" y="3603545"/>
+            <a:ext cx="367586" cy="307777"/>
+          </a:xfrm>
+          <a:prstGeom prst="rect">
+            <a:avLst/>
+          </a:prstGeom>
+          <a:noFill/>
+        </p:spPr>
+        <p:txBody>
+          <a:bodyPr wrap="square">
+            <a:spAutoFit/>
+          </a:bodyPr>
+          <a:lstStyle/>
+          <a:p>
+            <a:r>
+              <a:rPr lang="sv-SE" sz="1400" dirty="0">
+                <a:latin typeface="Arial" panose="020B0604020202020204" pitchFamily="34" charset="0"/>
+                <a:cs typeface="Arial" panose="020B0604020202020204" pitchFamily="34" charset="0"/>
+              </a:rPr>
+              <a:t>A</a:t>
+            </a:r>
+            <a:endParaRPr lang="sv-SE" sz="1400" dirty="0"/>
+          </a:p>
+        </p:txBody>
+      </p:sp>
+      <p:sp>
+        <p:nvSpPr>
+          <p:cNvPr id="44" name="Ellips 43">
+            <a:extLst>
+              <a:ext uri="{FF2B5EF4-FFF2-40B4-BE49-F238E27FC236}">
+                <a16:creationId xmlns:a16="http://schemas.microsoft.com/office/drawing/2014/main" id="{7AE609A4-2090-4BE5-B879-0C9FD26B33CB}"/>
+              </a:ext>
+            </a:extLst>
+          </p:cNvPr>
+          <p:cNvSpPr/>
+          <p:nvPr/>
+        </p:nvSpPr>
+        <p:spPr>
+          <a:xfrm>
+            <a:off x="7829425" y="2714071"/>
+            <a:ext cx="2201198" cy="1195772"/>
+          </a:xfrm>
+          <a:prstGeom prst="ellipse">
+            <a:avLst/>
+          </a:prstGeom>
+          <a:solidFill>
+            <a:schemeClr val="bg2"/>
+          </a:solidFill>
+          <a:ln w="6350">
+            <a:solidFill>
+              <a:schemeClr val="tx1"/>
+            </a:solidFill>
+          </a:ln>
+        </p:spPr>
+        <p:style>
+          <a:lnRef idx="2">
+            <a:schemeClr val="accent1">
+              <a:shade val="50000"/>
+            </a:schemeClr>
+          </a:lnRef>
+          <a:fillRef idx="1">
+            <a:schemeClr val="accent1"/>
+          </a:fillRef>
+          <a:effectRef idx="0">
+            <a:schemeClr val="accent1"/>
+          </a:effectRef>
+          <a:fontRef idx="minor">
+            <a:schemeClr val="lt1"/>
+          </a:fontRef>
+        </p:style>
+        <p:txBody>
+          <a:bodyPr wrap="square" rtlCol="0" anchor="ctr">
+            <a:noAutofit/>
+          </a:bodyPr>
+          <a:lstStyle/>
+          <a:p>
+            <a:pPr algn="ctr"/>
+            <a:r>
+              <a:rPr lang="en-US" sz="1000" b="1" dirty="0">
+                <a:solidFill>
+                  <a:schemeClr val="tx1"/>
+                </a:solidFill>
+                <a:latin typeface="Arial" panose="020B0604020202020204" pitchFamily="34" charset="0"/>
+                <a:cs typeface="Arial" panose="020B0604020202020204" pitchFamily="34" charset="0"/>
+              </a:rPr>
+              <a:t>A1.1</a:t>
+            </a:r>
+          </a:p>
+          <a:p>
+            <a:pPr algn="ctr"/>
+            <a:r>
+              <a:rPr lang="en-US" sz="1000" dirty="0">
+                <a:solidFill>
+                  <a:schemeClr val="tx1"/>
+                </a:solidFill>
+                <a:latin typeface="Arial" panose="020B0604020202020204" pitchFamily="34" charset="0"/>
+                <a:cs typeface="Arial" panose="020B0604020202020204" pitchFamily="34" charset="0"/>
+              </a:rPr>
+              <a:t>The system safety process has identified the system requirements allocated to the ML component </a:t>
+            </a:r>
+            <a:endParaRPr lang="sv-SE" sz="1000" dirty="0">
+              <a:solidFill>
+                <a:schemeClr val="tx1"/>
+              </a:solidFill>
+              <a:latin typeface="Arial" panose="020B0604020202020204" pitchFamily="34" charset="0"/>
+              <a:cs typeface="Arial" panose="020B0604020202020204" pitchFamily="34" charset="0"/>
+            </a:endParaRPr>
+          </a:p>
+        </p:txBody>
+      </p:sp>
+      <p:grpSp>
+        <p:nvGrpSpPr>
+          <p:cNvPr id="46" name="Grupp 45">
+            <a:extLst>
+              <a:ext uri="{FF2B5EF4-FFF2-40B4-BE49-F238E27FC236}">
+                <a16:creationId xmlns:a16="http://schemas.microsoft.com/office/drawing/2014/main" id="{147B3899-6D1A-403B-ABF0-C3C414A1EFDF}"/>
+              </a:ext>
+            </a:extLst>
+          </p:cNvPr>
+          <p:cNvGrpSpPr/>
+          <p:nvPr/>
+        </p:nvGrpSpPr>
+        <p:grpSpPr>
+          <a:xfrm rot="10800000">
+            <a:off x="5951457" y="3152991"/>
+            <a:ext cx="175562" cy="1127001"/>
+            <a:chOff x="3240634" y="4169664"/>
+            <a:chExt cx="175562" cy="1127001"/>
+          </a:xfrm>
+        </p:grpSpPr>
+        <p:sp>
+          <p:nvSpPr>
+            <p:cNvPr id="47" name="Likbent triangel 46">
+              <a:extLst>
+                <a:ext uri="{FF2B5EF4-FFF2-40B4-BE49-F238E27FC236}">
+                  <a16:creationId xmlns:a16="http://schemas.microsoft.com/office/drawing/2014/main" id="{ED95F2E0-A1FC-403D-A8FE-43A94EA54CB2}"/>
+                </a:ext>
+              </a:extLst>
+            </p:cNvPr>
+            <p:cNvSpPr/>
+            <p:nvPr/>
+          </p:nvSpPr>
+          <p:spPr>
+            <a:xfrm rot="10800000">
+              <a:off x="3240634" y="5164531"/>
+              <a:ext cx="175562" cy="132134"/>
+            </a:xfrm>
+            <a:prstGeom prst="triangle">
+              <a:avLst/>
+            </a:prstGeom>
+            <a:ln>
+              <a:solidFill>
+                <a:schemeClr val="tx1"/>
+              </a:solidFill>
+            </a:ln>
+          </p:spPr>
+          <p:style>
+            <a:lnRef idx="1">
+              <a:schemeClr val="accent1"/>
+            </a:lnRef>
+            <a:fillRef idx="0">
+              <a:schemeClr val="accent1"/>
+            </a:fillRef>
+            <a:effectRef idx="0">
+              <a:schemeClr val="accent1"/>
+            </a:effectRef>
+            <a:fontRef idx="minor">
+              <a:schemeClr val="tx1"/>
+            </a:fontRef>
+          </p:style>
+          <p:txBody>
+            <a:bodyPr rtlCol="0" anchor="ctr"/>
+            <a:lstStyle/>
+            <a:p>
+              <a:pPr algn="ctr"/>
+              <a:endParaRPr lang="sv-SE"/>
+            </a:p>
+          </p:txBody>
+        </p:sp>
+        <p:cxnSp>
+          <p:nvCxnSpPr>
+            <p:cNvPr id="48" name="Rak koppling 47">
+              <a:extLst>
+                <a:ext uri="{FF2B5EF4-FFF2-40B4-BE49-F238E27FC236}">
+                  <a16:creationId xmlns:a16="http://schemas.microsoft.com/office/drawing/2014/main" id="{AF749468-FC0A-4005-B2A3-650D1911DC35}"/>
+                </a:ext>
+              </a:extLst>
+            </p:cNvPr>
+            <p:cNvCxnSpPr>
+              <a:stCxn id="47" idx="3"/>
+            </p:cNvCxnSpPr>
+            <p:nvPr/>
+          </p:nvCxnSpPr>
+          <p:spPr>
+            <a:xfrm flipV="1">
+              <a:off x="3328415" y="4169664"/>
+              <a:ext cx="1" cy="994867"/>
+            </a:xfrm>
+            <a:prstGeom prst="line">
+              <a:avLst/>
+            </a:prstGeom>
+            <a:ln>
+              <a:solidFill>
+                <a:schemeClr val="tx1"/>
+              </a:solidFill>
+            </a:ln>
+          </p:spPr>
+          <p:style>
+            <a:lnRef idx="1">
+              <a:schemeClr val="accent1"/>
+            </a:lnRef>
+            <a:fillRef idx="0">
+              <a:schemeClr val="accent1"/>
+            </a:fillRef>
+            <a:effectRef idx="0">
+              <a:schemeClr val="accent1"/>
+            </a:effectRef>
+            <a:fontRef idx="minor">
+              <a:schemeClr val="tx1"/>
+            </a:fontRef>
+          </p:style>
+        </p:cxnSp>
+      </p:grpSp>
+      <p:sp>
+        <p:nvSpPr>
+          <p:cNvPr id="45" name="Parallellogram 44">
+            <a:extLst>
+              <a:ext uri="{FF2B5EF4-FFF2-40B4-BE49-F238E27FC236}">
+                <a16:creationId xmlns:a16="http://schemas.microsoft.com/office/drawing/2014/main" id="{F037D520-9518-4334-8D65-7B273A352793}"/>
+              </a:ext>
+            </a:extLst>
+          </p:cNvPr>
+          <p:cNvSpPr/>
+          <p:nvPr/>
+        </p:nvSpPr>
+        <p:spPr>
+          <a:xfrm>
+            <a:off x="5047488" y="3916560"/>
+            <a:ext cx="1983502" cy="975651"/>
+          </a:xfrm>
+          <a:prstGeom prst="parallelogram">
+            <a:avLst/>
+          </a:prstGeom>
+          <a:solidFill>
+            <a:schemeClr val="bg2"/>
+          </a:solidFill>
+          <a:ln w="6350">
+            <a:solidFill>
+              <a:schemeClr val="tx1"/>
+            </a:solidFill>
+          </a:ln>
+        </p:spPr>
+        <p:style>
+          <a:lnRef idx="2">
+            <a:schemeClr val="accent1">
+              <a:shade val="50000"/>
+            </a:schemeClr>
+          </a:lnRef>
+          <a:fillRef idx="1">
+            <a:schemeClr val="accent1"/>
+          </a:fillRef>
+          <a:effectRef idx="0">
+            <a:schemeClr val="accent1"/>
+          </a:effectRef>
+          <a:fontRef idx="minor">
+            <a:schemeClr val="lt1"/>
+          </a:fontRef>
+        </p:style>
+        <p:txBody>
+          <a:bodyPr wrap="square" rtlCol="0" anchor="ctr">
+            <a:noAutofit/>
+          </a:bodyPr>
+          <a:lstStyle/>
+          <a:p>
+            <a:pPr algn="ctr"/>
+            <a:r>
+              <a:rPr lang="en-US" sz="1000" b="1" dirty="0">
+                <a:solidFill>
+                  <a:schemeClr val="tx1"/>
+                </a:solidFill>
+                <a:latin typeface="Arial" panose="020B0604020202020204" pitchFamily="34" charset="0"/>
+                <a:cs typeface="Arial" panose="020B0604020202020204" pitchFamily="34" charset="0"/>
+              </a:rPr>
+              <a:t>S1.1</a:t>
+            </a:r>
+          </a:p>
+          <a:p>
+            <a:pPr algn="ctr"/>
+            <a:r>
+              <a:rPr lang="en-US" sz="1000" dirty="0">
+                <a:solidFill>
+                  <a:schemeClr val="tx1"/>
+                </a:solidFill>
+                <a:latin typeface="Arial" panose="020B0604020202020204" pitchFamily="34" charset="0"/>
+                <a:cs typeface="Arial" panose="020B0604020202020204" pitchFamily="34" charset="0"/>
+              </a:rPr>
+              <a:t>Argument over the development and deployment of the ML component</a:t>
+            </a:r>
+            <a:endParaRPr lang="sv-SE" sz="1000" dirty="0">
+              <a:solidFill>
+                <a:schemeClr val="tx1"/>
+              </a:solidFill>
+              <a:latin typeface="Arial" panose="020B0604020202020204" pitchFamily="34" charset="0"/>
+              <a:cs typeface="Arial" panose="020B0604020202020204" pitchFamily="34" charset="0"/>
+            </a:endParaRPr>
+          </a:p>
+        </p:txBody>
+      </p:sp>
+      <p:sp>
+        <p:nvSpPr>
+          <p:cNvPr id="4" name="Likbent triangel 3">
+            <a:extLst>
+              <a:ext uri="{FF2B5EF4-FFF2-40B4-BE49-F238E27FC236}">
+                <a16:creationId xmlns:a16="http://schemas.microsoft.com/office/drawing/2014/main" id="{1AA59B87-3C0C-48C9-AA3E-52E74F8B6783}"/>
+              </a:ext>
+            </a:extLst>
+          </p:cNvPr>
+          <p:cNvSpPr/>
+          <p:nvPr/>
+        </p:nvSpPr>
+        <p:spPr>
+          <a:xfrm rot="10800000">
+            <a:off x="5973071" y="3785487"/>
+            <a:ext cx="143443" cy="131074"/>
+          </a:xfrm>
+          <a:prstGeom prst="triangle">
+            <a:avLst/>
+          </a:prstGeom>
+          <a:solidFill>
+            <a:schemeClr val="tx1"/>
+          </a:solidFill>
+          <a:ln>
+            <a:noFill/>
+          </a:ln>
+        </p:spPr>
+        <p:style>
+          <a:lnRef idx="2">
+            <a:schemeClr val="accent1">
+              <a:shade val="50000"/>
+            </a:schemeClr>
+          </a:lnRef>
+          <a:fillRef idx="1">
+            <a:schemeClr val="accent1"/>
+          </a:fillRef>
+          <a:effectRef idx="0">
+            <a:schemeClr val="accent1"/>
+          </a:effectRef>
+          <a:fontRef idx="minor">
+            <a:schemeClr val="lt1"/>
+          </a:fontRef>
+        </p:style>
+        <p:txBody>
+          <a:bodyPr rtlCol="0" anchor="ctr"/>
+          <a:lstStyle/>
+          <a:p>
+            <a:pPr algn="ctr"/>
+            <a:endParaRPr lang="sv-SE"/>
+          </a:p>
+        </p:txBody>
+      </p:sp>
+      <p:sp>
+        <p:nvSpPr>
+          <p:cNvPr id="49" name="textruta 48">
+            <a:extLst>
+              <a:ext uri="{FF2B5EF4-FFF2-40B4-BE49-F238E27FC236}">
+                <a16:creationId xmlns:a16="http://schemas.microsoft.com/office/drawing/2014/main" id="{3D664287-CFB1-46AB-ADD8-5379B12334D6}"/>
+              </a:ext>
+            </a:extLst>
+          </p:cNvPr>
+          <p:cNvSpPr txBox="1"/>
+          <p:nvPr/>
+        </p:nvSpPr>
+        <p:spPr>
+          <a:xfrm>
+            <a:off x="1190189" y="400551"/>
+            <a:ext cx="6097218" cy="369332"/>
+          </a:xfrm>
+          <a:prstGeom prst="rect">
+            <a:avLst/>
+          </a:prstGeom>
+          <a:noFill/>
+        </p:spPr>
+        <p:txBody>
+          <a:bodyPr wrap="square">
+            <a:spAutoFit/>
+          </a:bodyPr>
+          <a:lstStyle/>
+          <a:p>
+            <a:r>
+              <a:rPr lang="sv-SE" dirty="0">
+                <a:solidFill>
+                  <a:sysClr val="windowText" lastClr="000000"/>
+                </a:solidFill>
+                <a:latin typeface="Arial" panose="020B0604020202020204" pitchFamily="34" charset="0"/>
+                <a:cs typeface="Arial" panose="020B0604020202020204" pitchFamily="34" charset="0"/>
+              </a:rPr>
+              <a:t>ML Assurance </a:t>
+            </a:r>
+            <a:r>
+              <a:rPr lang="sv-SE" dirty="0" err="1">
+                <a:solidFill>
+                  <a:sysClr val="windowText" lastClr="000000"/>
+                </a:solidFill>
+                <a:latin typeface="Arial" panose="020B0604020202020204" pitchFamily="34" charset="0"/>
+                <a:cs typeface="Arial" panose="020B0604020202020204" pitchFamily="34" charset="0"/>
+              </a:rPr>
+              <a:t>Scoping</a:t>
+            </a:r>
+            <a:r>
+              <a:rPr lang="sv-SE" dirty="0">
+                <a:solidFill>
+                  <a:sysClr val="windowText" lastClr="000000"/>
+                </a:solidFill>
+                <a:latin typeface="Arial" panose="020B0604020202020204" pitchFamily="34" charset="0"/>
+                <a:cs typeface="Arial" panose="020B0604020202020204" pitchFamily="34" charset="0"/>
+              </a:rPr>
+              <a:t> Argument </a:t>
+            </a:r>
+            <a:r>
+              <a:rPr lang="sv-SE" dirty="0" err="1">
+                <a:solidFill>
+                  <a:sysClr val="windowText" lastClr="000000"/>
+                </a:solidFill>
+                <a:latin typeface="Arial" panose="020B0604020202020204" pitchFamily="34" charset="0"/>
+                <a:cs typeface="Arial" panose="020B0604020202020204" pitchFamily="34" charset="0"/>
+              </a:rPr>
+              <a:t>Pattern</a:t>
+            </a:r>
+            <a:endParaRPr lang="sv-SE" dirty="0"/>
+          </a:p>
+        </p:txBody>
+      </p:sp>
+      <p:cxnSp>
+        <p:nvCxnSpPr>
+          <p:cNvPr id="50" name="Rak pilkoppling 49">
+            <a:extLst>
+              <a:ext uri="{FF2B5EF4-FFF2-40B4-BE49-F238E27FC236}">
+                <a16:creationId xmlns:a16="http://schemas.microsoft.com/office/drawing/2014/main" id="{C01A0275-16B2-4B8F-A32E-A89420051429}"/>
+              </a:ext>
+            </a:extLst>
+          </p:cNvPr>
+          <p:cNvCxnSpPr>
+            <a:cxnSpLocks/>
+            <a:stCxn id="45" idx="3"/>
+          </p:cNvCxnSpPr>
+          <p:nvPr/>
+        </p:nvCxnSpPr>
+        <p:spPr>
+          <a:xfrm flipH="1">
+            <a:off x="5405933" y="4892211"/>
+            <a:ext cx="511350" cy="418624"/>
+          </a:xfrm>
+          <a:prstGeom prst="straightConnector1">
+            <a:avLst/>
+          </a:prstGeom>
+          <a:ln>
+            <a:solidFill>
+              <a:schemeClr val="tx1"/>
+            </a:solidFill>
+            <a:tailEnd type="triangle"/>
+          </a:ln>
+        </p:spPr>
+        <p:style>
+          <a:lnRef idx="1">
+            <a:schemeClr val="accent1"/>
+          </a:lnRef>
+          <a:fillRef idx="0">
+            <a:schemeClr val="accent1"/>
+          </a:fillRef>
+          <a:effectRef idx="0">
+            <a:schemeClr val="accent1"/>
+          </a:effectRef>
+          <a:fontRef idx="minor">
+            <a:schemeClr val="tx1"/>
+          </a:fontRef>
+        </p:style>
+      </p:cxnSp>
+      <p:cxnSp>
+        <p:nvCxnSpPr>
+          <p:cNvPr id="51" name="Rak pilkoppling 50">
+            <a:extLst>
+              <a:ext uri="{FF2B5EF4-FFF2-40B4-BE49-F238E27FC236}">
+                <a16:creationId xmlns:a16="http://schemas.microsoft.com/office/drawing/2014/main" id="{4A7C0788-CEE6-4468-8DE9-D630CDF665C5}"/>
+              </a:ext>
+            </a:extLst>
+          </p:cNvPr>
+          <p:cNvCxnSpPr>
+            <a:cxnSpLocks/>
+            <a:stCxn id="45" idx="4"/>
+          </p:cNvCxnSpPr>
+          <p:nvPr/>
+        </p:nvCxnSpPr>
+        <p:spPr>
+          <a:xfrm>
+            <a:off x="6039239" y="4892211"/>
+            <a:ext cx="500550" cy="418624"/>
+          </a:xfrm>
+          <a:prstGeom prst="straightConnector1">
+            <a:avLst/>
+          </a:prstGeom>
+          <a:ln>
+            <a:solidFill>
+              <a:schemeClr val="tx1"/>
+            </a:solidFill>
+            <a:tailEnd type="triangle"/>
+          </a:ln>
+        </p:spPr>
+        <p:style>
+          <a:lnRef idx="1">
+            <a:schemeClr val="accent1"/>
+          </a:lnRef>
+          <a:fillRef idx="0">
+            <a:schemeClr val="accent1"/>
+          </a:fillRef>
+          <a:effectRef idx="0">
+            <a:schemeClr val="accent1"/>
+          </a:effectRef>
+          <a:fontRef idx="minor">
+            <a:schemeClr val="tx1"/>
+          </a:fontRef>
+        </p:style>
+      </p:cxnSp>
+      <p:sp>
+        <p:nvSpPr>
+          <p:cNvPr id="52" name="Likbent triangel 51">
+            <a:extLst>
+              <a:ext uri="{FF2B5EF4-FFF2-40B4-BE49-F238E27FC236}">
+                <a16:creationId xmlns:a16="http://schemas.microsoft.com/office/drawing/2014/main" id="{943B6FB2-D0D0-42B5-BE80-05ACA3F7B1C8}"/>
+              </a:ext>
+            </a:extLst>
+          </p:cNvPr>
+          <p:cNvSpPr/>
+          <p:nvPr/>
+        </p:nvSpPr>
+        <p:spPr>
+          <a:xfrm rot="10800000">
+            <a:off x="5269512" y="5318152"/>
+            <a:ext cx="272842" cy="176164"/>
+          </a:xfrm>
+          <a:prstGeom prst="triangle">
+            <a:avLst/>
+          </a:prstGeom>
+          <a:solidFill>
+            <a:schemeClr val="tx1"/>
+          </a:solidFill>
+          <a:ln>
+            <a:noFill/>
+          </a:ln>
+        </p:spPr>
+        <p:style>
+          <a:lnRef idx="2">
+            <a:schemeClr val="accent1">
+              <a:shade val="50000"/>
+            </a:schemeClr>
+          </a:lnRef>
+          <a:fillRef idx="1">
+            <a:schemeClr val="accent1"/>
+          </a:fillRef>
+          <a:effectRef idx="0">
+            <a:schemeClr val="accent1"/>
+          </a:effectRef>
+          <a:fontRef idx="minor">
+            <a:schemeClr val="lt1"/>
+          </a:fontRef>
+        </p:style>
+        <p:txBody>
+          <a:bodyPr rtlCol="0" anchor="ctr"/>
+          <a:lstStyle/>
+          <a:p>
+            <a:pPr algn="ctr"/>
+            <a:endParaRPr lang="sv-SE"/>
+          </a:p>
+        </p:txBody>
+      </p:sp>
+      <p:sp>
+        <p:nvSpPr>
+          <p:cNvPr id="53" name="Likbent triangel 52">
+            <a:extLst>
+              <a:ext uri="{FF2B5EF4-FFF2-40B4-BE49-F238E27FC236}">
+                <a16:creationId xmlns:a16="http://schemas.microsoft.com/office/drawing/2014/main" id="{BF3A65E8-D0B6-40CA-A24B-EE480991F14B}"/>
+              </a:ext>
+            </a:extLst>
+          </p:cNvPr>
+          <p:cNvSpPr/>
+          <p:nvPr/>
+        </p:nvSpPr>
+        <p:spPr>
+          <a:xfrm rot="10800000">
+            <a:off x="6403368" y="5324513"/>
+            <a:ext cx="272842" cy="176164"/>
+          </a:xfrm>
+          <a:prstGeom prst="triangle">
+            <a:avLst/>
+          </a:prstGeom>
+          <a:solidFill>
+            <a:schemeClr val="tx1"/>
+          </a:solidFill>
+          <a:ln>
+            <a:noFill/>
+          </a:ln>
+        </p:spPr>
+        <p:style>
+          <a:lnRef idx="2">
+            <a:schemeClr val="accent1">
+              <a:shade val="50000"/>
+            </a:schemeClr>
+          </a:lnRef>
+          <a:fillRef idx="1">
+            <a:schemeClr val="accent1"/>
+          </a:fillRef>
+          <a:effectRef idx="0">
+            <a:schemeClr val="accent1"/>
+          </a:effectRef>
+          <a:fontRef idx="minor">
+            <a:schemeClr val="lt1"/>
+          </a:fontRef>
+        </p:style>
+        <p:txBody>
+          <a:bodyPr rtlCol="0" anchor="ctr"/>
+          <a:lstStyle/>
+          <a:p>
+            <a:pPr algn="ctr"/>
+            <a:endParaRPr lang="sv-SE"/>
+          </a:p>
+        </p:txBody>
+      </p:sp>
+      <p:sp>
+        <p:nvSpPr>
+          <p:cNvPr id="55" name="textruta 54">
+            <a:extLst>
+              <a:ext uri="{FF2B5EF4-FFF2-40B4-BE49-F238E27FC236}">
+                <a16:creationId xmlns:a16="http://schemas.microsoft.com/office/drawing/2014/main" id="{F0359AA0-971B-449D-A6AF-8D326E30CCBF}"/>
+              </a:ext>
+            </a:extLst>
+          </p:cNvPr>
+          <p:cNvSpPr txBox="1"/>
+          <p:nvPr/>
+        </p:nvSpPr>
+        <p:spPr>
+          <a:xfrm>
+            <a:off x="4191960" y="5500676"/>
+            <a:ext cx="1904040" cy="400110"/>
+          </a:xfrm>
+          <a:prstGeom prst="rect">
+            <a:avLst/>
+          </a:prstGeom>
+          <a:noFill/>
+        </p:spPr>
+        <p:txBody>
+          <a:bodyPr wrap="square">
+            <a:spAutoFit/>
+          </a:bodyPr>
+          <a:lstStyle/>
+          <a:p>
+            <a:pPr algn="ctr"/>
+            <a:r>
+              <a:rPr lang="en-US" sz="1000" dirty="0">
+                <a:latin typeface="Arial" panose="020B0604020202020204" pitchFamily="34" charset="0"/>
+                <a:cs typeface="Arial" panose="020B0604020202020204" pitchFamily="34" charset="0"/>
+              </a:rPr>
+              <a:t>ML Safety Requirements Argument Pattern</a:t>
+            </a:r>
+            <a:endParaRPr lang="sv-SE" sz="1000" dirty="0">
+              <a:latin typeface="Arial" panose="020B0604020202020204" pitchFamily="34" charset="0"/>
+              <a:cs typeface="Arial" panose="020B0604020202020204" pitchFamily="34" charset="0"/>
+            </a:endParaRPr>
+          </a:p>
+        </p:txBody>
+      </p:sp>
+      <p:sp>
+        <p:nvSpPr>
+          <p:cNvPr id="56" name="textruta 55">
+            <a:extLst>
+              <a:ext uri="{FF2B5EF4-FFF2-40B4-BE49-F238E27FC236}">
+                <a16:creationId xmlns:a16="http://schemas.microsoft.com/office/drawing/2014/main" id="{D9715FE2-6436-4FDF-B5A6-CFB985B03E96}"/>
+              </a:ext>
+            </a:extLst>
+          </p:cNvPr>
+          <p:cNvSpPr txBox="1"/>
+          <p:nvPr/>
+        </p:nvSpPr>
+        <p:spPr>
+          <a:xfrm>
+            <a:off x="6210605" y="5507037"/>
+            <a:ext cx="1352004" cy="400110"/>
+          </a:xfrm>
+          <a:prstGeom prst="rect">
+            <a:avLst/>
+          </a:prstGeom>
+          <a:noFill/>
+        </p:spPr>
+        <p:txBody>
+          <a:bodyPr wrap="square">
+            <a:spAutoFit/>
+          </a:bodyPr>
+          <a:lstStyle/>
+          <a:p>
+            <a:pPr algn="ctr"/>
+            <a:r>
+              <a:rPr lang="en-US" sz="1000" dirty="0">
+                <a:latin typeface="Arial" panose="020B0604020202020204" pitchFamily="34" charset="0"/>
+                <a:cs typeface="Arial" panose="020B0604020202020204" pitchFamily="34" charset="0"/>
+              </a:rPr>
+              <a:t>ML Deployment</a:t>
+            </a:r>
+          </a:p>
+          <a:p>
+            <a:pPr algn="ctr"/>
+            <a:r>
+              <a:rPr lang="en-US" sz="1000" dirty="0">
+                <a:latin typeface="Arial" panose="020B0604020202020204" pitchFamily="34" charset="0"/>
+                <a:cs typeface="Arial" panose="020B0604020202020204" pitchFamily="34" charset="0"/>
+              </a:rPr>
+              <a:t>Argument Pattern</a:t>
+            </a:r>
+            <a:endParaRPr lang="sv-SE" sz="1000" dirty="0">
+              <a:latin typeface="Arial" panose="020B0604020202020204" pitchFamily="34" charset="0"/>
+              <a:cs typeface="Arial" panose="020B0604020202020204" pitchFamily="34" charset="0"/>
+            </a:endParaRPr>
+          </a:p>
+        </p:txBody>
+      </p:sp>
+    </p:spTree>
+    <p:extLst>
+      <p:ext uri="{BB962C8B-B14F-4D97-AF65-F5344CB8AC3E}">
+        <p14:creationId xmlns:p14="http://schemas.microsoft.com/office/powerpoint/2010/main" val="2352307478"/>
+      </p:ext>
+    </p:extLst>
+  </p:cSld>
+  <p:clrMapOvr>
+    <a:masterClrMapping/>
+  </p:clrMapOvr>
+</p:sld>
+</file>
+
 <file path=ppt/theme/theme1.xml><?xml version="1.0" encoding="utf-8"?>
 <a:theme xmlns:a="http://schemas.openxmlformats.org/drawingml/2006/main" name="Office-tema">
   <a:themeElements>

</xml_diff>

<commit_message>
Add ML safety reqts argumentation
</commit_message>
<xml_diff>
--- a/docs/figures/figures.pptx
+++ b/docs/figures/figures.pptx
@@ -274,7 +274,7 @@
           <a:p>
             <a:fld id="{89E19A41-2D67-4984-881E-035821EC17D6}" type="datetimeFigureOut">
               <a:rPr lang="sv-SE" smtClean="0"/>
-              <a:t>2021-09-20</a:t>
+              <a:t>2021-09-21</a:t>
             </a:fld>
             <a:endParaRPr lang="sv-SE"/>
           </a:p>
@@ -472,7 +472,7 @@
           <a:p>
             <a:fld id="{89E19A41-2D67-4984-881E-035821EC17D6}" type="datetimeFigureOut">
               <a:rPr lang="sv-SE" smtClean="0"/>
-              <a:t>2021-09-20</a:t>
+              <a:t>2021-09-21</a:t>
             </a:fld>
             <a:endParaRPr lang="sv-SE"/>
           </a:p>
@@ -680,7 +680,7 @@
           <a:p>
             <a:fld id="{89E19A41-2D67-4984-881E-035821EC17D6}" type="datetimeFigureOut">
               <a:rPr lang="sv-SE" smtClean="0"/>
-              <a:t>2021-09-20</a:t>
+              <a:t>2021-09-21</a:t>
             </a:fld>
             <a:endParaRPr lang="sv-SE"/>
           </a:p>
@@ -878,7 +878,7 @@
           <a:p>
             <a:fld id="{89E19A41-2D67-4984-881E-035821EC17D6}" type="datetimeFigureOut">
               <a:rPr lang="sv-SE" smtClean="0"/>
-              <a:t>2021-09-20</a:t>
+              <a:t>2021-09-21</a:t>
             </a:fld>
             <a:endParaRPr lang="sv-SE"/>
           </a:p>
@@ -1153,7 +1153,7 @@
           <a:p>
             <a:fld id="{89E19A41-2D67-4984-881E-035821EC17D6}" type="datetimeFigureOut">
               <a:rPr lang="sv-SE" smtClean="0"/>
-              <a:t>2021-09-20</a:t>
+              <a:t>2021-09-21</a:t>
             </a:fld>
             <a:endParaRPr lang="sv-SE"/>
           </a:p>
@@ -1418,7 +1418,7 @@
           <a:p>
             <a:fld id="{89E19A41-2D67-4984-881E-035821EC17D6}" type="datetimeFigureOut">
               <a:rPr lang="sv-SE" smtClean="0"/>
-              <a:t>2021-09-20</a:t>
+              <a:t>2021-09-21</a:t>
             </a:fld>
             <a:endParaRPr lang="sv-SE"/>
           </a:p>
@@ -1830,7 +1830,7 @@
           <a:p>
             <a:fld id="{89E19A41-2D67-4984-881E-035821EC17D6}" type="datetimeFigureOut">
               <a:rPr lang="sv-SE" smtClean="0"/>
-              <a:t>2021-09-20</a:t>
+              <a:t>2021-09-21</a:t>
             </a:fld>
             <a:endParaRPr lang="sv-SE"/>
           </a:p>
@@ -1971,7 +1971,7 @@
           <a:p>
             <a:fld id="{89E19A41-2D67-4984-881E-035821EC17D6}" type="datetimeFigureOut">
               <a:rPr lang="sv-SE" smtClean="0"/>
-              <a:t>2021-09-20</a:t>
+              <a:t>2021-09-21</a:t>
             </a:fld>
             <a:endParaRPr lang="sv-SE"/>
           </a:p>
@@ -2084,7 +2084,7 @@
           <a:p>
             <a:fld id="{89E19A41-2D67-4984-881E-035821EC17D6}" type="datetimeFigureOut">
               <a:rPr lang="sv-SE" smtClean="0"/>
-              <a:t>2021-09-20</a:t>
+              <a:t>2021-09-21</a:t>
             </a:fld>
             <a:endParaRPr lang="sv-SE"/>
           </a:p>
@@ -2395,7 +2395,7 @@
           <a:p>
             <a:fld id="{89E19A41-2D67-4984-881E-035821EC17D6}" type="datetimeFigureOut">
               <a:rPr lang="sv-SE" smtClean="0"/>
-              <a:t>2021-09-20</a:t>
+              <a:t>2021-09-21</a:t>
             </a:fld>
             <a:endParaRPr lang="sv-SE"/>
           </a:p>
@@ -2683,7 +2683,7 @@
           <a:p>
             <a:fld id="{89E19A41-2D67-4984-881E-035821EC17D6}" type="datetimeFigureOut">
               <a:rPr lang="sv-SE" smtClean="0"/>
-              <a:t>2021-09-20</a:t>
+              <a:t>2021-09-21</a:t>
             </a:fld>
             <a:endParaRPr lang="sv-SE"/>
           </a:p>
@@ -2924,7 +2924,7 @@
           <a:p>
             <a:fld id="{89E19A41-2D67-4984-881E-035821EC17D6}" type="datetimeFigureOut">
               <a:rPr lang="sv-SE" smtClean="0"/>
-              <a:t>2021-09-20</a:t>
+              <a:t>2021-09-21</a:t>
             </a:fld>
             <a:endParaRPr lang="sv-SE"/>
           </a:p>
@@ -8679,7 +8679,7 @@
         </p:nvGrpSpPr>
         <p:grpSpPr>
           <a:xfrm rot="5400000" flipV="1">
-            <a:off x="5506422" y="5052285"/>
+            <a:off x="4582093" y="5158794"/>
             <a:ext cx="175562" cy="896403"/>
             <a:chOff x="3240634" y="4169664"/>
             <a:chExt cx="175562" cy="1127001"/>
@@ -9286,7 +9286,7 @@
         </p:nvSpPr>
         <p:spPr>
           <a:xfrm>
-            <a:off x="384998" y="5029172"/>
+            <a:off x="-590142" y="5256382"/>
             <a:ext cx="1444700" cy="714503"/>
           </a:xfrm>
           <a:custGeom>
@@ -9471,7 +9471,7 @@
                 <a:latin typeface="Arial" panose="020B0604020202020204" pitchFamily="34" charset="0"/>
                 <a:cs typeface="Arial" panose="020B0604020202020204" pitchFamily="34" charset="0"/>
               </a:rPr>
-              <a:t>C1.2</a:t>
+              <a:t>C2.4</a:t>
             </a:r>
           </a:p>
           <a:p>
@@ -9560,7 +9560,7 @@
         </p:nvSpPr>
         <p:spPr>
           <a:xfrm>
-            <a:off x="463628" y="5029172"/>
+            <a:off x="-511512" y="5256382"/>
             <a:ext cx="470001" cy="276999"/>
           </a:xfrm>
           <a:prstGeom prst="rect">
@@ -9599,7 +9599,7 @@
         </p:nvGrpSpPr>
         <p:grpSpPr>
           <a:xfrm rot="5400000">
-            <a:off x="2109995" y="5017403"/>
+            <a:off x="1134855" y="5244613"/>
             <a:ext cx="175562" cy="724765"/>
             <a:chOff x="3240634" y="4169664"/>
             <a:chExt cx="175562" cy="1127001"/>
@@ -9932,7 +9932,7 @@
         </p:nvCxnSpPr>
         <p:spPr>
           <a:xfrm>
-            <a:off x="3516239" y="4730718"/>
+            <a:off x="2541099" y="4957928"/>
             <a:ext cx="1272776" cy="195419"/>
           </a:xfrm>
           <a:prstGeom prst="straightConnector1">
@@ -9978,8 +9978,8 @@
         </p:nvCxnSpPr>
         <p:spPr>
           <a:xfrm flipH="1">
-            <a:off x="3705672" y="2050948"/>
-            <a:ext cx="2305472" cy="437418"/>
+            <a:off x="1466589" y="2050948"/>
+            <a:ext cx="4544555" cy="452840"/>
           </a:xfrm>
           <a:prstGeom prst="straightConnector1">
             <a:avLst/>
@@ -10020,7 +10020,7 @@
         </p:nvSpPr>
         <p:spPr>
           <a:xfrm rot="10800000">
-            <a:off x="3109210" y="6247982"/>
+            <a:off x="2134070" y="6475192"/>
             <a:ext cx="272842" cy="176164"/>
           </a:xfrm>
           <a:prstGeom prst="triangle">
@@ -10072,7 +10072,7 @@
         </p:nvSpPr>
         <p:spPr>
           <a:xfrm>
-            <a:off x="2521867" y="6427449"/>
+            <a:off x="1546727" y="6654659"/>
             <a:ext cx="1445258" cy="400110"/>
           </a:xfrm>
           <a:prstGeom prst="rect">
@@ -10239,7 +10239,7 @@
         </p:nvSpPr>
         <p:spPr>
           <a:xfrm>
-            <a:off x="3019244" y="2488366"/>
+            <a:off x="780161" y="2503788"/>
             <a:ext cx="1372856" cy="818054"/>
           </a:xfrm>
           <a:prstGeom prst="rect">
@@ -10285,7 +10285,7 @@
                 <a:latin typeface="Arial" panose="020B0604020202020204" pitchFamily="34" charset="0"/>
                 <a:cs typeface="Arial" panose="020B0604020202020204" pitchFamily="34" charset="0"/>
               </a:rPr>
-              <a:t>G2.1</a:t>
+              <a:t>G2.2</a:t>
             </a:r>
           </a:p>
           <a:p>
@@ -10338,7 +10338,7 @@
         </p:nvSpPr>
         <p:spPr>
           <a:xfrm>
-            <a:off x="418186" y="2567742"/>
+            <a:off x="3757316" y="3152165"/>
             <a:ext cx="1225243" cy="714503"/>
           </a:xfrm>
           <a:custGeom>
@@ -10523,7 +10523,7 @@
                 <a:latin typeface="Arial" panose="020B0604020202020204" pitchFamily="34" charset="0"/>
                 <a:cs typeface="Arial" panose="020B0604020202020204" pitchFamily="34" charset="0"/>
               </a:rPr>
-              <a:t>C2.2</a:t>
+              <a:t>C2.3</a:t>
             </a:r>
           </a:p>
           <a:p>
@@ -10572,7 +10572,7 @@
         </p:nvSpPr>
         <p:spPr>
           <a:xfrm>
-            <a:off x="463192" y="2584183"/>
+            <a:off x="3802322" y="3168606"/>
             <a:ext cx="488342" cy="276999"/>
           </a:xfrm>
           <a:prstGeom prst="rect">
@@ -10597,121 +10597,6 @@
           </a:p>
         </p:txBody>
       </p:sp>
-      <p:grpSp>
-        <p:nvGrpSpPr>
-          <p:cNvPr id="60" name="Grupp 59">
-            <a:extLst>
-              <a:ext uri="{FF2B5EF4-FFF2-40B4-BE49-F238E27FC236}">
-                <a16:creationId xmlns:a16="http://schemas.microsoft.com/office/drawing/2014/main" id="{9C9108AC-2C89-465E-8580-188F712AB503}"/>
-              </a:ext>
-            </a:extLst>
-          </p:cNvPr>
-          <p:cNvGrpSpPr/>
-          <p:nvPr/>
-        </p:nvGrpSpPr>
-        <p:grpSpPr>
-          <a:xfrm rot="5249489">
-            <a:off x="2240664" y="2175407"/>
-            <a:ext cx="175562" cy="1378971"/>
-            <a:chOff x="3240634" y="3793216"/>
-            <a:chExt cx="175562" cy="1503449"/>
-          </a:xfrm>
-        </p:grpSpPr>
-        <p:sp>
-          <p:nvSpPr>
-            <p:cNvPr id="61" name="Likbent triangel 60">
-              <a:extLst>
-                <a:ext uri="{FF2B5EF4-FFF2-40B4-BE49-F238E27FC236}">
-                  <a16:creationId xmlns:a16="http://schemas.microsoft.com/office/drawing/2014/main" id="{7C946C2B-5BA3-457D-B59B-1E7F44E16DDB}"/>
-                </a:ext>
-              </a:extLst>
-            </p:cNvPr>
-            <p:cNvSpPr/>
-            <p:nvPr/>
-          </p:nvSpPr>
-          <p:spPr>
-            <a:xfrm rot="10800000">
-              <a:off x="3240634" y="5164531"/>
-              <a:ext cx="175562" cy="132134"/>
-            </a:xfrm>
-            <a:prstGeom prst="triangle">
-              <a:avLst/>
-            </a:prstGeom>
-            <a:ln>
-              <a:solidFill>
-                <a:schemeClr val="tx1"/>
-              </a:solidFill>
-            </a:ln>
-          </p:spPr>
-          <p:style>
-            <a:lnRef idx="1">
-              <a:schemeClr val="accent1"/>
-            </a:lnRef>
-            <a:fillRef idx="0">
-              <a:schemeClr val="accent1"/>
-            </a:fillRef>
-            <a:effectRef idx="0">
-              <a:schemeClr val="accent1"/>
-            </a:effectRef>
-            <a:fontRef idx="minor">
-              <a:schemeClr val="tx1"/>
-            </a:fontRef>
-          </p:style>
-          <p:txBody>
-            <a:bodyPr rtlCol="0" anchor="ctr"/>
-            <a:lstStyle/>
-            <a:p>
-              <a:pPr algn="ctr"/>
-              <a:endParaRPr lang="sv-SE"/>
-            </a:p>
-          </p:txBody>
-        </p:sp>
-        <p:cxnSp>
-          <p:nvCxnSpPr>
-            <p:cNvPr id="62" name="Rak koppling 61">
-              <a:extLst>
-                <a:ext uri="{FF2B5EF4-FFF2-40B4-BE49-F238E27FC236}">
-                  <a16:creationId xmlns:a16="http://schemas.microsoft.com/office/drawing/2014/main" id="{E272BA7F-675B-4180-B395-BF43C09B72E9}"/>
-                </a:ext>
-              </a:extLst>
-            </p:cNvPr>
-            <p:cNvCxnSpPr>
-              <a:cxnSpLocks/>
-              <a:stCxn id="61" idx="3"/>
-              <a:endCxn id="57" idx="1"/>
-            </p:cNvCxnSpPr>
-            <p:nvPr/>
-          </p:nvCxnSpPr>
-          <p:spPr>
-            <a:xfrm rot="16350511">
-              <a:off x="2673690" y="4475479"/>
-              <a:ext cx="1372154" cy="7628"/>
-            </a:xfrm>
-            <a:prstGeom prst="line">
-              <a:avLst/>
-            </a:prstGeom>
-            <a:ln>
-              <a:solidFill>
-                <a:schemeClr val="tx1"/>
-              </a:solidFill>
-            </a:ln>
-          </p:spPr>
-          <p:style>
-            <a:lnRef idx="1">
-              <a:schemeClr val="accent1"/>
-            </a:lnRef>
-            <a:fillRef idx="0">
-              <a:schemeClr val="accent1"/>
-            </a:fillRef>
-            <a:effectRef idx="0">
-              <a:schemeClr val="accent1"/>
-            </a:effectRef>
-            <a:fontRef idx="minor">
-              <a:schemeClr val="tx1"/>
-            </a:fontRef>
-          </p:style>
-        </p:cxnSp>
-      </p:grpSp>
       <p:sp>
         <p:nvSpPr>
           <p:cNvPr id="63" name="textruta 62">
@@ -10970,7 +10855,7 @@
                 <a:latin typeface="Arial" panose="020B0604020202020204" pitchFamily="34" charset="0"/>
                 <a:cs typeface="Arial" panose="020B0604020202020204" pitchFamily="34" charset="0"/>
               </a:rPr>
-              <a:t>G2.2</a:t>
+              <a:t>G2.3</a:t>
             </a:r>
           </a:p>
           <a:p>
@@ -11115,7 +11000,7 @@
                 <a:latin typeface="Arial" panose="020B0604020202020204" pitchFamily="34" charset="0"/>
                 <a:cs typeface="Arial" panose="020B0604020202020204" pitchFamily="34" charset="0"/>
               </a:rPr>
-              <a:t>G2.3</a:t>
+              <a:t>G2.4</a:t>
             </a:r>
           </a:p>
           <a:p>
@@ -11629,7 +11514,7 @@
         </p:nvSpPr>
         <p:spPr>
           <a:xfrm>
-            <a:off x="2187037" y="2729165"/>
+            <a:off x="5805132" y="2571942"/>
             <a:ext cx="284131" cy="281041"/>
           </a:xfrm>
           <a:prstGeom prst="rect">
@@ -11675,8 +11560,8 @@
         </p:nvSpPr>
         <p:spPr>
           <a:xfrm>
-            <a:off x="1731980" y="3037158"/>
-            <a:ext cx="1179226" cy="400110"/>
+            <a:off x="1550777" y="3395146"/>
+            <a:ext cx="2608688" cy="246221"/>
           </a:xfrm>
           <a:prstGeom prst="rect">
             <a:avLst/>
@@ -11734,7 +11619,7 @@
         </p:nvSpPr>
         <p:spPr>
           <a:xfrm>
-            <a:off x="5392464" y="2585573"/>
+            <a:off x="3768869" y="2386059"/>
             <a:ext cx="1225243" cy="714503"/>
           </a:xfrm>
           <a:custGeom>
@@ -11929,7 +11814,7 @@
                 <a:latin typeface="Arial" panose="020B0604020202020204" pitchFamily="34" charset="0"/>
                 <a:cs typeface="Arial" panose="020B0604020202020204" pitchFamily="34" charset="0"/>
               </a:rPr>
-              <a:t>C2.3</a:t>
+              <a:t>C2.2</a:t>
             </a:r>
           </a:p>
           <a:p>
@@ -11961,7 +11846,7 @@
         </p:nvSpPr>
         <p:spPr>
           <a:xfrm>
-            <a:off x="5437470" y="2602014"/>
+            <a:off x="3813875" y="2402500"/>
             <a:ext cx="932818" cy="276999"/>
           </a:xfrm>
           <a:prstGeom prst="rect">
@@ -12000,8 +11885,8 @@
         </p:nvGrpSpPr>
         <p:grpSpPr>
           <a:xfrm rot="5400000" flipV="1">
-            <a:off x="4806791" y="2387478"/>
-            <a:ext cx="175562" cy="995790"/>
+            <a:off x="2879365" y="1885219"/>
+            <a:ext cx="175562" cy="1603446"/>
             <a:chOff x="3240634" y="4169664"/>
             <a:chExt cx="175562" cy="1127001"/>
           </a:xfrm>
@@ -12113,7 +11998,7 @@
         </p:nvSpPr>
         <p:spPr>
           <a:xfrm>
-            <a:off x="4713301" y="2751393"/>
+            <a:off x="2839217" y="2567463"/>
             <a:ext cx="284131" cy="281041"/>
           </a:xfrm>
           <a:prstGeom prst="rect">
@@ -12159,8 +12044,8 @@
         </p:nvSpPr>
         <p:spPr>
           <a:xfrm>
-            <a:off x="4392100" y="3060935"/>
-            <a:ext cx="937332" cy="553998"/>
+            <a:off x="2081719" y="2877005"/>
+            <a:ext cx="1809926" cy="246221"/>
           </a:xfrm>
           <a:prstGeom prst="rect">
             <a:avLst/>
@@ -12419,7 +12304,7 @@
         </p:nvSpPr>
         <p:spPr>
           <a:xfrm>
-            <a:off x="2665379" y="3755154"/>
+            <a:off x="1666623" y="3982692"/>
             <a:ext cx="1887166" cy="779164"/>
           </a:xfrm>
           <a:prstGeom prst="parallelogram">
@@ -12508,8 +12393,8 @@
         </p:nvCxnSpPr>
         <p:spPr>
           <a:xfrm>
-            <a:off x="3705672" y="3306420"/>
-            <a:ext cx="686" cy="448734"/>
+            <a:off x="1466589" y="3321842"/>
+            <a:ext cx="1241013" cy="660850"/>
           </a:xfrm>
           <a:prstGeom prst="straightConnector1">
             <a:avLst/>
@@ -12550,7 +12435,7 @@
         </p:nvSpPr>
         <p:spPr>
           <a:xfrm>
-            <a:off x="2560160" y="4926137"/>
+            <a:off x="1585020" y="5153347"/>
             <a:ext cx="1372856" cy="818054"/>
           </a:xfrm>
           <a:prstGeom prst="rect">
@@ -12596,7 +12481,7 @@
                 <a:latin typeface="Arial" panose="020B0604020202020204" pitchFamily="34" charset="0"/>
                 <a:cs typeface="Arial" panose="020B0604020202020204" pitchFamily="34" charset="0"/>
               </a:rPr>
-              <a:t>G2.4</a:t>
+              <a:t>G2.5</a:t>
             </a:r>
           </a:p>
           <a:p>
@@ -12638,7 +12523,7 @@
         </p:nvCxnSpPr>
         <p:spPr>
           <a:xfrm flipH="1">
-            <a:off x="3246588" y="4730718"/>
+            <a:off x="2271448" y="4957928"/>
             <a:ext cx="269651" cy="195419"/>
           </a:xfrm>
           <a:prstGeom prst="straightConnector1">
@@ -12680,7 +12565,7 @@
         </p:nvSpPr>
         <p:spPr>
           <a:xfrm>
-            <a:off x="3423516" y="4547288"/>
+            <a:off x="2448376" y="4774498"/>
             <a:ext cx="185446" cy="183430"/>
           </a:xfrm>
           <a:prstGeom prst="diamond">
@@ -12734,7 +12619,7 @@
         </p:nvSpPr>
         <p:spPr>
           <a:xfrm>
-            <a:off x="4102587" y="4926137"/>
+            <a:off x="3127447" y="5153347"/>
             <a:ext cx="1372856" cy="818054"/>
           </a:xfrm>
           <a:prstGeom prst="rect">
@@ -12780,7 +12665,7 @@
                 <a:latin typeface="Arial" panose="020B0604020202020204" pitchFamily="34" charset="0"/>
                 <a:cs typeface="Arial" panose="020B0604020202020204" pitchFamily="34" charset="0"/>
               </a:rPr>
-              <a:t>G2.5</a:t>
+              <a:t>G2.6</a:t>
             </a:r>
           </a:p>
           <a:p>
@@ -12818,7 +12703,7 @@
         </p:nvSpPr>
         <p:spPr>
           <a:xfrm>
-            <a:off x="6049185" y="5146522"/>
+            <a:off x="5124856" y="5253031"/>
             <a:ext cx="1444700" cy="714503"/>
           </a:xfrm>
           <a:custGeom>
@@ -13003,7 +12888,7 @@
                 <a:latin typeface="Arial" panose="020B0604020202020204" pitchFamily="34" charset="0"/>
                 <a:cs typeface="Arial" panose="020B0604020202020204" pitchFamily="34" charset="0"/>
               </a:rPr>
-              <a:t>C1.2</a:t>
+              <a:t>C2.5</a:t>
             </a:r>
           </a:p>
           <a:p>
@@ -13092,7 +12977,7 @@
         </p:nvSpPr>
         <p:spPr>
           <a:xfrm rot="10800000">
-            <a:off x="4654980" y="6247982"/>
+            <a:off x="3679840" y="6475192"/>
             <a:ext cx="272842" cy="176164"/>
           </a:xfrm>
           <a:prstGeom prst="triangle">
@@ -13144,7 +13029,7 @@
         </p:nvSpPr>
         <p:spPr>
           <a:xfrm>
-            <a:off x="4067637" y="6427449"/>
+            <a:off x="3092497" y="6654659"/>
             <a:ext cx="1445258" cy="400110"/>
           </a:xfrm>
           <a:prstGeom prst="rect">
@@ -13191,7 +13076,7 @@
         </p:nvCxnSpPr>
         <p:spPr>
           <a:xfrm flipH="1">
-            <a:off x="3245631" y="5744191"/>
+            <a:off x="2270491" y="5971401"/>
             <a:ext cx="957" cy="503791"/>
           </a:xfrm>
           <a:prstGeom prst="straightConnector1">
@@ -13237,7 +13122,7 @@
         </p:nvCxnSpPr>
         <p:spPr>
           <a:xfrm>
-            <a:off x="4789015" y="5744191"/>
+            <a:off x="3813875" y="5971401"/>
             <a:ext cx="2386" cy="503791"/>
           </a:xfrm>
           <a:prstGeom prst="straightConnector1">
@@ -13279,7 +13164,7 @@
         </p:nvSpPr>
         <p:spPr>
           <a:xfrm>
-            <a:off x="3162132" y="5882783"/>
+            <a:off x="2186992" y="6109993"/>
             <a:ext cx="164728" cy="154386"/>
           </a:xfrm>
           <a:prstGeom prst="ellipse">
@@ -13325,7 +13210,7 @@
         </p:nvSpPr>
         <p:spPr>
           <a:xfrm>
-            <a:off x="4705024" y="5874796"/>
+            <a:off x="3729884" y="6102006"/>
             <a:ext cx="164728" cy="154386"/>
           </a:xfrm>
           <a:prstGeom prst="ellipse">
@@ -13371,7 +13256,7 @@
         </p:nvSpPr>
         <p:spPr>
           <a:xfrm>
-            <a:off x="1920368" y="5798438"/>
+            <a:off x="945228" y="6025648"/>
             <a:ext cx="1327916" cy="400110"/>
           </a:xfrm>
           <a:prstGeom prst="rect">
@@ -13470,7 +13355,7 @@
         </p:nvSpPr>
         <p:spPr>
           <a:xfrm>
-            <a:off x="4845286" y="5798438"/>
+            <a:off x="3870146" y="6025648"/>
             <a:ext cx="1431429" cy="400110"/>
           </a:xfrm>
           <a:prstGeom prst="rect">
@@ -13649,6 +13534,834 @@
           <a:p>
             <a:pPr algn="ctr"/>
             <a:endParaRPr lang="sv-SE"/>
+          </a:p>
+        </p:txBody>
+      </p:sp>
+      <p:sp>
+        <p:nvSpPr>
+          <p:cNvPr id="86" name="textruta 85">
+            <a:extLst>
+              <a:ext uri="{FF2B5EF4-FFF2-40B4-BE49-F238E27FC236}">
+                <a16:creationId xmlns:a16="http://schemas.microsoft.com/office/drawing/2014/main" id="{298B9EA1-0184-4887-8CFA-7C34DE6A8105}"/>
+              </a:ext>
+            </a:extLst>
+          </p:cNvPr>
+          <p:cNvSpPr txBox="1"/>
+          <p:nvPr/>
+        </p:nvSpPr>
+        <p:spPr>
+          <a:xfrm>
+            <a:off x="2280712" y="3232190"/>
+            <a:ext cx="470001" cy="276999"/>
+          </a:xfrm>
+          <a:prstGeom prst="rect">
+            <a:avLst/>
+          </a:prstGeom>
+          <a:noFill/>
+        </p:spPr>
+        <p:txBody>
+          <a:bodyPr wrap="square">
+            <a:spAutoFit/>
+          </a:bodyPr>
+          <a:lstStyle/>
+          <a:p>
+            <a:pPr algn="ctr"/>
+            <a:r>
+              <a:rPr lang="sv-SE" sz="1200" dirty="0">
+                <a:latin typeface="Arial" panose="020B0604020202020204" pitchFamily="34" charset="0"/>
+                <a:cs typeface="Arial" panose="020B0604020202020204" pitchFamily="34" charset="0"/>
+              </a:rPr>
+              <a:t>[W]</a:t>
+            </a:r>
+            <a:endParaRPr lang="sv-SE" sz="1200" dirty="0"/>
+          </a:p>
+        </p:txBody>
+      </p:sp>
+      <p:sp>
+        <p:nvSpPr>
+          <p:cNvPr id="87" name="textruta 86">
+            <a:extLst>
+              <a:ext uri="{FF2B5EF4-FFF2-40B4-BE49-F238E27FC236}">
+                <a16:creationId xmlns:a16="http://schemas.microsoft.com/office/drawing/2014/main" id="{C0B2D06F-F3FB-498F-95CE-6077B4D8CE11}"/>
+              </a:ext>
+            </a:extLst>
+          </p:cNvPr>
+          <p:cNvSpPr txBox="1"/>
+          <p:nvPr/>
+        </p:nvSpPr>
+        <p:spPr>
+          <a:xfrm>
+            <a:off x="2345782" y="2701913"/>
+            <a:ext cx="470001" cy="276999"/>
+          </a:xfrm>
+          <a:prstGeom prst="rect">
+            <a:avLst/>
+          </a:prstGeom>
+          <a:noFill/>
+        </p:spPr>
+        <p:txBody>
+          <a:bodyPr wrap="square">
+            <a:spAutoFit/>
+          </a:bodyPr>
+          <a:lstStyle/>
+          <a:p>
+            <a:pPr algn="ctr"/>
+            <a:r>
+              <a:rPr lang="sv-SE" sz="1200" dirty="0">
+                <a:latin typeface="Arial" panose="020B0604020202020204" pitchFamily="34" charset="0"/>
+                <a:cs typeface="Arial" panose="020B0604020202020204" pitchFamily="34" charset="0"/>
+              </a:rPr>
+              <a:t>[R]</a:t>
+            </a:r>
+            <a:endParaRPr lang="sv-SE" sz="1200" dirty="0"/>
+          </a:p>
+        </p:txBody>
+      </p:sp>
+      <p:sp>
+        <p:nvSpPr>
+          <p:cNvPr id="88" name="textruta 87">
+            <a:extLst>
+              <a:ext uri="{FF2B5EF4-FFF2-40B4-BE49-F238E27FC236}">
+                <a16:creationId xmlns:a16="http://schemas.microsoft.com/office/drawing/2014/main" id="{3CC48980-4AA1-4BEE-A1D3-1D4A8F293EEE}"/>
+              </a:ext>
+            </a:extLst>
+          </p:cNvPr>
+          <p:cNvSpPr txBox="1"/>
+          <p:nvPr/>
+        </p:nvSpPr>
+        <p:spPr>
+          <a:xfrm>
+            <a:off x="2311268" y="6459240"/>
+            <a:ext cx="483024" cy="276999"/>
+          </a:xfrm>
+          <a:prstGeom prst="rect">
+            <a:avLst/>
+          </a:prstGeom>
+          <a:noFill/>
+        </p:spPr>
+        <p:txBody>
+          <a:bodyPr wrap="square">
+            <a:spAutoFit/>
+          </a:bodyPr>
+          <a:lstStyle/>
+          <a:p>
+            <a:pPr algn="ctr"/>
+            <a:r>
+              <a:rPr lang="sv-SE" sz="1200" dirty="0">
+                <a:latin typeface="Arial" panose="020B0604020202020204" pitchFamily="34" charset="0"/>
+                <a:cs typeface="Arial" panose="020B0604020202020204" pitchFamily="34" charset="0"/>
+              </a:rPr>
+              <a:t>[BB]</a:t>
+            </a:r>
+            <a:endParaRPr lang="sv-SE" sz="1200" dirty="0"/>
+          </a:p>
+        </p:txBody>
+      </p:sp>
+      <p:sp>
+        <p:nvSpPr>
+          <p:cNvPr id="89" name="textruta 88">
+            <a:extLst>
+              <a:ext uri="{FF2B5EF4-FFF2-40B4-BE49-F238E27FC236}">
+                <a16:creationId xmlns:a16="http://schemas.microsoft.com/office/drawing/2014/main" id="{348B083A-3172-4B6F-87AA-1F11EE50B08B}"/>
+              </a:ext>
+            </a:extLst>
+          </p:cNvPr>
+          <p:cNvSpPr txBox="1"/>
+          <p:nvPr/>
+        </p:nvSpPr>
+        <p:spPr>
+          <a:xfrm>
+            <a:off x="3863551" y="6459240"/>
+            <a:ext cx="483024" cy="276999"/>
+          </a:xfrm>
+          <a:prstGeom prst="rect">
+            <a:avLst/>
+          </a:prstGeom>
+          <a:noFill/>
+        </p:spPr>
+        <p:txBody>
+          <a:bodyPr wrap="square">
+            <a:spAutoFit/>
+          </a:bodyPr>
+          <a:lstStyle/>
+          <a:p>
+            <a:pPr algn="ctr"/>
+            <a:r>
+              <a:rPr lang="sv-SE" sz="1200" dirty="0">
+                <a:latin typeface="Arial" panose="020B0604020202020204" pitchFamily="34" charset="0"/>
+                <a:cs typeface="Arial" panose="020B0604020202020204" pitchFamily="34" charset="0"/>
+              </a:rPr>
+              <a:t>[BB]</a:t>
+            </a:r>
+            <a:endParaRPr lang="sv-SE" sz="1200" dirty="0"/>
+          </a:p>
+        </p:txBody>
+      </p:sp>
+      <p:grpSp>
+        <p:nvGrpSpPr>
+          <p:cNvPr id="90" name="Grupp 89">
+            <a:extLst>
+              <a:ext uri="{FF2B5EF4-FFF2-40B4-BE49-F238E27FC236}">
+                <a16:creationId xmlns:a16="http://schemas.microsoft.com/office/drawing/2014/main" id="{91512E94-087F-4866-BB07-8105CDCFEFDB}"/>
+              </a:ext>
+            </a:extLst>
+          </p:cNvPr>
+          <p:cNvGrpSpPr/>
+          <p:nvPr/>
+        </p:nvGrpSpPr>
+        <p:grpSpPr>
+          <a:xfrm rot="5400000" flipV="1">
+            <a:off x="2899908" y="2415489"/>
+            <a:ext cx="175562" cy="1652372"/>
+            <a:chOff x="3240634" y="4169664"/>
+            <a:chExt cx="175562" cy="1127001"/>
+          </a:xfrm>
+        </p:grpSpPr>
+        <p:sp>
+          <p:nvSpPr>
+            <p:cNvPr id="91" name="Likbent triangel 90">
+              <a:extLst>
+                <a:ext uri="{FF2B5EF4-FFF2-40B4-BE49-F238E27FC236}">
+                  <a16:creationId xmlns:a16="http://schemas.microsoft.com/office/drawing/2014/main" id="{31567C66-AC07-4BCF-B932-329E5122BA5E}"/>
+                </a:ext>
+              </a:extLst>
+            </p:cNvPr>
+            <p:cNvSpPr/>
+            <p:nvPr/>
+          </p:nvSpPr>
+          <p:spPr>
+            <a:xfrm rot="10800000">
+              <a:off x="3240634" y="5164531"/>
+              <a:ext cx="175562" cy="132134"/>
+            </a:xfrm>
+            <a:prstGeom prst="triangle">
+              <a:avLst/>
+            </a:prstGeom>
+            <a:ln>
+              <a:solidFill>
+                <a:schemeClr val="tx1"/>
+              </a:solidFill>
+            </a:ln>
+          </p:spPr>
+          <p:style>
+            <a:lnRef idx="1">
+              <a:schemeClr val="accent1"/>
+            </a:lnRef>
+            <a:fillRef idx="0">
+              <a:schemeClr val="accent1"/>
+            </a:fillRef>
+            <a:effectRef idx="0">
+              <a:schemeClr val="accent1"/>
+            </a:effectRef>
+            <a:fontRef idx="minor">
+              <a:schemeClr val="tx1"/>
+            </a:fontRef>
+          </p:style>
+          <p:txBody>
+            <a:bodyPr rtlCol="0" anchor="ctr"/>
+            <a:lstStyle/>
+            <a:p>
+              <a:pPr algn="ctr"/>
+              <a:endParaRPr lang="sv-SE"/>
+            </a:p>
+          </p:txBody>
+        </p:sp>
+        <p:cxnSp>
+          <p:nvCxnSpPr>
+            <p:cNvPr id="93" name="Rak koppling 92">
+              <a:extLst>
+                <a:ext uri="{FF2B5EF4-FFF2-40B4-BE49-F238E27FC236}">
+                  <a16:creationId xmlns:a16="http://schemas.microsoft.com/office/drawing/2014/main" id="{23FC4587-0591-4AB4-AA1F-2CE5BEC53425}"/>
+                </a:ext>
+              </a:extLst>
+            </p:cNvPr>
+            <p:cNvCxnSpPr>
+              <a:stCxn id="91" idx="3"/>
+            </p:cNvCxnSpPr>
+            <p:nvPr/>
+          </p:nvCxnSpPr>
+          <p:spPr>
+            <a:xfrm flipV="1">
+              <a:off x="3328415" y="4169664"/>
+              <a:ext cx="1" cy="994867"/>
+            </a:xfrm>
+            <a:prstGeom prst="line">
+              <a:avLst/>
+            </a:prstGeom>
+            <a:ln>
+              <a:solidFill>
+                <a:schemeClr val="tx1"/>
+              </a:solidFill>
+            </a:ln>
+          </p:spPr>
+          <p:style>
+            <a:lnRef idx="1">
+              <a:schemeClr val="accent1"/>
+            </a:lnRef>
+            <a:fillRef idx="0">
+              <a:schemeClr val="accent1"/>
+            </a:fillRef>
+            <a:effectRef idx="0">
+              <a:schemeClr val="accent1"/>
+            </a:effectRef>
+            <a:fontRef idx="minor">
+              <a:schemeClr val="tx1"/>
+            </a:fontRef>
+          </p:style>
+        </p:cxnSp>
+      </p:grpSp>
+      <p:sp>
+        <p:nvSpPr>
+          <p:cNvPr id="97" name="Rektangel 96">
+            <a:extLst>
+              <a:ext uri="{FF2B5EF4-FFF2-40B4-BE49-F238E27FC236}">
+                <a16:creationId xmlns:a16="http://schemas.microsoft.com/office/drawing/2014/main" id="{FDA46B08-F94B-44D1-8CC4-C0056DF6708E}"/>
+              </a:ext>
+            </a:extLst>
+          </p:cNvPr>
+          <p:cNvSpPr/>
+          <p:nvPr/>
+        </p:nvSpPr>
+        <p:spPr>
+          <a:xfrm>
+            <a:off x="2835297" y="3122196"/>
+            <a:ext cx="284131" cy="281041"/>
+          </a:xfrm>
+          <a:prstGeom prst="rect">
+            <a:avLst/>
+          </a:prstGeom>
+        </p:spPr>
+        <p:style>
+          <a:lnRef idx="2">
+            <a:schemeClr val="dk1">
+              <a:shade val="50000"/>
+            </a:schemeClr>
+          </a:lnRef>
+          <a:fillRef idx="1">
+            <a:schemeClr val="dk1"/>
+          </a:fillRef>
+          <a:effectRef idx="0">
+            <a:schemeClr val="dk1"/>
+          </a:effectRef>
+          <a:fontRef idx="minor">
+            <a:schemeClr val="lt1"/>
+          </a:fontRef>
+        </p:style>
+        <p:txBody>
+          <a:bodyPr rtlCol="0" anchor="ctr"/>
+          <a:lstStyle/>
+          <a:p>
+            <a:pPr algn="ctr"/>
+            <a:endParaRPr lang="sv-SE"/>
+          </a:p>
+        </p:txBody>
+      </p:sp>
+      <p:grpSp>
+        <p:nvGrpSpPr>
+          <p:cNvPr id="98" name="Grupp 97">
+            <a:extLst>
+              <a:ext uri="{FF2B5EF4-FFF2-40B4-BE49-F238E27FC236}">
+                <a16:creationId xmlns:a16="http://schemas.microsoft.com/office/drawing/2014/main" id="{E6BA94E8-1ACF-4EEF-A1C0-33148B1AB939}"/>
+              </a:ext>
+            </a:extLst>
+          </p:cNvPr>
+          <p:cNvGrpSpPr/>
+          <p:nvPr/>
+        </p:nvGrpSpPr>
+        <p:grpSpPr>
+          <a:xfrm rot="5400000">
+            <a:off x="5769599" y="1843696"/>
+            <a:ext cx="175562" cy="1716435"/>
+            <a:chOff x="3240634" y="4169664"/>
+            <a:chExt cx="175562" cy="1127001"/>
+          </a:xfrm>
+        </p:grpSpPr>
+        <p:sp>
+          <p:nvSpPr>
+            <p:cNvPr id="99" name="Likbent triangel 98">
+              <a:extLst>
+                <a:ext uri="{FF2B5EF4-FFF2-40B4-BE49-F238E27FC236}">
+                  <a16:creationId xmlns:a16="http://schemas.microsoft.com/office/drawing/2014/main" id="{224FA884-51C6-43EF-AB80-72655B00ECFB}"/>
+                </a:ext>
+              </a:extLst>
+            </p:cNvPr>
+            <p:cNvSpPr/>
+            <p:nvPr/>
+          </p:nvSpPr>
+          <p:spPr>
+            <a:xfrm rot="10800000">
+              <a:off x="3240634" y="5164531"/>
+              <a:ext cx="175562" cy="132134"/>
+            </a:xfrm>
+            <a:prstGeom prst="triangle">
+              <a:avLst/>
+            </a:prstGeom>
+            <a:ln>
+              <a:solidFill>
+                <a:schemeClr val="tx1"/>
+              </a:solidFill>
+            </a:ln>
+          </p:spPr>
+          <p:style>
+            <a:lnRef idx="1">
+              <a:schemeClr val="accent1"/>
+            </a:lnRef>
+            <a:fillRef idx="0">
+              <a:schemeClr val="accent1"/>
+            </a:fillRef>
+            <a:effectRef idx="0">
+              <a:schemeClr val="accent1"/>
+            </a:effectRef>
+            <a:fontRef idx="minor">
+              <a:schemeClr val="tx1"/>
+            </a:fontRef>
+          </p:style>
+          <p:txBody>
+            <a:bodyPr rtlCol="0" anchor="ctr"/>
+            <a:lstStyle/>
+            <a:p>
+              <a:pPr algn="ctr"/>
+              <a:endParaRPr lang="sv-SE"/>
+            </a:p>
+          </p:txBody>
+        </p:sp>
+        <p:cxnSp>
+          <p:nvCxnSpPr>
+            <p:cNvPr id="100" name="Rak koppling 99">
+              <a:extLst>
+                <a:ext uri="{FF2B5EF4-FFF2-40B4-BE49-F238E27FC236}">
+                  <a16:creationId xmlns:a16="http://schemas.microsoft.com/office/drawing/2014/main" id="{AA593AB9-73DC-453B-8744-D4EE438C4553}"/>
+                </a:ext>
+              </a:extLst>
+            </p:cNvPr>
+            <p:cNvCxnSpPr>
+              <a:stCxn id="99" idx="3"/>
+            </p:cNvCxnSpPr>
+            <p:nvPr/>
+          </p:nvCxnSpPr>
+          <p:spPr>
+            <a:xfrm flipV="1">
+              <a:off x="3328415" y="4169664"/>
+              <a:ext cx="1" cy="994867"/>
+            </a:xfrm>
+            <a:prstGeom prst="line">
+              <a:avLst/>
+            </a:prstGeom>
+            <a:ln>
+              <a:solidFill>
+                <a:schemeClr val="tx1"/>
+              </a:solidFill>
+            </a:ln>
+          </p:spPr>
+          <p:style>
+            <a:lnRef idx="1">
+              <a:schemeClr val="accent1"/>
+            </a:lnRef>
+            <a:fillRef idx="0">
+              <a:schemeClr val="accent1"/>
+            </a:fillRef>
+            <a:effectRef idx="0">
+              <a:schemeClr val="accent1"/>
+            </a:effectRef>
+            <a:fontRef idx="minor">
+              <a:schemeClr val="tx1"/>
+            </a:fontRef>
+          </p:style>
+        </p:cxnSp>
+      </p:grpSp>
+      <p:sp>
+        <p:nvSpPr>
+          <p:cNvPr id="107" name="Rektangel 106">
+            <a:extLst>
+              <a:ext uri="{FF2B5EF4-FFF2-40B4-BE49-F238E27FC236}">
+                <a16:creationId xmlns:a16="http://schemas.microsoft.com/office/drawing/2014/main" id="{A123E624-1F7E-441A-AB53-BD94B3D753A6}"/>
+              </a:ext>
+            </a:extLst>
+          </p:cNvPr>
+          <p:cNvSpPr/>
+          <p:nvPr/>
+        </p:nvSpPr>
+        <p:spPr>
+          <a:xfrm>
+            <a:off x="5805132" y="3169901"/>
+            <a:ext cx="284131" cy="281041"/>
+          </a:xfrm>
+          <a:prstGeom prst="rect">
+            <a:avLst/>
+          </a:prstGeom>
+        </p:spPr>
+        <p:style>
+          <a:lnRef idx="2">
+            <a:schemeClr val="dk1">
+              <a:shade val="50000"/>
+            </a:schemeClr>
+          </a:lnRef>
+          <a:fillRef idx="1">
+            <a:schemeClr val="dk1"/>
+          </a:fillRef>
+          <a:effectRef idx="0">
+            <a:schemeClr val="dk1"/>
+          </a:effectRef>
+          <a:fontRef idx="minor">
+            <a:schemeClr val="lt1"/>
+          </a:fontRef>
+        </p:style>
+        <p:txBody>
+          <a:bodyPr rtlCol="0" anchor="ctr"/>
+          <a:lstStyle/>
+          <a:p>
+            <a:pPr algn="ctr"/>
+            <a:endParaRPr lang="sv-SE"/>
+          </a:p>
+        </p:txBody>
+      </p:sp>
+      <p:grpSp>
+        <p:nvGrpSpPr>
+          <p:cNvPr id="109" name="Grupp 108">
+            <a:extLst>
+              <a:ext uri="{FF2B5EF4-FFF2-40B4-BE49-F238E27FC236}">
+                <a16:creationId xmlns:a16="http://schemas.microsoft.com/office/drawing/2014/main" id="{379E9516-1D4B-42AD-8871-FB6CDE2C6039}"/>
+              </a:ext>
+            </a:extLst>
+          </p:cNvPr>
+          <p:cNvGrpSpPr/>
+          <p:nvPr/>
+        </p:nvGrpSpPr>
+        <p:grpSpPr>
+          <a:xfrm rot="5400000">
+            <a:off x="5740922" y="2412978"/>
+            <a:ext cx="175562" cy="1773790"/>
+            <a:chOff x="3240634" y="4169664"/>
+            <a:chExt cx="175562" cy="1127001"/>
+          </a:xfrm>
+        </p:grpSpPr>
+        <p:sp>
+          <p:nvSpPr>
+            <p:cNvPr id="110" name="Likbent triangel 109">
+              <a:extLst>
+                <a:ext uri="{FF2B5EF4-FFF2-40B4-BE49-F238E27FC236}">
+                  <a16:creationId xmlns:a16="http://schemas.microsoft.com/office/drawing/2014/main" id="{97712C05-7CCE-4720-8BE9-C66161C84F29}"/>
+                </a:ext>
+              </a:extLst>
+            </p:cNvPr>
+            <p:cNvSpPr/>
+            <p:nvPr/>
+          </p:nvSpPr>
+          <p:spPr>
+            <a:xfrm rot="10800000">
+              <a:off x="3240634" y="5164531"/>
+              <a:ext cx="175562" cy="132134"/>
+            </a:xfrm>
+            <a:prstGeom prst="triangle">
+              <a:avLst/>
+            </a:prstGeom>
+            <a:ln>
+              <a:solidFill>
+                <a:schemeClr val="tx1"/>
+              </a:solidFill>
+            </a:ln>
+          </p:spPr>
+          <p:style>
+            <a:lnRef idx="1">
+              <a:schemeClr val="accent1"/>
+            </a:lnRef>
+            <a:fillRef idx="0">
+              <a:schemeClr val="accent1"/>
+            </a:fillRef>
+            <a:effectRef idx="0">
+              <a:schemeClr val="accent1"/>
+            </a:effectRef>
+            <a:fontRef idx="minor">
+              <a:schemeClr val="tx1"/>
+            </a:fontRef>
+          </p:style>
+          <p:txBody>
+            <a:bodyPr rtlCol="0" anchor="ctr"/>
+            <a:lstStyle/>
+            <a:p>
+              <a:pPr algn="ctr"/>
+              <a:endParaRPr lang="sv-SE"/>
+            </a:p>
+          </p:txBody>
+        </p:sp>
+        <p:cxnSp>
+          <p:nvCxnSpPr>
+            <p:cNvPr id="111" name="Rak koppling 110">
+              <a:extLst>
+                <a:ext uri="{FF2B5EF4-FFF2-40B4-BE49-F238E27FC236}">
+                  <a16:creationId xmlns:a16="http://schemas.microsoft.com/office/drawing/2014/main" id="{AF317DD0-B797-45DD-977A-FBA6EDC66B74}"/>
+                </a:ext>
+              </a:extLst>
+            </p:cNvPr>
+            <p:cNvCxnSpPr>
+              <a:stCxn id="110" idx="3"/>
+            </p:cNvCxnSpPr>
+            <p:nvPr/>
+          </p:nvCxnSpPr>
+          <p:spPr>
+            <a:xfrm flipV="1">
+              <a:off x="3328415" y="4169664"/>
+              <a:ext cx="1" cy="994867"/>
+            </a:xfrm>
+            <a:prstGeom prst="line">
+              <a:avLst/>
+            </a:prstGeom>
+            <a:ln>
+              <a:solidFill>
+                <a:schemeClr val="tx1"/>
+              </a:solidFill>
+            </a:ln>
+          </p:spPr>
+          <p:style>
+            <a:lnRef idx="1">
+              <a:schemeClr val="accent1"/>
+            </a:lnRef>
+            <a:fillRef idx="0">
+              <a:schemeClr val="accent1"/>
+            </a:fillRef>
+            <a:effectRef idx="0">
+              <a:schemeClr val="accent1"/>
+            </a:effectRef>
+            <a:fontRef idx="minor">
+              <a:schemeClr val="tx1"/>
+            </a:fontRef>
+          </p:style>
+        </p:cxnSp>
+      </p:grpSp>
+      <p:sp>
+        <p:nvSpPr>
+          <p:cNvPr id="112" name="textruta 111">
+            <a:extLst>
+              <a:ext uri="{FF2B5EF4-FFF2-40B4-BE49-F238E27FC236}">
+                <a16:creationId xmlns:a16="http://schemas.microsoft.com/office/drawing/2014/main" id="{9C64DC38-F660-4714-874F-879DB04104D5}"/>
+              </a:ext>
+            </a:extLst>
+          </p:cNvPr>
+          <p:cNvSpPr txBox="1"/>
+          <p:nvPr/>
+        </p:nvSpPr>
+        <p:spPr>
+          <a:xfrm>
+            <a:off x="4990253" y="2852159"/>
+            <a:ext cx="1809926" cy="246221"/>
+          </a:xfrm>
+          <a:prstGeom prst="rect">
+            <a:avLst/>
+          </a:prstGeom>
+          <a:noFill/>
+        </p:spPr>
+        <p:txBody>
+          <a:bodyPr wrap="square">
+            <a:spAutoFit/>
+          </a:bodyPr>
+          <a:lstStyle/>
+          <a:p>
+            <a:pPr algn="ctr"/>
+            <a:r>
+              <a:rPr lang="sv-SE" sz="1000" dirty="0">
+                <a:solidFill>
+                  <a:schemeClr val="tx1"/>
+                </a:solidFill>
+                <a:latin typeface="Arial" panose="020B0604020202020204" pitchFamily="34" charset="0"/>
+                <a:cs typeface="Arial" panose="020B0604020202020204" pitchFamily="34" charset="0"/>
+              </a:rPr>
+              <a:t>ML Data Argument </a:t>
+            </a:r>
+            <a:r>
+              <a:rPr lang="sv-SE" sz="1000" dirty="0" err="1">
+                <a:solidFill>
+                  <a:schemeClr val="tx1"/>
+                </a:solidFill>
+                <a:latin typeface="Arial" panose="020B0604020202020204" pitchFamily="34" charset="0"/>
+                <a:cs typeface="Arial" panose="020B0604020202020204" pitchFamily="34" charset="0"/>
+              </a:rPr>
+              <a:t>Pattern</a:t>
+            </a:r>
+            <a:endParaRPr lang="sv-SE" sz="1000" dirty="0">
+              <a:solidFill>
+                <a:schemeClr val="tx1"/>
+              </a:solidFill>
+              <a:latin typeface="Arial" panose="020B0604020202020204" pitchFamily="34" charset="0"/>
+              <a:cs typeface="Arial" panose="020B0604020202020204" pitchFamily="34" charset="0"/>
+            </a:endParaRPr>
+          </a:p>
+        </p:txBody>
+      </p:sp>
+      <p:sp>
+        <p:nvSpPr>
+          <p:cNvPr id="113" name="textruta 112">
+            <a:extLst>
+              <a:ext uri="{FF2B5EF4-FFF2-40B4-BE49-F238E27FC236}">
+                <a16:creationId xmlns:a16="http://schemas.microsoft.com/office/drawing/2014/main" id="{4B1A9AE0-E79B-415C-8FD9-8A36B6B04FCD}"/>
+              </a:ext>
+            </a:extLst>
+          </p:cNvPr>
+          <p:cNvSpPr txBox="1"/>
+          <p:nvPr/>
+        </p:nvSpPr>
+        <p:spPr>
+          <a:xfrm>
+            <a:off x="5254316" y="2677067"/>
+            <a:ext cx="470001" cy="276999"/>
+          </a:xfrm>
+          <a:prstGeom prst="rect">
+            <a:avLst/>
+          </a:prstGeom>
+          <a:noFill/>
+        </p:spPr>
+        <p:txBody>
+          <a:bodyPr wrap="square">
+            <a:spAutoFit/>
+          </a:bodyPr>
+          <a:lstStyle/>
+          <a:p>
+            <a:pPr algn="ctr"/>
+            <a:r>
+              <a:rPr lang="sv-SE" sz="1200" dirty="0">
+                <a:latin typeface="Arial" panose="020B0604020202020204" pitchFamily="34" charset="0"/>
+                <a:cs typeface="Arial" panose="020B0604020202020204" pitchFamily="34" charset="0"/>
+              </a:rPr>
+              <a:t>[R]</a:t>
+            </a:r>
+            <a:endParaRPr lang="sv-SE" sz="1200" dirty="0"/>
+          </a:p>
+        </p:txBody>
+      </p:sp>
+      <p:sp>
+        <p:nvSpPr>
+          <p:cNvPr id="116" name="textruta 115">
+            <a:extLst>
+              <a:ext uri="{FF2B5EF4-FFF2-40B4-BE49-F238E27FC236}">
+                <a16:creationId xmlns:a16="http://schemas.microsoft.com/office/drawing/2014/main" id="{14EC0D9C-9547-4D49-8623-73032C1A01F6}"/>
+              </a:ext>
+            </a:extLst>
+          </p:cNvPr>
+          <p:cNvSpPr txBox="1"/>
+          <p:nvPr/>
+        </p:nvSpPr>
+        <p:spPr>
+          <a:xfrm>
+            <a:off x="4621502" y="3448115"/>
+            <a:ext cx="2608688" cy="246221"/>
+          </a:xfrm>
+          <a:prstGeom prst="rect">
+            <a:avLst/>
+          </a:prstGeom>
+          <a:noFill/>
+        </p:spPr>
+        <p:txBody>
+          <a:bodyPr wrap="square">
+            <a:spAutoFit/>
+          </a:bodyPr>
+          <a:lstStyle/>
+          <a:p>
+            <a:pPr algn="ctr"/>
+            <a:r>
+              <a:rPr lang="sv-SE" sz="1000" dirty="0">
+                <a:solidFill>
+                  <a:schemeClr val="tx1"/>
+                </a:solidFill>
+                <a:latin typeface="Arial" panose="020B0604020202020204" pitchFamily="34" charset="0"/>
+                <a:cs typeface="Arial" panose="020B0604020202020204" pitchFamily="34" charset="0"/>
+              </a:rPr>
+              <a:t>ML Learning Argument </a:t>
+            </a:r>
+            <a:r>
+              <a:rPr lang="sv-SE" sz="1000" dirty="0" err="1">
+                <a:solidFill>
+                  <a:schemeClr val="tx1"/>
+                </a:solidFill>
+                <a:latin typeface="Arial" panose="020B0604020202020204" pitchFamily="34" charset="0"/>
+                <a:cs typeface="Arial" panose="020B0604020202020204" pitchFamily="34" charset="0"/>
+              </a:rPr>
+              <a:t>Pattern</a:t>
+            </a:r>
+            <a:endParaRPr lang="sv-SE" sz="1000" dirty="0">
+              <a:solidFill>
+                <a:schemeClr val="tx1"/>
+              </a:solidFill>
+              <a:latin typeface="Arial" panose="020B0604020202020204" pitchFamily="34" charset="0"/>
+              <a:cs typeface="Arial" panose="020B0604020202020204" pitchFamily="34" charset="0"/>
+            </a:endParaRPr>
+          </a:p>
+        </p:txBody>
+      </p:sp>
+      <p:sp>
+        <p:nvSpPr>
+          <p:cNvPr id="117" name="textruta 116">
+            <a:extLst>
+              <a:ext uri="{FF2B5EF4-FFF2-40B4-BE49-F238E27FC236}">
+                <a16:creationId xmlns:a16="http://schemas.microsoft.com/office/drawing/2014/main" id="{883628F2-9ADD-44BC-885F-735F0479A20E}"/>
+              </a:ext>
+            </a:extLst>
+          </p:cNvPr>
+          <p:cNvSpPr txBox="1"/>
+          <p:nvPr/>
+        </p:nvSpPr>
+        <p:spPr>
+          <a:xfrm>
+            <a:off x="5351437" y="3285159"/>
+            <a:ext cx="470001" cy="276999"/>
+          </a:xfrm>
+          <a:prstGeom prst="rect">
+            <a:avLst/>
+          </a:prstGeom>
+          <a:noFill/>
+        </p:spPr>
+        <p:txBody>
+          <a:bodyPr wrap="square">
+            <a:spAutoFit/>
+          </a:bodyPr>
+          <a:lstStyle/>
+          <a:p>
+            <a:pPr algn="ctr"/>
+            <a:r>
+              <a:rPr lang="sv-SE" sz="1200" dirty="0">
+                <a:latin typeface="Arial" panose="020B0604020202020204" pitchFamily="34" charset="0"/>
+                <a:cs typeface="Arial" panose="020B0604020202020204" pitchFamily="34" charset="0"/>
+              </a:rPr>
+              <a:t>[W]</a:t>
+            </a:r>
+            <a:endParaRPr lang="sv-SE" sz="1200" dirty="0"/>
+          </a:p>
+        </p:txBody>
+      </p:sp>
+      <p:sp>
+        <p:nvSpPr>
+          <p:cNvPr id="118" name="textruta 117">
+            <a:extLst>
+              <a:ext uri="{FF2B5EF4-FFF2-40B4-BE49-F238E27FC236}">
+                <a16:creationId xmlns:a16="http://schemas.microsoft.com/office/drawing/2014/main" id="{731CE33B-99B0-48BB-A7BD-0EA6A777A7F2}"/>
+              </a:ext>
+            </a:extLst>
+          </p:cNvPr>
+          <p:cNvSpPr txBox="1"/>
+          <p:nvPr/>
+        </p:nvSpPr>
+        <p:spPr>
+          <a:xfrm>
+            <a:off x="5221817" y="5253031"/>
+            <a:ext cx="470001" cy="276999"/>
+          </a:xfrm>
+          <a:prstGeom prst="rect">
+            <a:avLst/>
+          </a:prstGeom>
+          <a:noFill/>
+        </p:spPr>
+        <p:txBody>
+          <a:bodyPr wrap="square">
+            <a:spAutoFit/>
+          </a:bodyPr>
+          <a:lstStyle/>
+          <a:p>
+            <a:r>
+              <a:rPr lang="sv-SE" sz="1200" dirty="0">
+                <a:latin typeface="Arial" panose="020B0604020202020204" pitchFamily="34" charset="0"/>
+                <a:cs typeface="Arial" panose="020B0604020202020204" pitchFamily="34" charset="0"/>
+              </a:rPr>
+              <a:t>[H]</a:t>
+            </a:r>
+            <a:endParaRPr lang="sv-SE" sz="1200" dirty="0"/>
           </a:p>
         </p:txBody>
       </p:sp>

</xml_diff>

<commit_message>
Fix numbering in figure
</commit_message>
<xml_diff>
--- a/docs/figures/figures.pptx
+++ b/docs/figures/figures.pptx
@@ -277,7 +277,7 @@
           <a:p>
             <a:fld id="{89E19A41-2D67-4984-881E-035821EC17D6}" type="datetimeFigureOut">
               <a:rPr lang="sv-SE" smtClean="0"/>
-              <a:t>2021-09-27</a:t>
+              <a:t>2021-10-04</a:t>
             </a:fld>
             <a:endParaRPr lang="sv-SE"/>
           </a:p>
@@ -475,7 +475,7 @@
           <a:p>
             <a:fld id="{89E19A41-2D67-4984-881E-035821EC17D6}" type="datetimeFigureOut">
               <a:rPr lang="sv-SE" smtClean="0"/>
-              <a:t>2021-09-27</a:t>
+              <a:t>2021-10-04</a:t>
             </a:fld>
             <a:endParaRPr lang="sv-SE"/>
           </a:p>
@@ -683,7 +683,7 @@
           <a:p>
             <a:fld id="{89E19A41-2D67-4984-881E-035821EC17D6}" type="datetimeFigureOut">
               <a:rPr lang="sv-SE" smtClean="0"/>
-              <a:t>2021-09-27</a:t>
+              <a:t>2021-10-04</a:t>
             </a:fld>
             <a:endParaRPr lang="sv-SE"/>
           </a:p>
@@ -881,7 +881,7 @@
           <a:p>
             <a:fld id="{89E19A41-2D67-4984-881E-035821EC17D6}" type="datetimeFigureOut">
               <a:rPr lang="sv-SE" smtClean="0"/>
-              <a:t>2021-09-27</a:t>
+              <a:t>2021-10-04</a:t>
             </a:fld>
             <a:endParaRPr lang="sv-SE"/>
           </a:p>
@@ -1156,7 +1156,7 @@
           <a:p>
             <a:fld id="{89E19A41-2D67-4984-881E-035821EC17D6}" type="datetimeFigureOut">
               <a:rPr lang="sv-SE" smtClean="0"/>
-              <a:t>2021-09-27</a:t>
+              <a:t>2021-10-04</a:t>
             </a:fld>
             <a:endParaRPr lang="sv-SE"/>
           </a:p>
@@ -1421,7 +1421,7 @@
           <a:p>
             <a:fld id="{89E19A41-2D67-4984-881E-035821EC17D6}" type="datetimeFigureOut">
               <a:rPr lang="sv-SE" smtClean="0"/>
-              <a:t>2021-09-27</a:t>
+              <a:t>2021-10-04</a:t>
             </a:fld>
             <a:endParaRPr lang="sv-SE"/>
           </a:p>
@@ -1833,7 +1833,7 @@
           <a:p>
             <a:fld id="{89E19A41-2D67-4984-881E-035821EC17D6}" type="datetimeFigureOut">
               <a:rPr lang="sv-SE" smtClean="0"/>
-              <a:t>2021-09-27</a:t>
+              <a:t>2021-10-04</a:t>
             </a:fld>
             <a:endParaRPr lang="sv-SE"/>
           </a:p>
@@ -1974,7 +1974,7 @@
           <a:p>
             <a:fld id="{89E19A41-2D67-4984-881E-035821EC17D6}" type="datetimeFigureOut">
               <a:rPr lang="sv-SE" smtClean="0"/>
-              <a:t>2021-09-27</a:t>
+              <a:t>2021-10-04</a:t>
             </a:fld>
             <a:endParaRPr lang="sv-SE"/>
           </a:p>
@@ -2087,7 +2087,7 @@
           <a:p>
             <a:fld id="{89E19A41-2D67-4984-881E-035821EC17D6}" type="datetimeFigureOut">
               <a:rPr lang="sv-SE" smtClean="0"/>
-              <a:t>2021-09-27</a:t>
+              <a:t>2021-10-04</a:t>
             </a:fld>
             <a:endParaRPr lang="sv-SE"/>
           </a:p>
@@ -2398,7 +2398,7 @@
           <a:p>
             <a:fld id="{89E19A41-2D67-4984-881E-035821EC17D6}" type="datetimeFigureOut">
               <a:rPr lang="sv-SE" smtClean="0"/>
-              <a:t>2021-09-27</a:t>
+              <a:t>2021-10-04</a:t>
             </a:fld>
             <a:endParaRPr lang="sv-SE"/>
           </a:p>
@@ -2686,7 +2686,7 @@
           <a:p>
             <a:fld id="{89E19A41-2D67-4984-881E-035821EC17D6}" type="datetimeFigureOut">
               <a:rPr lang="sv-SE" smtClean="0"/>
-              <a:t>2021-09-27</a:t>
+              <a:t>2021-10-04</a:t>
             </a:fld>
             <a:endParaRPr lang="sv-SE"/>
           </a:p>
@@ -2927,7 +2927,7 @@
           <a:p>
             <a:fld id="{89E19A41-2D67-4984-881E-035821EC17D6}" type="datetimeFigureOut">
               <a:rPr lang="sv-SE" smtClean="0"/>
-              <a:t>2021-09-27</a:t>
+              <a:t>2021-10-04</a:t>
             </a:fld>
             <a:endParaRPr lang="sv-SE"/>
           </a:p>
@@ -22617,7 +22617,7 @@
                 <a:latin typeface="Arial" panose="020B0604020202020204" pitchFamily="34" charset="0"/>
                 <a:cs typeface="Arial" panose="020B0604020202020204" pitchFamily="34" charset="0"/>
               </a:rPr>
-              <a:t>G5.5</a:t>
+              <a:t>G5.4</a:t>
             </a:r>
           </a:p>
           <a:p>
@@ -23804,7 +23804,7 @@
                 <a:latin typeface="Arial" panose="020B0604020202020204" pitchFamily="34" charset="0"/>
                 <a:cs typeface="Arial" panose="020B0604020202020204" pitchFamily="34" charset="0"/>
               </a:rPr>
-              <a:t>G5.6</a:t>
+              <a:t>G5.5</a:t>
             </a:r>
           </a:p>
           <a:p>
@@ -24107,7 +24107,7 @@
                 <a:latin typeface="Arial" panose="020B0604020202020204" pitchFamily="34" charset="0"/>
                 <a:cs typeface="Arial" panose="020B0604020202020204" pitchFamily="34" charset="0"/>
               </a:rPr>
-              <a:t>G5.7</a:t>
+              <a:t>G5.6</a:t>
             </a:r>
           </a:p>
           <a:p>

</xml_diff>

<commit_message>
Update figures to be more specific (IDs)
</commit_message>
<xml_diff>
--- a/docs/figures/figures.pptx
+++ b/docs/figures/figures.pptx
@@ -277,7 +277,7 @@
           <a:p>
             <a:fld id="{89E19A41-2D67-4984-881E-035821EC17D6}" type="datetimeFigureOut">
               <a:rPr lang="sv-SE" smtClean="0"/>
-              <a:t>2021-10-04</a:t>
+              <a:t>2021-10-06</a:t>
             </a:fld>
             <a:endParaRPr lang="sv-SE"/>
           </a:p>
@@ -475,7 +475,7 @@
           <a:p>
             <a:fld id="{89E19A41-2D67-4984-881E-035821EC17D6}" type="datetimeFigureOut">
               <a:rPr lang="sv-SE" smtClean="0"/>
-              <a:t>2021-10-04</a:t>
+              <a:t>2021-10-06</a:t>
             </a:fld>
             <a:endParaRPr lang="sv-SE"/>
           </a:p>
@@ -683,7 +683,7 @@
           <a:p>
             <a:fld id="{89E19A41-2D67-4984-881E-035821EC17D6}" type="datetimeFigureOut">
               <a:rPr lang="sv-SE" smtClean="0"/>
-              <a:t>2021-10-04</a:t>
+              <a:t>2021-10-06</a:t>
             </a:fld>
             <a:endParaRPr lang="sv-SE"/>
           </a:p>
@@ -881,7 +881,7 @@
           <a:p>
             <a:fld id="{89E19A41-2D67-4984-881E-035821EC17D6}" type="datetimeFigureOut">
               <a:rPr lang="sv-SE" smtClean="0"/>
-              <a:t>2021-10-04</a:t>
+              <a:t>2021-10-06</a:t>
             </a:fld>
             <a:endParaRPr lang="sv-SE"/>
           </a:p>
@@ -1156,7 +1156,7 @@
           <a:p>
             <a:fld id="{89E19A41-2D67-4984-881E-035821EC17D6}" type="datetimeFigureOut">
               <a:rPr lang="sv-SE" smtClean="0"/>
-              <a:t>2021-10-04</a:t>
+              <a:t>2021-10-06</a:t>
             </a:fld>
             <a:endParaRPr lang="sv-SE"/>
           </a:p>
@@ -1421,7 +1421,7 @@
           <a:p>
             <a:fld id="{89E19A41-2D67-4984-881E-035821EC17D6}" type="datetimeFigureOut">
               <a:rPr lang="sv-SE" smtClean="0"/>
-              <a:t>2021-10-04</a:t>
+              <a:t>2021-10-06</a:t>
             </a:fld>
             <a:endParaRPr lang="sv-SE"/>
           </a:p>
@@ -1833,7 +1833,7 @@
           <a:p>
             <a:fld id="{89E19A41-2D67-4984-881E-035821EC17D6}" type="datetimeFigureOut">
               <a:rPr lang="sv-SE" smtClean="0"/>
-              <a:t>2021-10-04</a:t>
+              <a:t>2021-10-06</a:t>
             </a:fld>
             <a:endParaRPr lang="sv-SE"/>
           </a:p>
@@ -1974,7 +1974,7 @@
           <a:p>
             <a:fld id="{89E19A41-2D67-4984-881E-035821EC17D6}" type="datetimeFigureOut">
               <a:rPr lang="sv-SE" smtClean="0"/>
-              <a:t>2021-10-04</a:t>
+              <a:t>2021-10-06</a:t>
             </a:fld>
             <a:endParaRPr lang="sv-SE"/>
           </a:p>
@@ -2087,7 +2087,7 @@
           <a:p>
             <a:fld id="{89E19A41-2D67-4984-881E-035821EC17D6}" type="datetimeFigureOut">
               <a:rPr lang="sv-SE" smtClean="0"/>
-              <a:t>2021-10-04</a:t>
+              <a:t>2021-10-06</a:t>
             </a:fld>
             <a:endParaRPr lang="sv-SE"/>
           </a:p>
@@ -2398,7 +2398,7 @@
           <a:p>
             <a:fld id="{89E19A41-2D67-4984-881E-035821EC17D6}" type="datetimeFigureOut">
               <a:rPr lang="sv-SE" smtClean="0"/>
-              <a:t>2021-10-04</a:t>
+              <a:t>2021-10-06</a:t>
             </a:fld>
             <a:endParaRPr lang="sv-SE"/>
           </a:p>
@@ -2686,7 +2686,7 @@
           <a:p>
             <a:fld id="{89E19A41-2D67-4984-881E-035821EC17D6}" type="datetimeFigureOut">
               <a:rPr lang="sv-SE" smtClean="0"/>
-              <a:t>2021-10-04</a:t>
+              <a:t>2021-10-06</a:t>
             </a:fld>
             <a:endParaRPr lang="sv-SE"/>
           </a:p>
@@ -2927,7 +2927,7 @@
           <a:p>
             <a:fld id="{89E19A41-2D67-4984-881E-035821EC17D6}" type="datetimeFigureOut">
               <a:rPr lang="sv-SE" smtClean="0"/>
-              <a:t>2021-10-04</a:t>
+              <a:t>2021-10-06</a:t>
             </a:fld>
             <a:endParaRPr lang="sv-SE"/>
           </a:p>
@@ -9111,7 +9111,7 @@
                 <a:effectLst/>
                 <a:latin typeface="Arial" panose="020B0604020202020204" pitchFamily="34" charset="0"/>
               </a:rPr>
-              <a:t>Allocated system safety requirements are satisfied in the development of the ML Model</a:t>
+              <a:t>ML safety requirements SYS-ML-REQ1 and SYS-ML-REQ2 are satisfied in the development of the ML Model</a:t>
             </a:r>
             <a:endParaRPr lang="sv-SE" sz="1000" dirty="0">
               <a:solidFill>
@@ -9840,7 +9840,7 @@
         <p:spPr>
           <a:xfrm>
             <a:off x="-1219" y="37063"/>
-            <a:ext cx="6097218" cy="369332"/>
+            <a:ext cx="4683575" cy="369332"/>
           </a:xfrm>
           <a:prstGeom prst="rect">
             <a:avLst/>
@@ -15105,8 +15105,8 @@
         </p:nvSpPr>
         <p:spPr>
           <a:xfrm>
-            <a:off x="4152627" y="2488366"/>
-            <a:ext cx="1698884" cy="976830"/>
+            <a:off x="4047893" y="2488366"/>
+            <a:ext cx="1908352" cy="976830"/>
           </a:xfrm>
           <a:prstGeom prst="rect">
             <a:avLst/>
@@ -15164,7 +15164,7 @@
                 <a:effectLst/>
                 <a:latin typeface="Arial" panose="020B0604020202020204" pitchFamily="34" charset="0"/>
               </a:rPr>
-              <a:t>Data requirements are sufficient to ensure it is possible to develop an ML model that satisfies the ML Safety Requirements</a:t>
+              <a:t>Data requirements are sufficient to ensure it is possible to develop an ML model that satisfies SYS-ML-REQ1 and SYS-ML-REQ2</a:t>
             </a:r>
             <a:endParaRPr lang="sv-SE" sz="1000" dirty="0">
               <a:solidFill>
@@ -19431,8 +19431,8 @@
         </p:nvCxnSpPr>
         <p:spPr>
           <a:xfrm flipH="1">
-            <a:off x="3223264" y="2027670"/>
-            <a:ext cx="2766448" cy="553568"/>
+            <a:off x="3011392" y="2027670"/>
+            <a:ext cx="2978320" cy="553568"/>
           </a:xfrm>
           <a:prstGeom prst="straightConnector1">
             <a:avLst/>
@@ -19473,8 +19473,8 @@
         </p:nvSpPr>
         <p:spPr>
           <a:xfrm>
-            <a:off x="2373822" y="2581238"/>
-            <a:ext cx="1698884" cy="976830"/>
+            <a:off x="2007221" y="2581238"/>
+            <a:ext cx="2008342" cy="976830"/>
           </a:xfrm>
           <a:prstGeom prst="rect">
             <a:avLst/>
@@ -19532,7 +19532,7 @@
                 <a:effectLst/>
                 <a:latin typeface="Arial" panose="020B0604020202020204" pitchFamily="34" charset="0"/>
               </a:rPr>
-              <a:t>The selected model satisfies the ML safety requirements when using internal test data</a:t>
+              <a:t>The selected model satisfies the ML safety requirements SYS-ML-REQ1 and SYS-ML-REQ2 when using internal test data</a:t>
             </a:r>
             <a:endParaRPr lang="sv-SE" sz="1000" dirty="0">
               <a:solidFill>
@@ -19603,7 +19603,7 @@
         </p:nvSpPr>
         <p:spPr>
           <a:xfrm>
-            <a:off x="2633649" y="3879678"/>
+            <a:off x="2421777" y="3879678"/>
             <a:ext cx="1186250" cy="1020938"/>
           </a:xfrm>
           <a:prstGeom prst="ellipse">
@@ -19712,7 +19712,7 @@
         </p:nvCxnSpPr>
         <p:spPr>
           <a:xfrm>
-            <a:off x="3223264" y="3558068"/>
+            <a:off x="3011392" y="3558068"/>
             <a:ext cx="3510" cy="321610"/>
           </a:xfrm>
           <a:prstGeom prst="straightConnector1">
@@ -20485,7 +20485,7 @@
         </p:nvSpPr>
         <p:spPr>
           <a:xfrm>
-            <a:off x="2723125" y="4024392"/>
+            <a:off x="2511253" y="4024392"/>
             <a:ext cx="409259" cy="276999"/>
           </a:xfrm>
           <a:prstGeom prst="rect">
@@ -21338,7 +21338,17 @@
                 <a:latin typeface="Arial" panose="020B0604020202020204" pitchFamily="34" charset="0"/>
                 <a:cs typeface="Arial" panose="020B0604020202020204" pitchFamily="34" charset="0"/>
               </a:rPr>
-              <a:t>The internal test results indicate that the model satisfies the ML safety requirements</a:t>
+              <a:t>The internal test results indicate that the model satisfies </a:t>
+            </a:r>
+            <a:r>
+              <a:rPr lang="en-US" sz="1000" dirty="0">
+                <a:solidFill>
+                  <a:schemeClr val="tx1"/>
+                </a:solidFill>
+                <a:effectLst/>
+                <a:latin typeface="Arial" panose="020B0604020202020204" pitchFamily="34" charset="0"/>
+              </a:rPr>
+              <a:t>SYS-ML-REQ1 and SYS-ML-REQ2</a:t>
             </a:r>
             <a:endParaRPr lang="sv-SE" sz="1000" dirty="0">
               <a:solidFill>
@@ -22218,7 +22228,7 @@
                 <a:effectLst/>
                 <a:latin typeface="Arial" panose="020B0604020202020204" pitchFamily="34" charset="0"/>
               </a:rPr>
-              <a:t>The ML safety requirements are satisfied</a:t>
+              <a:t>ML Safety requirements SYS-ML-REQ1 and SYS-ML-REQ2 are satisfied</a:t>
             </a:r>
             <a:endParaRPr lang="sv-SE" sz="1000" dirty="0">
               <a:solidFill>
@@ -22362,8 +22372,8 @@
         </p:nvSpPr>
         <p:spPr>
           <a:xfrm>
-            <a:off x="6228781" y="2181009"/>
-            <a:ext cx="1814449" cy="776504"/>
+            <a:off x="6131621" y="2181009"/>
+            <a:ext cx="2008770" cy="776504"/>
           </a:xfrm>
           <a:prstGeom prst="rect">
             <a:avLst/>
@@ -22421,7 +22431,7 @@
                 <a:effectLst/>
                 <a:latin typeface="Arial" panose="020B0604020202020204" pitchFamily="34" charset="0"/>
               </a:rPr>
-              <a:t>The ML safety requirements are satisfied when using the verification data</a:t>
+              <a:t>The ML safety requirements SYS-ML-REQ1 and SYS-ML-REQ2 are satisfied when using the verification data</a:t>
             </a:r>
             <a:endParaRPr lang="sv-SE" sz="1000" dirty="0">
               <a:solidFill>
@@ -22571,8 +22581,8 @@
         </p:nvSpPr>
         <p:spPr>
           <a:xfrm>
-            <a:off x="4118229" y="3622431"/>
-            <a:ext cx="1576909" cy="818054"/>
+            <a:off x="4059045" y="3622431"/>
+            <a:ext cx="1695278" cy="818054"/>
           </a:xfrm>
           <a:prstGeom prst="rect">
             <a:avLst/>
@@ -22630,7 +22640,7 @@
                 <a:effectLst/>
                 <a:latin typeface="Arial" panose="020B0604020202020204" pitchFamily="34" charset="0"/>
               </a:rPr>
-              <a:t>Verification test results show that requirements are satisfied </a:t>
+              <a:t>Verification test results show that SYS-ML-REQ1 and SYS-ML-REQ2 are satisfied </a:t>
             </a:r>
             <a:endParaRPr lang="sv-SE" sz="1000" dirty="0">
               <a:solidFill>
@@ -23758,8 +23768,8 @@
         </p:nvSpPr>
         <p:spPr>
           <a:xfrm>
-            <a:off x="5998134" y="3622431"/>
-            <a:ext cx="1576909" cy="1066796"/>
+            <a:off x="5968045" y="3622431"/>
+            <a:ext cx="1637088" cy="1066796"/>
           </a:xfrm>
           <a:prstGeom prst="rect">
             <a:avLst/>
@@ -23817,7 +23827,7 @@
                 <a:effectLst/>
                 <a:latin typeface="Arial" panose="020B0604020202020204" pitchFamily="34" charset="0"/>
               </a:rPr>
-              <a:t>The verification data is sufficient to verify the intent of the ML safety requirements in the operating environment</a:t>
+              <a:t>The verification data is sufficient to verify the intent of SYS-ML-REQ1 and SYS-ML-REQ2 in the operating environment</a:t>
             </a:r>
             <a:endParaRPr lang="sv-SE" sz="1000" dirty="0">
               <a:solidFill>
@@ -24393,8 +24403,8 @@
         </p:nvGrpSpPr>
         <p:grpSpPr>
           <a:xfrm rot="3926756">
-            <a:off x="3437053" y="2139399"/>
-            <a:ext cx="175562" cy="1127001"/>
+            <a:off x="3302195" y="2054315"/>
+            <a:ext cx="178004" cy="1421966"/>
             <a:chOff x="3240634" y="4169664"/>
             <a:chExt cx="175562" cy="1127001"/>
           </a:xfrm>
@@ -24506,8 +24516,8 @@
         </p:nvGrpSpPr>
         <p:grpSpPr>
           <a:xfrm rot="6625890">
-            <a:off x="3531988" y="1750864"/>
-            <a:ext cx="175562" cy="1127001"/>
+            <a:off x="3228328" y="1646744"/>
+            <a:ext cx="171828" cy="1410548"/>
             <a:chOff x="3240634" y="4169664"/>
             <a:chExt cx="175562" cy="1127001"/>
           </a:xfrm>
@@ -24619,8 +24629,8 @@
         </p:nvSpPr>
         <p:spPr>
           <a:xfrm>
-            <a:off x="4944624" y="-16892"/>
-            <a:ext cx="2313426" cy="845567"/>
+            <a:off x="4764811" y="-16892"/>
+            <a:ext cx="2673052" cy="845567"/>
           </a:xfrm>
           <a:prstGeom prst="rect">
             <a:avLst/>
@@ -24678,7 +24688,7 @@
                 <a:effectLst/>
                 <a:latin typeface="Arial" panose="020B0604020202020204" pitchFamily="34" charset="0"/>
               </a:rPr>
-              <a:t>The allocated system safety requirements are satisfied by the deployment of the ML component into the system</a:t>
+              <a:t>ML safety requirements SYS-ML-REQ1 and SYS-ML-REQ2 are satisfied by the deployment of the ML component into SMIRK</a:t>
             </a:r>
             <a:endParaRPr lang="sv-SE" sz="1000" dirty="0">
               <a:solidFill>
@@ -24855,7 +24865,7 @@
                 <a:effectLst/>
                 <a:latin typeface="Arial" panose="020B0604020202020204" pitchFamily="34" charset="0"/>
               </a:rPr>
-              <a:t>Allocated system safety requirements are satisfied throughout system operation</a:t>
+              <a:t>SYS-ML-REQ1 and SYS-ML-REQ2 are satisfied throughout SMIRK operation</a:t>
             </a:r>
             <a:endParaRPr lang="sv-SE" sz="1000" dirty="0">
               <a:solidFill>
@@ -24881,7 +24891,7 @@
         </p:nvSpPr>
         <p:spPr>
           <a:xfrm>
-            <a:off x="3636171" y="4551569"/>
+            <a:off x="3685175" y="3660455"/>
             <a:ext cx="1576909" cy="987432"/>
           </a:xfrm>
           <a:prstGeom prst="rect">
@@ -24940,7 +24950,7 @@
                 <a:effectLst/>
                 <a:latin typeface="Arial" panose="020B0604020202020204" pitchFamily="34" charset="0"/>
               </a:rPr>
-              <a:t>Integration test results show that allocated system safety requirements are satisfied </a:t>
+              <a:t>Integration test results show that SYS-ML-REQ1 and SYS-ML-REQ2 are satisfied </a:t>
             </a:r>
             <a:endParaRPr lang="sv-SE" sz="1000" dirty="0">
               <a:solidFill>
@@ -24969,8 +24979,8 @@
         </p:nvCxnSpPr>
         <p:spPr>
           <a:xfrm flipH="1">
-            <a:off x="6087568" y="828675"/>
-            <a:ext cx="13769" cy="436073"/>
+            <a:off x="6098719" y="828675"/>
+            <a:ext cx="2618" cy="291110"/>
           </a:xfrm>
           <a:prstGeom prst="straightConnector1">
             <a:avLst/>
@@ -25410,8 +25420,8 @@
         </p:nvSpPr>
         <p:spPr>
           <a:xfrm>
-            <a:off x="3700086" y="2233197"/>
-            <a:ext cx="1624741" cy="829124"/>
+            <a:off x="3348943" y="2128571"/>
+            <a:ext cx="2327028" cy="1105282"/>
           </a:xfrm>
           <a:prstGeom prst="rect">
             <a:avLst/>
@@ -25469,7 +25479,7 @@
                 <a:effectLst/>
                 <a:latin typeface="Arial" panose="020B0604020202020204" pitchFamily="34" charset="0"/>
               </a:rPr>
-              <a:t>Argument over the integration and operation of the ML component</a:t>
+              <a:t>SYS-ML-REQ1 and SYS-ML-REQ2 are satisfied under all defined operating scenarios when the ML component  is integrated into SMIRK</a:t>
             </a:r>
             <a:endParaRPr lang="sv-SE" sz="1000" dirty="0">
               <a:solidFill>
@@ -25499,8 +25509,8 @@
         </p:nvCxnSpPr>
         <p:spPr>
           <a:xfrm flipH="1">
-            <a:off x="4512457" y="1948970"/>
-            <a:ext cx="1489583" cy="284227"/>
+            <a:off x="4512457" y="1804007"/>
+            <a:ext cx="1500734" cy="324564"/>
           </a:xfrm>
           <a:prstGeom prst="straightConnector1">
             <a:avLst/>
@@ -25545,7 +25555,7 @@
         </p:nvCxnSpPr>
         <p:spPr>
           <a:xfrm>
-            <a:off x="4424626" y="5539001"/>
+            <a:off x="4473630" y="4647887"/>
             <a:ext cx="2050" cy="254793"/>
           </a:xfrm>
           <a:prstGeom prst="straightConnector1">
@@ -25587,7 +25597,7 @@
         </p:nvSpPr>
         <p:spPr>
           <a:xfrm>
-            <a:off x="3831808" y="5793794"/>
+            <a:off x="3880812" y="4902680"/>
             <a:ext cx="1189736" cy="1023938"/>
           </a:xfrm>
           <a:prstGeom prst="ellipse">
@@ -25682,7 +25692,7 @@
         </p:nvSpPr>
         <p:spPr>
           <a:xfrm>
-            <a:off x="3875245" y="5924747"/>
+            <a:off x="3924249" y="5033633"/>
             <a:ext cx="469621" cy="276999"/>
           </a:xfrm>
           <a:prstGeom prst="rect">
@@ -25721,7 +25731,7 @@
         </p:nvSpPr>
         <p:spPr>
           <a:xfrm>
-            <a:off x="4938911" y="1264748"/>
+            <a:off x="4950062" y="1119785"/>
             <a:ext cx="2126258" cy="684222"/>
           </a:xfrm>
           <a:prstGeom prst="parallelogram">
@@ -25810,8 +25820,8 @@
         </p:nvCxnSpPr>
         <p:spPr>
           <a:xfrm>
-            <a:off x="6002040" y="1948970"/>
-            <a:ext cx="1009721" cy="282052"/>
+            <a:off x="6013191" y="1804007"/>
+            <a:ext cx="998570" cy="427015"/>
           </a:xfrm>
           <a:prstGeom prst="straightConnector1">
             <a:avLst/>
@@ -25838,111 +25848,25 @@
           </a:fontRef>
         </p:style>
       </p:cxnSp>
-      <p:sp>
-        <p:nvSpPr>
-          <p:cNvPr id="80" name="Parallellogram 79">
-            <a:extLst>
-              <a:ext uri="{FF2B5EF4-FFF2-40B4-BE49-F238E27FC236}">
-                <a16:creationId xmlns:a16="http://schemas.microsoft.com/office/drawing/2014/main" id="{7B1F61D4-E14F-411A-B8AC-ED30A6A401D7}"/>
-              </a:ext>
-            </a:extLst>
-          </p:cNvPr>
-          <p:cNvSpPr/>
-          <p:nvPr/>
-        </p:nvSpPr>
-        <p:spPr>
-          <a:xfrm>
-            <a:off x="3564731" y="3429000"/>
-            <a:ext cx="1723994" cy="684222"/>
-          </a:xfrm>
-          <a:prstGeom prst="parallelogram">
-            <a:avLst/>
-          </a:prstGeom>
-          <a:solidFill>
-            <a:schemeClr val="bg2"/>
-          </a:solidFill>
-          <a:ln w="6350">
-            <a:solidFill>
-              <a:schemeClr val="tx1"/>
-            </a:solidFill>
-          </a:ln>
-        </p:spPr>
-        <p:style>
-          <a:lnRef idx="2">
-            <a:schemeClr val="accent1">
-              <a:shade val="50000"/>
-            </a:schemeClr>
-          </a:lnRef>
-          <a:fillRef idx="1">
-            <a:schemeClr val="accent1"/>
-          </a:fillRef>
-          <a:effectRef idx="0">
-            <a:schemeClr val="accent1"/>
-          </a:effectRef>
-          <a:fontRef idx="minor">
-            <a:schemeClr val="lt1"/>
-          </a:fontRef>
-        </p:style>
-        <p:txBody>
-          <a:bodyPr wrap="square" rtlCol="0" anchor="ctr">
-            <a:noAutofit/>
-          </a:bodyPr>
-          <a:lstStyle/>
-          <a:p>
-            <a:pPr algn="ctr"/>
-            <a:r>
-              <a:rPr lang="en-US" sz="1000" b="1" dirty="0">
-                <a:solidFill>
-                  <a:schemeClr val="tx1"/>
-                </a:solidFill>
-                <a:latin typeface="Arial" panose="020B0604020202020204" pitchFamily="34" charset="0"/>
-                <a:cs typeface="Arial" panose="020B0604020202020204" pitchFamily="34" charset="0"/>
-              </a:rPr>
-              <a:t>S6.2</a:t>
-            </a:r>
-          </a:p>
-          <a:p>
-            <a:pPr algn="ctr"/>
-            <a:r>
-              <a:rPr lang="en-US" sz="1000" dirty="0">
-                <a:solidFill>
-                  <a:schemeClr val="tx1"/>
-                </a:solidFill>
-                <a:effectLst/>
-                <a:latin typeface="Arial" panose="020B0604020202020204" pitchFamily="34" charset="0"/>
-              </a:rPr>
-              <a:t>Argument over the defined operating scenarios</a:t>
-            </a:r>
-            <a:endParaRPr lang="sv-SE" sz="1000" dirty="0">
-              <a:solidFill>
-                <a:schemeClr val="tx1"/>
-              </a:solidFill>
-              <a:latin typeface="Arial" panose="020B0604020202020204" pitchFamily="34" charset="0"/>
-              <a:cs typeface="Arial" panose="020B0604020202020204" pitchFamily="34" charset="0"/>
-            </a:endParaRPr>
-          </a:p>
-        </p:txBody>
-      </p:sp>
       <p:cxnSp>
         <p:nvCxnSpPr>
-          <p:cNvPr id="83" name="Rak pilkoppling 82">
-            <a:extLst>
-              <a:ext uri="{FF2B5EF4-FFF2-40B4-BE49-F238E27FC236}">
-                <a16:creationId xmlns:a16="http://schemas.microsoft.com/office/drawing/2014/main" id="{C0B337F8-F381-4E5E-9A0D-975A4A04DDAD}"/>
+          <p:cNvPr id="85" name="Rak pilkoppling 84">
+            <a:extLst>
+              <a:ext uri="{FF2B5EF4-FFF2-40B4-BE49-F238E27FC236}">
+                <a16:creationId xmlns:a16="http://schemas.microsoft.com/office/drawing/2014/main" id="{AFCD2C64-F729-4F8B-8964-1BD9ED3C3BD9}"/>
               </a:ext>
             </a:extLst>
           </p:cNvPr>
           <p:cNvCxnSpPr>
             <a:cxnSpLocks/>
-            <a:stCxn id="69" idx="2"/>
-            <a:endCxn id="80" idx="1"/>
+            <a:endCxn id="124" idx="0"/>
           </p:cNvCxnSpPr>
           <p:nvPr/>
         </p:nvCxnSpPr>
         <p:spPr>
           <a:xfrm flipH="1">
-            <a:off x="4512256" y="3062321"/>
-            <a:ext cx="201" cy="366679"/>
+            <a:off x="4473630" y="3222108"/>
+            <a:ext cx="2102" cy="438347"/>
           </a:xfrm>
           <a:prstGeom prst="straightConnector1">
             <a:avLst/>
@@ -25969,52 +25893,6 @@
           </a:fontRef>
         </p:style>
       </p:cxnSp>
-      <p:cxnSp>
-        <p:nvCxnSpPr>
-          <p:cNvPr id="85" name="Rak pilkoppling 84">
-            <a:extLst>
-              <a:ext uri="{FF2B5EF4-FFF2-40B4-BE49-F238E27FC236}">
-                <a16:creationId xmlns:a16="http://schemas.microsoft.com/office/drawing/2014/main" id="{AFCD2C64-F729-4F8B-8964-1BD9ED3C3BD9}"/>
-              </a:ext>
-            </a:extLst>
-          </p:cNvPr>
-          <p:cNvCxnSpPr>
-            <a:cxnSpLocks/>
-            <a:stCxn id="80" idx="4"/>
-            <a:endCxn id="124" idx="0"/>
-          </p:cNvCxnSpPr>
-          <p:nvPr/>
-        </p:nvCxnSpPr>
-        <p:spPr>
-          <a:xfrm flipH="1">
-            <a:off x="4424626" y="4113222"/>
-            <a:ext cx="2102" cy="438347"/>
-          </a:xfrm>
-          <a:prstGeom prst="straightConnector1">
-            <a:avLst/>
-          </a:prstGeom>
-          <a:ln>
-            <a:solidFill>
-              <a:schemeClr val="tx1"/>
-            </a:solidFill>
-            <a:tailEnd type="triangle"/>
-          </a:ln>
-        </p:spPr>
-        <p:style>
-          <a:lnRef idx="1">
-            <a:schemeClr val="accent1"/>
-          </a:lnRef>
-          <a:fillRef idx="0">
-            <a:schemeClr val="accent1"/>
-          </a:fillRef>
-          <a:effectRef idx="0">
-            <a:schemeClr val="accent1"/>
-          </a:effectRef>
-          <a:fontRef idx="minor">
-            <a:schemeClr val="tx1"/>
-          </a:fontRef>
-        </p:style>
-      </p:cxnSp>
       <p:sp>
         <p:nvSpPr>
           <p:cNvPr id="91" name="Frihandsfigur: Form 90">
@@ -26029,7 +25907,7 @@
         </p:nvSpPr>
         <p:spPr>
           <a:xfrm>
-            <a:off x="1917903" y="1678143"/>
+            <a:off x="1460704" y="1678143"/>
             <a:ext cx="1179226" cy="714503"/>
           </a:xfrm>
           <a:custGeom>
@@ -26256,7 +26134,7 @@
         </p:nvSpPr>
         <p:spPr>
           <a:xfrm>
-            <a:off x="1917904" y="1678143"/>
+            <a:off x="2152079" y="1678143"/>
             <a:ext cx="497476" cy="276999"/>
           </a:xfrm>
           <a:prstGeom prst="rect">
@@ -26295,7 +26173,7 @@
         </p:nvSpPr>
         <p:spPr>
           <a:xfrm>
-            <a:off x="2977364" y="3464970"/>
+            <a:off x="2520165" y="3464970"/>
             <a:ext cx="367586" cy="307777"/>
           </a:xfrm>
           <a:prstGeom prst="rect">
@@ -26334,7 +26212,7 @@
         </p:nvSpPr>
         <p:spPr>
           <a:xfrm>
-            <a:off x="841466" y="2751869"/>
+            <a:off x="384267" y="2751869"/>
             <a:ext cx="2441751" cy="984479"/>
           </a:xfrm>
           <a:prstGeom prst="ellipse">
@@ -26550,8 +26428,8 @@
         </p:nvSpPr>
         <p:spPr>
           <a:xfrm>
-            <a:off x="5791750" y="4551569"/>
-            <a:ext cx="1856110" cy="1195992"/>
+            <a:off x="5700664" y="4551569"/>
+            <a:ext cx="2038282" cy="1195992"/>
           </a:xfrm>
           <a:prstGeom prst="rect">
             <a:avLst/>
@@ -26609,7 +26487,7 @@
                 <a:effectLst/>
                 <a:latin typeface="Arial" panose="020B0604020202020204" pitchFamily="34" charset="0"/>
               </a:rPr>
-              <a:t>The design of the system into which the ML component is integrated ensures that the allocated system safety requirements are satisfied throughout operation</a:t>
+              <a:t>The design of SMIRK into which the ML component is integrated ensures that SYS-ML-REQ1 and SYS-ML-REQ2 are satisfied throughout operation</a:t>
             </a:r>
             <a:endParaRPr lang="sv-SE" sz="1000" dirty="0">
               <a:solidFill>
@@ -26870,7 +26748,7 @@
                 <a:effectLst/>
                 <a:latin typeface="Arial" panose="020B0604020202020204" pitchFamily="34" charset="0"/>
               </a:rPr>
-              <a:t>System design provides sufficient monitoring of erroneous inputs, outputs and assumptions</a:t>
+              <a:t>System design provides sufficient monitoring of erroneous inputs and outputs</a:t>
             </a:r>
             <a:endParaRPr lang="sv-SE" sz="1000" dirty="0">
               <a:solidFill>
@@ -27000,7 +26878,7 @@
                 <a:effectLst/>
                 <a:latin typeface="Arial" panose="020B0604020202020204" pitchFamily="34" charset="0"/>
               </a:rPr>
-              <a:t>System design provides acceptable system response to erroneous inputs, outputs, and assumptions</a:t>
+              <a:t>System design provides acceptable system response to erroneous inputs and outputs</a:t>
             </a:r>
             <a:endParaRPr lang="sv-SE" sz="1000" dirty="0">
               <a:solidFill>
@@ -27130,7 +27008,7 @@
                 <a:effectLst/>
                 <a:latin typeface="Arial" panose="020B0604020202020204" pitchFamily="34" charset="0"/>
               </a:rPr>
-              <a:t>The operational achievement of the deployed component satisfies the safety requirements</a:t>
+              <a:t>The operational achievement of the deployed component satisfies the SYS-ML-REQ1 and SYS-ML-REQ2</a:t>
             </a:r>
             <a:endParaRPr lang="sv-SE" sz="1000" dirty="0">
               <a:solidFill>
@@ -27243,10 +27121,10 @@
       </p:sp>
       <p:sp>
         <p:nvSpPr>
-          <p:cNvPr id="139" name="Romb 138">
-            <a:extLst>
-              <a:ext uri="{FF2B5EF4-FFF2-40B4-BE49-F238E27FC236}">
-                <a16:creationId xmlns:a16="http://schemas.microsoft.com/office/drawing/2014/main" id="{005FE037-CFDA-4A5C-B27F-5A69DE328746}"/>
+          <p:cNvPr id="67" name="Ellips 66">
+            <a:extLst>
+              <a:ext uri="{FF2B5EF4-FFF2-40B4-BE49-F238E27FC236}">
+                <a16:creationId xmlns:a16="http://schemas.microsoft.com/office/drawing/2014/main" id="{BE742B08-F703-4D12-A64F-96D0BFCA5F16}"/>
               </a:ext>
             </a:extLst>
           </p:cNvPr>
@@ -27255,10 +27133,165 @@
         </p:nvSpPr>
         <p:spPr>
           <a:xfrm>
-            <a:off x="5324827" y="8390771"/>
-            <a:ext cx="185446" cy="183430"/>
-          </a:xfrm>
-          <a:prstGeom prst="diamond">
+            <a:off x="5732377" y="8714577"/>
+            <a:ext cx="1393850" cy="1199608"/>
+          </a:xfrm>
+          <a:prstGeom prst="ellipse">
+            <a:avLst/>
+          </a:prstGeom>
+          <a:solidFill>
+            <a:schemeClr val="bg2"/>
+          </a:solidFill>
+          <a:ln w="6350">
+            <a:solidFill>
+              <a:schemeClr val="tx1"/>
+            </a:solidFill>
+          </a:ln>
+        </p:spPr>
+        <p:style>
+          <a:lnRef idx="2">
+            <a:schemeClr val="accent1">
+              <a:shade val="50000"/>
+            </a:schemeClr>
+          </a:lnRef>
+          <a:fillRef idx="1">
+            <a:schemeClr val="accent1"/>
+          </a:fillRef>
+          <a:effectRef idx="0">
+            <a:schemeClr val="accent1"/>
+          </a:effectRef>
+          <a:fontRef idx="minor">
+            <a:schemeClr val="lt1"/>
+          </a:fontRef>
+        </p:style>
+        <p:txBody>
+          <a:bodyPr wrap="square" rtlCol="0" anchor="ctr">
+            <a:noAutofit/>
+          </a:bodyPr>
+          <a:lstStyle/>
+          <a:p>
+            <a:pPr algn="ctr"/>
+            <a:r>
+              <a:rPr lang="sv-SE" sz="1000" b="1" dirty="0">
+                <a:solidFill>
+                  <a:schemeClr val="tx1"/>
+                </a:solidFill>
+                <a:latin typeface="Arial" panose="020B0604020202020204" pitchFamily="34" charset="0"/>
+                <a:cs typeface="Arial" panose="020B0604020202020204" pitchFamily="34" charset="0"/>
+              </a:rPr>
+              <a:t>Sn2.1</a:t>
+            </a:r>
+          </a:p>
+          <a:p>
+            <a:pPr algn="ctr"/>
+            <a:r>
+              <a:rPr lang="sv-SE" sz="1000" dirty="0" err="1">
+                <a:solidFill>
+                  <a:schemeClr val="tx1"/>
+                </a:solidFill>
+                <a:latin typeface="Arial" panose="020B0604020202020204" pitchFamily="34" charset="0"/>
+              </a:rPr>
+              <a:t>Safety</a:t>
+            </a:r>
+            <a:r>
+              <a:rPr lang="sv-SE" sz="1000" dirty="0">
+                <a:solidFill>
+                  <a:schemeClr val="tx1"/>
+                </a:solidFill>
+                <a:latin typeface="Arial" panose="020B0604020202020204" pitchFamily="34" charset="0"/>
+              </a:rPr>
+              <a:t> </a:t>
+            </a:r>
+            <a:r>
+              <a:rPr lang="sv-SE" sz="1000" dirty="0" err="1">
+                <a:solidFill>
+                  <a:schemeClr val="tx1"/>
+                </a:solidFill>
+                <a:latin typeface="Arial" panose="020B0604020202020204" pitchFamily="34" charset="0"/>
+              </a:rPr>
+              <a:t>cage</a:t>
+            </a:r>
+            <a:r>
+              <a:rPr lang="sv-SE" sz="1000" dirty="0">
+                <a:solidFill>
+                  <a:schemeClr val="tx1"/>
+                </a:solidFill>
+                <a:latin typeface="Arial" panose="020B0604020202020204" pitchFamily="34" charset="0"/>
+              </a:rPr>
+              <a:t> </a:t>
+            </a:r>
+            <a:r>
+              <a:rPr lang="sv-SE" sz="1000" dirty="0" err="1">
+                <a:solidFill>
+                  <a:schemeClr val="tx1"/>
+                </a:solidFill>
+                <a:latin typeface="Arial" panose="020B0604020202020204" pitchFamily="34" charset="0"/>
+              </a:rPr>
+              <a:t>architecture</a:t>
+            </a:r>
+            <a:r>
+              <a:rPr lang="sv-SE" sz="1000" dirty="0">
+                <a:solidFill>
+                  <a:schemeClr val="tx1"/>
+                </a:solidFill>
+                <a:latin typeface="Arial" panose="020B0604020202020204" pitchFamily="34" charset="0"/>
+              </a:rPr>
+              <a:t> for </a:t>
+            </a:r>
+            <a:r>
+              <a:rPr lang="sv-SE" sz="1000" dirty="0" err="1">
+                <a:solidFill>
+                  <a:schemeClr val="tx1"/>
+                </a:solidFill>
+                <a:latin typeface="Arial" panose="020B0604020202020204" pitchFamily="34" charset="0"/>
+              </a:rPr>
+              <a:t>out</a:t>
+            </a:r>
+            <a:r>
+              <a:rPr lang="sv-SE" sz="1000" dirty="0">
+                <a:solidFill>
+                  <a:schemeClr val="tx1"/>
+                </a:solidFill>
+                <a:latin typeface="Arial" panose="020B0604020202020204" pitchFamily="34" charset="0"/>
+              </a:rPr>
+              <a:t>-of-distribution </a:t>
+            </a:r>
+            <a:r>
+              <a:rPr lang="sv-SE" sz="1000" dirty="0" err="1">
+                <a:solidFill>
+                  <a:schemeClr val="tx1"/>
+                </a:solidFill>
+                <a:latin typeface="Arial" panose="020B0604020202020204" pitchFamily="34" charset="0"/>
+              </a:rPr>
+              <a:t>detection</a:t>
+            </a:r>
+            <a:endParaRPr lang="sv-SE" sz="1000" dirty="0">
+              <a:solidFill>
+                <a:schemeClr val="tx1"/>
+              </a:solidFill>
+              <a:latin typeface="Arial" panose="020B0604020202020204" pitchFamily="34" charset="0"/>
+            </a:endParaRPr>
+          </a:p>
+        </p:txBody>
+      </p:sp>
+      <p:sp>
+        <p:nvSpPr>
+          <p:cNvPr id="68" name="Likbent triangel 67">
+            <a:extLst>
+              <a:ext uri="{FF2B5EF4-FFF2-40B4-BE49-F238E27FC236}">
+                <a16:creationId xmlns:a16="http://schemas.microsoft.com/office/drawing/2014/main" id="{9E1F129F-EEF6-4D16-A115-304E3588E0FA}"/>
+              </a:ext>
+            </a:extLst>
+          </p:cNvPr>
+          <p:cNvSpPr/>
+          <p:nvPr/>
+        </p:nvSpPr>
+        <p:spPr>
+          <a:xfrm>
+            <a:off x="6291493" y="9924197"/>
+            <a:ext cx="272842" cy="176164"/>
+          </a:xfrm>
+          <a:prstGeom prst="triangle">
             <a:avLst/>
           </a:prstGeom>
           <a:solidFill>
@@ -27295,60 +27328,98 @@
           </a:p>
         </p:txBody>
       </p:sp>
-      <p:sp>
-        <p:nvSpPr>
-          <p:cNvPr id="140" name="Romb 139">
-            <a:extLst>
-              <a:ext uri="{FF2B5EF4-FFF2-40B4-BE49-F238E27FC236}">
-                <a16:creationId xmlns:a16="http://schemas.microsoft.com/office/drawing/2014/main" id="{06918E5F-B0C6-44C7-8246-B00DD00ED9B2}"/>
-              </a:ext>
-            </a:extLst>
-          </p:cNvPr>
-          <p:cNvSpPr/>
-          <p:nvPr/>
-        </p:nvSpPr>
+      <p:cxnSp>
+        <p:nvCxnSpPr>
+          <p:cNvPr id="70" name="Rak pilkoppling 69">
+            <a:extLst>
+              <a:ext uri="{FF2B5EF4-FFF2-40B4-BE49-F238E27FC236}">
+                <a16:creationId xmlns:a16="http://schemas.microsoft.com/office/drawing/2014/main" id="{DE5B44D5-2D31-457B-AF09-B440FD7516F7}"/>
+              </a:ext>
+            </a:extLst>
+          </p:cNvPr>
+          <p:cNvCxnSpPr>
+            <a:cxnSpLocks/>
+            <a:stCxn id="125" idx="2"/>
+            <a:endCxn id="67" idx="1"/>
+          </p:cNvCxnSpPr>
+          <p:nvPr/>
+        </p:nvCxnSpPr>
         <p:spPr>
           <a:xfrm>
-            <a:off x="7202631" y="8383157"/>
-            <a:ext cx="185446" cy="183430"/>
-          </a:xfrm>
-          <a:prstGeom prst="diamond">
+            <a:off x="5456832" y="8390771"/>
+            <a:ext cx="479670" cy="499485"/>
+          </a:xfrm>
+          <a:prstGeom prst="straightConnector1">
             <a:avLst/>
           </a:prstGeom>
-          <a:solidFill>
-            <a:schemeClr val="bg1"/>
-          </a:solidFill>
           <a:ln>
             <a:solidFill>
               <a:schemeClr val="tx1"/>
             </a:solidFill>
+            <a:tailEnd type="triangle"/>
           </a:ln>
         </p:spPr>
         <p:style>
-          <a:lnRef idx="2">
-            <a:schemeClr val="accent1">
-              <a:shade val="50000"/>
-            </a:schemeClr>
+          <a:lnRef idx="1">
+            <a:schemeClr val="accent1"/>
           </a:lnRef>
-          <a:fillRef idx="1">
+          <a:fillRef idx="0">
             <a:schemeClr val="accent1"/>
           </a:fillRef>
           <a:effectRef idx="0">
             <a:schemeClr val="accent1"/>
           </a:effectRef>
           <a:fontRef idx="minor">
-            <a:schemeClr val="lt1"/>
+            <a:schemeClr val="tx1"/>
           </a:fontRef>
         </p:style>
-        <p:txBody>
-          <a:bodyPr rtlCol="0" anchor="ctr"/>
-          <a:lstStyle/>
-          <a:p>
-            <a:pPr algn="ctr"/>
-            <a:endParaRPr lang="sv-SE"/>
-          </a:p>
-        </p:txBody>
-      </p:sp>
+      </p:cxnSp>
+      <p:cxnSp>
+        <p:nvCxnSpPr>
+          <p:cNvPr id="72" name="Rak pilkoppling 71">
+            <a:extLst>
+              <a:ext uri="{FF2B5EF4-FFF2-40B4-BE49-F238E27FC236}">
+                <a16:creationId xmlns:a16="http://schemas.microsoft.com/office/drawing/2014/main" id="{D8E4EFE2-6EDB-443B-9B97-C7E06084087F}"/>
+              </a:ext>
+            </a:extLst>
+          </p:cNvPr>
+          <p:cNvCxnSpPr>
+            <a:cxnSpLocks/>
+            <a:stCxn id="131" idx="2"/>
+            <a:endCxn id="67" idx="7"/>
+          </p:cNvCxnSpPr>
+          <p:nvPr/>
+        </p:nvCxnSpPr>
+        <p:spPr>
+          <a:xfrm flipH="1">
+            <a:off x="6922102" y="8379117"/>
+            <a:ext cx="373253" cy="511139"/>
+          </a:xfrm>
+          <a:prstGeom prst="straightConnector1">
+            <a:avLst/>
+          </a:prstGeom>
+          <a:ln>
+            <a:solidFill>
+              <a:schemeClr val="tx1"/>
+            </a:solidFill>
+            <a:tailEnd type="triangle"/>
+          </a:ln>
+        </p:spPr>
+        <p:style>
+          <a:lnRef idx="1">
+            <a:schemeClr val="accent1"/>
+          </a:lnRef>
+          <a:fillRef idx="0">
+            <a:schemeClr val="accent1"/>
+          </a:fillRef>
+          <a:effectRef idx="0">
+            <a:schemeClr val="accent1"/>
+          </a:effectRef>
+          <a:fontRef idx="minor">
+            <a:schemeClr val="tx1"/>
+          </a:fontRef>
+        </p:style>
+      </p:cxnSp>
     </p:spTree>
     <p:extLst>
       <p:ext uri="{BB962C8B-B14F-4D97-AF65-F5344CB8AC3E}">

</xml_diff>